<commit_message>
Changes to Design Show poster
Changes added to Design Show poster (might be garbage)
</commit_message>
<xml_diff>
--- a/Documentation/Design Show Poster/Senior Design Show Poster.pptx
+++ b/Documentation/Design Show Poster/Senior Design Show Poster.pptx
@@ -288,7 +288,7 @@
           <a:p>
             <a:fld id="{08F7D037-1E52-45C7-976A-93EFD4975647}" type="datetimeFigureOut">
               <a:rPr lang="en-US" smtClean="0"/>
-              <a:t>5/7/2015</a:t>
+              <a:t>5/8/2015</a:t>
             </a:fld>
             <a:endParaRPr lang="en-US"/>
           </a:p>
@@ -458,7 +458,7 @@
           <a:p>
             <a:fld id="{08F7D037-1E52-45C7-976A-93EFD4975647}" type="datetimeFigureOut">
               <a:rPr lang="en-US" smtClean="0"/>
-              <a:t>5/7/2015</a:t>
+              <a:t>5/8/2015</a:t>
             </a:fld>
             <a:endParaRPr lang="en-US"/>
           </a:p>
@@ -638,7 +638,7 @@
           <a:p>
             <a:fld id="{08F7D037-1E52-45C7-976A-93EFD4975647}" type="datetimeFigureOut">
               <a:rPr lang="en-US" smtClean="0"/>
-              <a:t>5/7/2015</a:t>
+              <a:t>5/8/2015</a:t>
             </a:fld>
             <a:endParaRPr lang="en-US"/>
           </a:p>
@@ -808,7 +808,7 @@
           <a:p>
             <a:fld id="{08F7D037-1E52-45C7-976A-93EFD4975647}" type="datetimeFigureOut">
               <a:rPr lang="en-US" smtClean="0"/>
-              <a:t>5/7/2015</a:t>
+              <a:t>5/8/2015</a:t>
             </a:fld>
             <a:endParaRPr lang="en-US"/>
           </a:p>
@@ -1054,7 +1054,7 @@
           <a:p>
             <a:fld id="{08F7D037-1E52-45C7-976A-93EFD4975647}" type="datetimeFigureOut">
               <a:rPr lang="en-US" smtClean="0"/>
-              <a:t>5/7/2015</a:t>
+              <a:t>5/8/2015</a:t>
             </a:fld>
             <a:endParaRPr lang="en-US"/>
           </a:p>
@@ -1342,7 +1342,7 @@
           <a:p>
             <a:fld id="{08F7D037-1E52-45C7-976A-93EFD4975647}" type="datetimeFigureOut">
               <a:rPr lang="en-US" smtClean="0"/>
-              <a:t>5/7/2015</a:t>
+              <a:t>5/8/2015</a:t>
             </a:fld>
             <a:endParaRPr lang="en-US"/>
           </a:p>
@@ -1769,7 +1769,7 @@
           <a:p>
             <a:fld id="{08F7D037-1E52-45C7-976A-93EFD4975647}" type="datetimeFigureOut">
               <a:rPr lang="en-US" smtClean="0"/>
-              <a:t>5/7/2015</a:t>
+              <a:t>5/8/2015</a:t>
             </a:fld>
             <a:endParaRPr lang="en-US"/>
           </a:p>
@@ -1887,7 +1887,7 @@
           <a:p>
             <a:fld id="{08F7D037-1E52-45C7-976A-93EFD4975647}" type="datetimeFigureOut">
               <a:rPr lang="en-US" smtClean="0"/>
-              <a:t>5/7/2015</a:t>
+              <a:t>5/8/2015</a:t>
             </a:fld>
             <a:endParaRPr lang="en-US"/>
           </a:p>
@@ -1982,7 +1982,7 @@
           <a:p>
             <a:fld id="{08F7D037-1E52-45C7-976A-93EFD4975647}" type="datetimeFigureOut">
               <a:rPr lang="en-US" smtClean="0"/>
-              <a:t>5/7/2015</a:t>
+              <a:t>5/8/2015</a:t>
             </a:fld>
             <a:endParaRPr lang="en-US"/>
           </a:p>
@@ -2259,7 +2259,7 @@
           <a:p>
             <a:fld id="{08F7D037-1E52-45C7-976A-93EFD4975647}" type="datetimeFigureOut">
               <a:rPr lang="en-US" smtClean="0"/>
-              <a:t>5/7/2015</a:t>
+              <a:t>5/8/2015</a:t>
             </a:fld>
             <a:endParaRPr lang="en-US"/>
           </a:p>
@@ -2512,7 +2512,7 @@
           <a:p>
             <a:fld id="{08F7D037-1E52-45C7-976A-93EFD4975647}" type="datetimeFigureOut">
               <a:rPr lang="en-US" smtClean="0"/>
-              <a:t>5/7/2015</a:t>
+              <a:t>5/8/2015</a:t>
             </a:fld>
             <a:endParaRPr lang="en-US"/>
           </a:p>
@@ -2725,7 +2725,7 @@
           <a:p>
             <a:fld id="{08F7D037-1E52-45C7-976A-93EFD4975647}" type="datetimeFigureOut">
               <a:rPr lang="en-US" smtClean="0"/>
-              <a:t>5/7/2015</a:t>
+              <a:t>5/8/2015</a:t>
             </a:fld>
             <a:endParaRPr lang="en-US"/>
           </a:p>
@@ -3123,7 +3123,7 @@
         </p:blipFill>
         <p:spPr bwMode="auto">
           <a:xfrm>
-            <a:off x="304800" y="38100"/>
+            <a:off x="0" y="-91581"/>
             <a:ext cx="1524000" cy="1524000"/>
           </a:xfrm>
           <a:prstGeom prst="rect">
@@ -3186,7 +3186,7 @@
         </p:blipFill>
         <p:spPr>
           <a:xfrm>
-            <a:off x="1828800" y="38100"/>
+            <a:off x="1562100" y="60603"/>
             <a:ext cx="1524000" cy="1524000"/>
           </a:xfrm>
           <a:prstGeom prst="rect">
@@ -3202,7 +3202,7 @@
         </p:nvGrpSpPr>
         <p:grpSpPr>
           <a:xfrm>
-            <a:off x="3352800" y="60387"/>
+            <a:off x="3086100" y="27321"/>
             <a:ext cx="2648310" cy="439947"/>
             <a:chOff x="6461183" y="94891"/>
             <a:chExt cx="2648310" cy="439947"/>
@@ -3300,7 +3300,7 @@
         </p:blipFill>
         <p:spPr bwMode="auto">
           <a:xfrm>
-            <a:off x="3744764" y="762216"/>
+            <a:off x="3200042" y="670419"/>
             <a:ext cx="1863305" cy="914184"/>
           </a:xfrm>
           <a:prstGeom prst="rect">
@@ -3316,6 +3316,1204 @@
               </a14:hiddenFill>
             </a:ext>
           </a:extLst>
+        </p:spPr>
+      </p:pic>
+      <p:sp>
+        <p:nvSpPr>
+          <p:cNvPr id="2" name="TextBox 1"/>
+          <p:cNvSpPr txBox="1"/>
+          <p:nvPr/>
+        </p:nvSpPr>
+        <p:spPr>
+          <a:xfrm>
+            <a:off x="11201400" y="3886200"/>
+            <a:ext cx="9525000" cy="4524315"/>
+          </a:xfrm>
+          <a:prstGeom prst="rect">
+            <a:avLst/>
+          </a:prstGeom>
+          <a:noFill/>
+        </p:spPr>
+        <p:txBody>
+          <a:bodyPr wrap="square" rtlCol="0">
+            <a:spAutoFit/>
+          </a:bodyPr>
+          <a:lstStyle/>
+          <a:p>
+            <a:pPr lvl="0"/>
+            <a:r>
+              <a:rPr lang="en-US" sz="2800" b="1" dirty="0" smtClean="0"/>
+              <a:t>Design Constraints/Criteria</a:t>
+            </a:r>
+          </a:p>
+          <a:p>
+            <a:pPr marL="342900" lvl="0" indent="-342900">
+              <a:buFont typeface="Arial" panose="020B0604020202020204" pitchFamily="34" charset="0"/>
+              <a:buChar char="•"/>
+            </a:pPr>
+            <a:r>
+              <a:rPr lang="en-US" sz="2000" dirty="0" smtClean="0"/>
+              <a:t>A </a:t>
+            </a:r>
+            <a:r>
+              <a:rPr lang="en-US" sz="2000" dirty="0"/>
+              <a:t>maximum weight of 35 kg for portability</a:t>
+            </a:r>
+          </a:p>
+          <a:p>
+            <a:pPr marL="342900" lvl="0" indent="-342900">
+              <a:buFont typeface="Arial" panose="020B0604020202020204" pitchFamily="34" charset="0"/>
+              <a:buChar char="•"/>
+            </a:pPr>
+            <a:r>
+              <a:rPr lang="en-US" sz="2000" dirty="0"/>
+              <a:t>Maximum size of 0.75 m x 0.75 m x 1.0 m box for portability</a:t>
+            </a:r>
+          </a:p>
+          <a:p>
+            <a:pPr marL="342900" lvl="0" indent="-342900">
+              <a:buFont typeface="Arial" panose="020B0604020202020204" pitchFamily="34" charset="0"/>
+              <a:buChar char="•"/>
+            </a:pPr>
+            <a:r>
+              <a:rPr lang="en-US" sz="2000" dirty="0"/>
+              <a:t>Custom debug panel creation to facilitate troubleshooting</a:t>
+            </a:r>
+          </a:p>
+          <a:p>
+            <a:pPr marL="342900" lvl="0" indent="-342900">
+              <a:buFont typeface="Arial" panose="020B0604020202020204" pitchFamily="34" charset="0"/>
+              <a:buChar char="•"/>
+            </a:pPr>
+            <a:r>
+              <a:rPr lang="en-US" sz="2000" dirty="0"/>
+              <a:t>MATLAB and Simulink model support to allow mechanical engineering students to update control algorithms without knowledge of C/C++</a:t>
+            </a:r>
+          </a:p>
+          <a:p>
+            <a:pPr marL="342900" lvl="0" indent="-342900">
+              <a:buFont typeface="Arial" panose="020B0604020202020204" pitchFamily="34" charset="0"/>
+              <a:buChar char="•"/>
+            </a:pPr>
+            <a:r>
+              <a:rPr lang="en-US" sz="2000" dirty="0"/>
+              <a:t>Electronic fuses and shielding to protect the robot and operator during use and maintenance</a:t>
+            </a:r>
+          </a:p>
+          <a:p>
+            <a:pPr marL="342900" lvl="0" indent="-342900">
+              <a:buFont typeface="Arial" panose="020B0604020202020204" pitchFamily="34" charset="0"/>
+              <a:buChar char="•"/>
+            </a:pPr>
+            <a:r>
+              <a:rPr lang="en-US" sz="2000" dirty="0"/>
+              <a:t>Mechanical protection to reduce the risk of pinching and self-collision damage to the robot</a:t>
+            </a:r>
+          </a:p>
+          <a:p>
+            <a:pPr marL="342900" lvl="0" indent="-342900">
+              <a:buFont typeface="Arial" panose="020B0604020202020204" pitchFamily="34" charset="0"/>
+              <a:buChar char="•"/>
+            </a:pPr>
+            <a:r>
+              <a:rPr lang="en-US" sz="2000" dirty="0"/>
+              <a:t>An easy to access emergency stop to quickly depower the robot</a:t>
+            </a:r>
+          </a:p>
+          <a:p>
+            <a:pPr marL="342900" lvl="0" indent="-342900">
+              <a:buFont typeface="Arial" panose="020B0604020202020204" pitchFamily="34" charset="0"/>
+              <a:buChar char="•"/>
+            </a:pPr>
+            <a:r>
+              <a:rPr lang="en-US" sz="2000" dirty="0"/>
+              <a:t>A pressure relief valve to reduce the risk of overloading and damaging pneumatic components</a:t>
+            </a:r>
+          </a:p>
+          <a:p>
+            <a:endParaRPr lang="en-US" sz="2000" dirty="0"/>
+          </a:p>
+        </p:txBody>
+      </p:sp>
+      <p:sp>
+        <p:nvSpPr>
+          <p:cNvPr id="10" name="TextBox 9"/>
+          <p:cNvSpPr txBox="1"/>
+          <p:nvPr/>
+        </p:nvSpPr>
+        <p:spPr>
+          <a:xfrm>
+            <a:off x="453247" y="3886200"/>
+            <a:ext cx="9525000" cy="2985433"/>
+          </a:xfrm>
+          <a:prstGeom prst="rect">
+            <a:avLst/>
+          </a:prstGeom>
+          <a:noFill/>
+        </p:spPr>
+        <p:txBody>
+          <a:bodyPr wrap="square" rtlCol="0">
+            <a:spAutoFit/>
+          </a:bodyPr>
+          <a:lstStyle/>
+          <a:p>
+            <a:pPr lvl="0"/>
+            <a:r>
+              <a:rPr lang="en-US" sz="2800" b="1" dirty="0" smtClean="0"/>
+              <a:t>Problem Statement</a:t>
+            </a:r>
+          </a:p>
+          <a:p>
+            <a:r>
+              <a:rPr lang="en-US" sz="2000" dirty="0"/>
+              <a:t>Milwaukee School of Engineering (MSOE) participates in community outreach programs where science, technology, engineering, and mathematics (STEM) topics are demonstrated to encourage younger generations to enter into STEM based degrees and careers. Having an automated control system to demonstrate and interact with would increase the excitement at these outreach programs. Development of a robot with pneumatic locomotion for the Milwaukee School of Engineering’s controls classes would give students a first-hand experience with complex control systems.</a:t>
+            </a:r>
+          </a:p>
+          <a:p>
+            <a:endParaRPr lang="en-US" sz="2000" dirty="0"/>
+          </a:p>
+        </p:txBody>
+      </p:sp>
+      <p:sp>
+        <p:nvSpPr>
+          <p:cNvPr id="11" name="TextBox 10"/>
+          <p:cNvSpPr txBox="1"/>
+          <p:nvPr/>
+        </p:nvSpPr>
+        <p:spPr>
+          <a:xfrm>
+            <a:off x="515861" y="7645122"/>
+            <a:ext cx="9525000" cy="2369880"/>
+          </a:xfrm>
+          <a:prstGeom prst="rect">
+            <a:avLst/>
+          </a:prstGeom>
+          <a:noFill/>
+        </p:spPr>
+        <p:txBody>
+          <a:bodyPr wrap="square" rtlCol="0">
+            <a:spAutoFit/>
+          </a:bodyPr>
+          <a:lstStyle/>
+          <a:p>
+            <a:r>
+              <a:rPr lang="en-US" sz="2800" b="1" dirty="0" smtClean="0"/>
+              <a:t>Mechanical Design</a:t>
+            </a:r>
+          </a:p>
+          <a:p>
+            <a:r>
+              <a:rPr lang="en-US" sz="2000" dirty="0" smtClean="0"/>
+              <a:t>Chassis Construction</a:t>
+            </a:r>
+          </a:p>
+          <a:p>
+            <a:pPr marL="342900" indent="-342900">
+              <a:buFont typeface="Arial" panose="020B0604020202020204" pitchFamily="34" charset="0"/>
+              <a:buChar char="•"/>
+            </a:pPr>
+            <a:r>
+              <a:rPr lang="en-US" sz="2000" dirty="0" smtClean="0"/>
+              <a:t>6105-T5 T-Slotted Aluminum Framing (Yield Strength = 275 </a:t>
+            </a:r>
+            <a:r>
+              <a:rPr lang="en-US" sz="2000" dirty="0" err="1" smtClean="0"/>
+              <a:t>Mpa</a:t>
+            </a:r>
+            <a:r>
+              <a:rPr lang="en-US" sz="2000" dirty="0" smtClean="0"/>
+              <a:t>)</a:t>
+            </a:r>
+          </a:p>
+          <a:p>
+            <a:pPr marL="342900" indent="-342900">
+              <a:buFont typeface="Arial" panose="020B0604020202020204" pitchFamily="34" charset="0"/>
+              <a:buChar char="•"/>
+            </a:pPr>
+            <a:r>
+              <a:rPr lang="en-US" sz="2000" dirty="0" smtClean="0"/>
+              <a:t>6061 Aluminum Plate</a:t>
+            </a:r>
+            <a:r>
+              <a:rPr lang="en-US" sz="2000" dirty="0"/>
+              <a:t> </a:t>
+            </a:r>
+            <a:r>
+              <a:rPr lang="en-US" sz="2000" dirty="0" smtClean="0"/>
+              <a:t>(Yield </a:t>
+            </a:r>
+            <a:r>
+              <a:rPr lang="en-US" sz="2000" dirty="0"/>
+              <a:t>Strength = </a:t>
+            </a:r>
+            <a:r>
+              <a:rPr lang="en-US" sz="2000" dirty="0" smtClean="0"/>
+              <a:t>276 </a:t>
+            </a:r>
+            <a:r>
+              <a:rPr lang="en-US" sz="2000" dirty="0" err="1" smtClean="0"/>
+              <a:t>Mpa</a:t>
+            </a:r>
+            <a:r>
+              <a:rPr lang="en-US" sz="2000" dirty="0" smtClean="0"/>
+              <a:t>)</a:t>
+            </a:r>
+          </a:p>
+          <a:p>
+            <a:r>
+              <a:rPr lang="en-US" sz="2000" dirty="0" smtClean="0"/>
+              <a:t>Leg Construction</a:t>
+            </a:r>
+          </a:p>
+          <a:p>
+            <a:pPr marL="342900" indent="-342900">
+              <a:buFont typeface="Arial" panose="020B0604020202020204" pitchFamily="34" charset="0"/>
+              <a:buChar char="•"/>
+            </a:pPr>
+            <a:r>
+              <a:rPr lang="en-US" sz="2000" dirty="0" smtClean="0"/>
+              <a:t>6061 Aluminum Bar (</a:t>
+            </a:r>
+            <a:r>
+              <a:rPr lang="en-US" sz="2000" dirty="0"/>
+              <a:t>Yield Strength = </a:t>
+            </a:r>
+            <a:r>
+              <a:rPr lang="en-US" sz="2000" dirty="0" smtClean="0"/>
+              <a:t>276 </a:t>
+            </a:r>
+            <a:r>
+              <a:rPr lang="en-US" sz="2000" dirty="0" err="1" smtClean="0"/>
+              <a:t>Mpa</a:t>
+            </a:r>
+            <a:r>
+              <a:rPr lang="en-US" sz="2000" dirty="0" smtClean="0"/>
+              <a:t>)</a:t>
+            </a:r>
+          </a:p>
+          <a:p>
+            <a:endParaRPr lang="en-US" sz="2000" dirty="0"/>
+          </a:p>
+        </p:txBody>
+      </p:sp>
+      <p:grpSp>
+        <p:nvGrpSpPr>
+          <p:cNvPr id="3" name="Group 2"/>
+          <p:cNvGrpSpPr/>
+          <p:nvPr/>
+        </p:nvGrpSpPr>
+        <p:grpSpPr>
+          <a:xfrm>
+            <a:off x="5662855" y="10813266"/>
+            <a:ext cx="5011552" cy="5634355"/>
+            <a:chOff x="586740" y="13258800"/>
+            <a:chExt cx="5943600" cy="6624955"/>
+          </a:xfrm>
+        </p:grpSpPr>
+        <p:pic>
+          <p:nvPicPr>
+            <p:cNvPr id="12" name="Picture 11"/>
+            <p:cNvPicPr/>
+            <p:nvPr/>
+          </p:nvPicPr>
+          <p:blipFill>
+            <a:blip r:embed="rId6"/>
+            <a:stretch>
+              <a:fillRect/>
+            </a:stretch>
+          </p:blipFill>
+          <p:spPr>
+            <a:xfrm>
+              <a:off x="3986774" y="13258800"/>
+              <a:ext cx="2543566" cy="3586162"/>
+            </a:xfrm>
+            <a:prstGeom prst="rect">
+              <a:avLst/>
+            </a:prstGeom>
+          </p:spPr>
+        </p:pic>
+        <p:pic>
+          <p:nvPicPr>
+            <p:cNvPr id="13" name="Picture 12"/>
+            <p:cNvPicPr/>
+            <p:nvPr/>
+          </p:nvPicPr>
+          <p:blipFill>
+            <a:blip r:embed="rId7"/>
+            <a:stretch>
+              <a:fillRect/>
+            </a:stretch>
+          </p:blipFill>
+          <p:spPr>
+            <a:xfrm>
+              <a:off x="614924" y="13258800"/>
+              <a:ext cx="2766060" cy="3451225"/>
+            </a:xfrm>
+            <a:prstGeom prst="rect">
+              <a:avLst/>
+            </a:prstGeom>
+          </p:spPr>
+        </p:pic>
+        <p:pic>
+          <p:nvPicPr>
+            <p:cNvPr id="14" name="Picture 13"/>
+            <p:cNvPicPr/>
+            <p:nvPr/>
+          </p:nvPicPr>
+          <p:blipFill>
+            <a:blip r:embed="rId8"/>
+            <a:stretch>
+              <a:fillRect/>
+            </a:stretch>
+          </p:blipFill>
+          <p:spPr>
+            <a:xfrm>
+              <a:off x="586740" y="17221200"/>
+              <a:ext cx="5943600" cy="2662555"/>
+            </a:xfrm>
+            <a:prstGeom prst="rect">
+              <a:avLst/>
+            </a:prstGeom>
+          </p:spPr>
+        </p:pic>
+      </p:grpSp>
+      <p:sp>
+        <p:nvSpPr>
+          <p:cNvPr id="15" name="TextBox 14"/>
+          <p:cNvSpPr txBox="1"/>
+          <p:nvPr/>
+        </p:nvSpPr>
+        <p:spPr>
+          <a:xfrm>
+            <a:off x="11216640" y="8469510"/>
+            <a:ext cx="9525000" cy="4339650"/>
+          </a:xfrm>
+          <a:prstGeom prst="rect">
+            <a:avLst/>
+          </a:prstGeom>
+          <a:noFill/>
+        </p:spPr>
+        <p:txBody>
+          <a:bodyPr wrap="square" rtlCol="0">
+            <a:spAutoFit/>
+          </a:bodyPr>
+          <a:lstStyle/>
+          <a:p>
+            <a:r>
+              <a:rPr lang="en-US" sz="2800" b="1" dirty="0" smtClean="0"/>
+              <a:t>Pneumatic Design</a:t>
+            </a:r>
+          </a:p>
+          <a:p>
+            <a:r>
+              <a:rPr lang="en-US" sz="2000" dirty="0" smtClean="0"/>
+              <a:t>Using pneumatic systems as the driving force for the legs, the following components will be utilized:</a:t>
+            </a:r>
+          </a:p>
+          <a:p>
+            <a:pPr marL="342900" indent="-342900">
+              <a:buFont typeface="Arial" panose="020B0604020202020204" pitchFamily="34" charset="0"/>
+              <a:buChar char="•"/>
+            </a:pPr>
+            <a:r>
+              <a:rPr lang="en-US" sz="2000" dirty="0" smtClean="0"/>
+              <a:t>Double-acting, air cylinders with position feedback sensors (1.5 in. bore diameter)</a:t>
+            </a:r>
+          </a:p>
+          <a:p>
+            <a:pPr marL="342900" indent="-342900">
+              <a:buFont typeface="Arial" panose="020B0604020202020204" pitchFamily="34" charset="0"/>
+              <a:buChar char="•"/>
+            </a:pPr>
+            <a:r>
+              <a:rPr lang="en-US" sz="2000" dirty="0" smtClean="0"/>
+              <a:t>Two-solenoid 4 way 3 position directional control valves (0.37 </a:t>
+            </a:r>
+            <a:r>
+              <a:rPr lang="en-US" sz="2000" dirty="0" err="1" smtClean="0"/>
+              <a:t>C</a:t>
+            </a:r>
+            <a:r>
+              <a:rPr lang="en-US" sz="2000" baseline="-25000" dirty="0" err="1" smtClean="0"/>
+              <a:t>v</a:t>
+            </a:r>
+            <a:r>
+              <a:rPr lang="en-US" sz="2000" dirty="0" smtClean="0"/>
+              <a:t>)</a:t>
+            </a:r>
+          </a:p>
+          <a:p>
+            <a:pPr marL="342900" indent="-342900">
+              <a:buFont typeface="Arial" panose="020B0604020202020204" pitchFamily="34" charset="0"/>
+              <a:buChar char="•"/>
+            </a:pPr>
+            <a:r>
+              <a:rPr lang="en-US" sz="2000" dirty="0" smtClean="0"/>
+              <a:t>Air-compressor</a:t>
+            </a:r>
+          </a:p>
+          <a:p>
+            <a:pPr marL="342900" indent="-342900">
+              <a:buFont typeface="Arial" panose="020B0604020202020204" pitchFamily="34" charset="0"/>
+              <a:buChar char="•"/>
+            </a:pPr>
+            <a:r>
+              <a:rPr lang="en-US" sz="2000" dirty="0" smtClean="0"/>
+              <a:t>Pressure relief valve</a:t>
+            </a:r>
+          </a:p>
+          <a:p>
+            <a:pPr marL="342900" indent="-342900">
+              <a:buFont typeface="Arial" panose="020B0604020202020204" pitchFamily="34" charset="0"/>
+              <a:buChar char="•"/>
+            </a:pPr>
+            <a:r>
+              <a:rPr lang="en-US" sz="2000" dirty="0" smtClean="0"/>
+              <a:t>Soft start/dump solenoid valve</a:t>
+            </a:r>
+          </a:p>
+          <a:p>
+            <a:pPr marL="342900" indent="-342900">
+              <a:buFont typeface="Arial" panose="020B0604020202020204" pitchFamily="34" charset="0"/>
+              <a:buChar char="•"/>
+            </a:pPr>
+            <a:r>
+              <a:rPr lang="en-US" sz="2000" dirty="0" smtClean="0"/>
+              <a:t>Secondary receiver tank</a:t>
+            </a:r>
+          </a:p>
+          <a:p>
+            <a:endParaRPr lang="en-US" sz="2000" dirty="0" smtClean="0"/>
+          </a:p>
+          <a:p>
+            <a:endParaRPr lang="en-US" sz="2000" dirty="0"/>
+          </a:p>
+          <a:p>
+            <a:endParaRPr lang="en-US" sz="2800" dirty="0" smtClean="0"/>
+          </a:p>
+          <a:p>
+            <a:endParaRPr lang="en-US" sz="2000" dirty="0"/>
+          </a:p>
+        </p:txBody>
+      </p:sp>
+      <p:pic>
+        <p:nvPicPr>
+          <p:cNvPr id="16" name="Picture 15" descr="D:\MyDocs\Documents\Senior Design Git\AgileRoboticControls\System Modelling\Mechanical\Pneumatics\Sample Circuit.png"/>
+          <p:cNvPicPr/>
+          <p:nvPr/>
+        </p:nvPicPr>
+        <p:blipFill>
+          <a:blip r:embed="rId9">
+            <a:extLst>
+              <a:ext uri="{28A0092B-C50C-407E-A947-70E740481C1C}">
+                <a14:useLocalDpi xmlns:a14="http://schemas.microsoft.com/office/drawing/2010/main" val="0"/>
+              </a:ext>
+            </a:extLst>
+          </a:blip>
+          <a:srcRect/>
+          <a:stretch>
+            <a:fillRect/>
+          </a:stretch>
+        </p:blipFill>
+        <p:spPr bwMode="auto">
+          <a:xfrm>
+            <a:off x="12256770" y="11762609"/>
+            <a:ext cx="7444740" cy="3139440"/>
+          </a:xfrm>
+          <a:prstGeom prst="rect">
+            <a:avLst/>
+          </a:prstGeom>
+          <a:noFill/>
+          <a:ln>
+            <a:noFill/>
+          </a:ln>
+        </p:spPr>
+      </p:pic>
+      <p:pic>
+        <p:nvPicPr>
+          <p:cNvPr id="17" name="Picture 16"/>
+          <p:cNvPicPr/>
+          <p:nvPr/>
+        </p:nvPicPr>
+        <p:blipFill>
+          <a:blip r:embed="rId10" cstate="print">
+            <a:extLst>
+              <a:ext uri="{28A0092B-C50C-407E-A947-70E740481C1C}">
+                <a14:useLocalDpi xmlns:a14="http://schemas.microsoft.com/office/drawing/2010/main" val="0"/>
+              </a:ext>
+            </a:extLst>
+          </a:blip>
+          <a:stretch>
+            <a:fillRect/>
+          </a:stretch>
+        </p:blipFill>
+        <p:spPr>
+          <a:xfrm>
+            <a:off x="113602" y="10813266"/>
+            <a:ext cx="4888785" cy="4157169"/>
+          </a:xfrm>
+          <a:prstGeom prst="rect">
+            <a:avLst/>
+          </a:prstGeom>
+          <a:ln>
+            <a:solidFill>
+              <a:schemeClr val="bg1"/>
+            </a:solidFill>
+          </a:ln>
+        </p:spPr>
+      </p:pic>
+      <p:grpSp>
+        <p:nvGrpSpPr>
+          <p:cNvPr id="18" name="Group 17"/>
+          <p:cNvGrpSpPr/>
+          <p:nvPr/>
+        </p:nvGrpSpPr>
+        <p:grpSpPr>
+          <a:xfrm>
+            <a:off x="22936200" y="4813999"/>
+            <a:ext cx="11904784" cy="2831123"/>
+            <a:chOff x="158262" y="2839915"/>
+            <a:chExt cx="11904784" cy="2831123"/>
+          </a:xfrm>
+        </p:grpSpPr>
+        <p:grpSp>
+          <p:nvGrpSpPr>
+            <p:cNvPr id="19" name="Group 18"/>
+            <p:cNvGrpSpPr/>
+            <p:nvPr/>
+          </p:nvGrpSpPr>
+          <p:grpSpPr>
+            <a:xfrm>
+              <a:off x="158262" y="2839915"/>
+              <a:ext cx="11904784" cy="2831123"/>
+              <a:chOff x="158262" y="2839915"/>
+              <a:chExt cx="11904784" cy="2831123"/>
+            </a:xfrm>
+          </p:grpSpPr>
+          <p:sp>
+            <p:nvSpPr>
+              <p:cNvPr id="26" name="Rectangle 25"/>
+              <p:cNvSpPr/>
+              <p:nvPr/>
+            </p:nvSpPr>
+            <p:spPr>
+              <a:xfrm>
+                <a:off x="158262" y="2839915"/>
+                <a:ext cx="11904784" cy="2831123"/>
+              </a:xfrm>
+              <a:prstGeom prst="rect">
+                <a:avLst/>
+              </a:prstGeom>
+              <a:solidFill>
+                <a:schemeClr val="bg1"/>
+              </a:solidFill>
+              <a:ln>
+                <a:solidFill>
+                  <a:schemeClr val="tx1"/>
+                </a:solidFill>
+              </a:ln>
+            </p:spPr>
+            <p:style>
+              <a:lnRef idx="2">
+                <a:schemeClr val="accent1">
+                  <a:shade val="50000"/>
+                </a:schemeClr>
+              </a:lnRef>
+              <a:fillRef idx="1">
+                <a:schemeClr val="accent1"/>
+              </a:fillRef>
+              <a:effectRef idx="0">
+                <a:schemeClr val="accent1"/>
+              </a:effectRef>
+              <a:fontRef idx="minor">
+                <a:schemeClr val="lt1"/>
+              </a:fontRef>
+            </p:style>
+            <p:txBody>
+              <a:bodyPr rtlCol="0" anchor="ctr"/>
+              <a:lstStyle/>
+              <a:p>
+                <a:pPr algn="ctr"/>
+                <a:endParaRPr lang="en-US"/>
+              </a:p>
+            </p:txBody>
+          </p:sp>
+          <p:pic>
+            <p:nvPicPr>
+              <p:cNvPr id="27" name="Picture 26"/>
+              <p:cNvPicPr>
+                <a:picLocks noChangeAspect="1"/>
+              </p:cNvPicPr>
+              <p:nvPr/>
+            </p:nvPicPr>
+            <p:blipFill>
+              <a:blip r:embed="rId11">
+                <a:extLst>
+                  <a:ext uri="{28A0092B-C50C-407E-A947-70E740481C1C}">
+                    <a14:useLocalDpi xmlns:a14="http://schemas.microsoft.com/office/drawing/2010/main" val="0"/>
+                  </a:ext>
+                </a:extLst>
+              </a:blip>
+              <a:stretch>
+                <a:fillRect/>
+              </a:stretch>
+            </p:blipFill>
+            <p:spPr>
+              <a:xfrm>
+                <a:off x="318463" y="2948917"/>
+                <a:ext cx="11601656" cy="2563363"/>
+              </a:xfrm>
+              <a:prstGeom prst="rect">
+                <a:avLst/>
+              </a:prstGeom>
+            </p:spPr>
+          </p:pic>
+        </p:grpSp>
+        <p:grpSp>
+          <p:nvGrpSpPr>
+            <p:cNvPr id="20" name="Group 19"/>
+            <p:cNvGrpSpPr/>
+            <p:nvPr/>
+          </p:nvGrpSpPr>
+          <p:grpSpPr>
+            <a:xfrm>
+              <a:off x="641874" y="2977740"/>
+              <a:ext cx="3912872" cy="2496851"/>
+              <a:chOff x="641874" y="2977740"/>
+              <a:chExt cx="3912872" cy="2496851"/>
+            </a:xfrm>
+          </p:grpSpPr>
+          <p:sp>
+            <p:nvSpPr>
+              <p:cNvPr id="21" name="TextBox 20"/>
+              <p:cNvSpPr txBox="1"/>
+              <p:nvPr/>
+            </p:nvSpPr>
+            <p:spPr>
+              <a:xfrm>
+                <a:off x="2122099" y="2977740"/>
+                <a:ext cx="914400" cy="769441"/>
+              </a:xfrm>
+              <a:prstGeom prst="rect">
+                <a:avLst/>
+              </a:prstGeom>
+              <a:solidFill>
+                <a:schemeClr val="bg1"/>
+              </a:solidFill>
+              <a:ln>
+                <a:solidFill>
+                  <a:schemeClr val="bg1"/>
+                </a:solidFill>
+              </a:ln>
+            </p:spPr>
+            <p:txBody>
+              <a:bodyPr wrap="square" rtlCol="0">
+                <a:spAutoFit/>
+              </a:bodyPr>
+              <a:lstStyle/>
+              <a:p>
+                <a:endParaRPr lang="en-US" sz="1100" dirty="0" smtClean="0">
+                  <a:latin typeface="Arial" panose="020B0604020202020204" pitchFamily="34" charset="0"/>
+                  <a:cs typeface="Arial" panose="020B0604020202020204" pitchFamily="34" charset="0"/>
+                </a:endParaRPr>
+              </a:p>
+              <a:p>
+                <a:r>
+                  <a:rPr lang="en-US" sz="1100" dirty="0" smtClean="0">
+                    <a:latin typeface="Arial" panose="020B0604020202020204" pitchFamily="34" charset="0"/>
+                    <a:cs typeface="Arial" panose="020B0604020202020204" pitchFamily="34" charset="0"/>
+                  </a:rPr>
+                  <a:t>Inverse Leg Kinematics</a:t>
+                </a:r>
+              </a:p>
+              <a:p>
+                <a:endParaRPr lang="en-US" sz="1100" dirty="0">
+                  <a:latin typeface="Arial" panose="020B0604020202020204" pitchFamily="34" charset="0"/>
+                  <a:cs typeface="Arial" panose="020B0604020202020204" pitchFamily="34" charset="0"/>
+                </a:endParaRPr>
+              </a:p>
+            </p:txBody>
+          </p:sp>
+          <p:sp>
+            <p:nvSpPr>
+              <p:cNvPr id="22" name="TextBox 21"/>
+              <p:cNvSpPr txBox="1"/>
+              <p:nvPr/>
+            </p:nvSpPr>
+            <p:spPr>
+              <a:xfrm>
+                <a:off x="1699404" y="4696524"/>
+                <a:ext cx="983412" cy="769441"/>
+              </a:xfrm>
+              <a:prstGeom prst="rect">
+                <a:avLst/>
+              </a:prstGeom>
+              <a:solidFill>
+                <a:schemeClr val="bg1"/>
+              </a:solidFill>
+              <a:ln>
+                <a:solidFill>
+                  <a:schemeClr val="bg1"/>
+                </a:solidFill>
+              </a:ln>
+            </p:spPr>
+            <p:txBody>
+              <a:bodyPr wrap="square" rtlCol="0">
+                <a:spAutoFit/>
+              </a:bodyPr>
+              <a:lstStyle/>
+              <a:p>
+                <a:endParaRPr lang="en-US" sz="1100" dirty="0" smtClean="0">
+                  <a:latin typeface="Arial" panose="020B0604020202020204" pitchFamily="34" charset="0"/>
+                  <a:cs typeface="Arial" panose="020B0604020202020204" pitchFamily="34" charset="0"/>
+                </a:endParaRPr>
+              </a:p>
+              <a:p>
+                <a:r>
+                  <a:rPr lang="en-US" sz="1100" dirty="0" smtClean="0">
+                    <a:latin typeface="Arial" panose="020B0604020202020204" pitchFamily="34" charset="0"/>
+                    <a:cs typeface="Arial" panose="020B0604020202020204" pitchFamily="34" charset="0"/>
+                  </a:rPr>
+                  <a:t>Forward Leg Kinematics</a:t>
+                </a:r>
+              </a:p>
+              <a:p>
+                <a:endParaRPr lang="en-US" sz="1100" dirty="0">
+                  <a:latin typeface="Arial" panose="020B0604020202020204" pitchFamily="34" charset="0"/>
+                  <a:cs typeface="Arial" panose="020B0604020202020204" pitchFamily="34" charset="0"/>
+                </a:endParaRPr>
+              </a:p>
+            </p:txBody>
+          </p:sp>
+          <p:sp>
+            <p:nvSpPr>
+              <p:cNvPr id="23" name="TextBox 22"/>
+              <p:cNvSpPr txBox="1"/>
+              <p:nvPr/>
+            </p:nvSpPr>
+            <p:spPr>
+              <a:xfrm>
+                <a:off x="3579961" y="2977740"/>
+                <a:ext cx="974785" cy="769441"/>
+              </a:xfrm>
+              <a:prstGeom prst="rect">
+                <a:avLst/>
+              </a:prstGeom>
+              <a:solidFill>
+                <a:schemeClr val="bg1"/>
+              </a:solidFill>
+              <a:ln>
+                <a:solidFill>
+                  <a:schemeClr val="bg1"/>
+                </a:solidFill>
+              </a:ln>
+            </p:spPr>
+            <p:txBody>
+              <a:bodyPr wrap="square" rtlCol="0">
+                <a:spAutoFit/>
+              </a:bodyPr>
+              <a:lstStyle/>
+              <a:p>
+                <a:r>
+                  <a:rPr lang="en-US" sz="1100" dirty="0" smtClean="0">
+                    <a:latin typeface="Arial" panose="020B0604020202020204" pitchFamily="34" charset="0"/>
+                    <a:cs typeface="Arial" panose="020B0604020202020204" pitchFamily="34" charset="0"/>
+                  </a:rPr>
+                  <a:t>Angle to Cylinder Length</a:t>
+                </a:r>
+              </a:p>
+              <a:p>
+                <a:endParaRPr lang="en-US" sz="1100" dirty="0">
+                  <a:latin typeface="Arial" panose="020B0604020202020204" pitchFamily="34" charset="0"/>
+                  <a:cs typeface="Arial" panose="020B0604020202020204" pitchFamily="34" charset="0"/>
+                </a:endParaRPr>
+              </a:p>
+            </p:txBody>
+          </p:sp>
+          <p:sp>
+            <p:nvSpPr>
+              <p:cNvPr id="24" name="TextBox 23"/>
+              <p:cNvSpPr txBox="1"/>
+              <p:nvPr/>
+            </p:nvSpPr>
+            <p:spPr>
+              <a:xfrm>
+                <a:off x="3441939" y="4705150"/>
+                <a:ext cx="974784" cy="769441"/>
+              </a:xfrm>
+              <a:prstGeom prst="rect">
+                <a:avLst/>
+              </a:prstGeom>
+              <a:solidFill>
+                <a:schemeClr val="bg1"/>
+              </a:solidFill>
+              <a:ln>
+                <a:solidFill>
+                  <a:schemeClr val="bg1"/>
+                </a:solidFill>
+              </a:ln>
+            </p:spPr>
+            <p:txBody>
+              <a:bodyPr wrap="square" rtlCol="0">
+                <a:spAutoFit/>
+              </a:bodyPr>
+              <a:lstStyle/>
+              <a:p>
+                <a:r>
+                  <a:rPr lang="en-US" sz="1100" dirty="0" smtClean="0">
+                    <a:latin typeface="Arial" panose="020B0604020202020204" pitchFamily="34" charset="0"/>
+                    <a:cs typeface="Arial" panose="020B0604020202020204" pitchFamily="34" charset="0"/>
+                  </a:rPr>
+                  <a:t>Cylinder Length to Angle</a:t>
+                </a:r>
+              </a:p>
+              <a:p>
+                <a:endParaRPr lang="en-US" sz="1100" dirty="0">
+                  <a:latin typeface="Arial" panose="020B0604020202020204" pitchFamily="34" charset="0"/>
+                  <a:cs typeface="Arial" panose="020B0604020202020204" pitchFamily="34" charset="0"/>
+                </a:endParaRPr>
+              </a:p>
+            </p:txBody>
+          </p:sp>
+          <p:sp>
+            <p:nvSpPr>
+              <p:cNvPr id="25" name="TextBox 24"/>
+              <p:cNvSpPr txBox="1"/>
+              <p:nvPr/>
+            </p:nvSpPr>
+            <p:spPr>
+              <a:xfrm>
+                <a:off x="641874" y="2977740"/>
+                <a:ext cx="999077" cy="769441"/>
+              </a:xfrm>
+              <a:prstGeom prst="rect">
+                <a:avLst/>
+              </a:prstGeom>
+              <a:solidFill>
+                <a:schemeClr val="bg1"/>
+              </a:solidFill>
+              <a:ln>
+                <a:solidFill>
+                  <a:schemeClr val="bg1"/>
+                </a:solidFill>
+              </a:ln>
+            </p:spPr>
+            <p:txBody>
+              <a:bodyPr wrap="square" rtlCol="0">
+                <a:spAutoFit/>
+              </a:bodyPr>
+              <a:lstStyle/>
+              <a:p>
+                <a:r>
+                  <a:rPr lang="en-US" sz="1100" dirty="0" smtClean="0">
+                    <a:latin typeface="Arial" panose="020B0604020202020204" pitchFamily="34" charset="0"/>
+                    <a:cs typeface="Arial" panose="020B0604020202020204" pitchFamily="34" charset="0"/>
+                  </a:rPr>
+                  <a:t>Desired Foot Position</a:t>
+                </a:r>
+                <a:endParaRPr lang="en-US" sz="1100" dirty="0">
+                  <a:latin typeface="Arial" panose="020B0604020202020204" pitchFamily="34" charset="0"/>
+                  <a:cs typeface="Arial" panose="020B0604020202020204" pitchFamily="34" charset="0"/>
+                </a:endParaRPr>
+              </a:p>
+              <a:p>
+                <a:r>
+                  <a:rPr lang="en-US" sz="1100" dirty="0" smtClean="0">
+                    <a:latin typeface="Arial" panose="020B0604020202020204" pitchFamily="34" charset="0"/>
+                    <a:cs typeface="Arial" panose="020B0604020202020204" pitchFamily="34" charset="0"/>
+                  </a:rPr>
+                  <a:t>Set by State Machine</a:t>
+                </a:r>
+                <a:endParaRPr lang="en-US" sz="1100" dirty="0">
+                  <a:latin typeface="Arial" panose="020B0604020202020204" pitchFamily="34" charset="0"/>
+                  <a:cs typeface="Arial" panose="020B0604020202020204" pitchFamily="34" charset="0"/>
+                </a:endParaRPr>
+              </a:p>
+            </p:txBody>
+          </p:sp>
+        </p:grpSp>
+      </p:grpSp>
+      <p:sp>
+        <p:nvSpPr>
+          <p:cNvPr id="28" name="TextBox 27"/>
+          <p:cNvSpPr txBox="1"/>
+          <p:nvPr/>
+        </p:nvSpPr>
+        <p:spPr>
+          <a:xfrm>
+            <a:off x="23107211" y="3886200"/>
+            <a:ext cx="9525000" cy="523220"/>
+          </a:xfrm>
+          <a:prstGeom prst="rect">
+            <a:avLst/>
+          </a:prstGeom>
+          <a:noFill/>
+        </p:spPr>
+        <p:txBody>
+          <a:bodyPr wrap="square" rtlCol="0">
+            <a:spAutoFit/>
+          </a:bodyPr>
+          <a:lstStyle/>
+          <a:p>
+            <a:r>
+              <a:rPr lang="en-US" sz="2800" b="1" dirty="0" smtClean="0"/>
+              <a:t>Control System</a:t>
+            </a:r>
+            <a:endParaRPr lang="en-US" sz="2000" dirty="0"/>
+          </a:p>
+        </p:txBody>
+      </p:sp>
+      <p:sp>
+        <p:nvSpPr>
+          <p:cNvPr id="4" name="TextBox 3"/>
+          <p:cNvSpPr txBox="1"/>
+          <p:nvPr/>
+        </p:nvSpPr>
+        <p:spPr>
+          <a:xfrm>
+            <a:off x="10127150" y="-31224"/>
+            <a:ext cx="13792200" cy="3631763"/>
+          </a:xfrm>
+          <a:prstGeom prst="rect">
+            <a:avLst/>
+          </a:prstGeom>
+          <a:noFill/>
+        </p:spPr>
+        <p:txBody>
+          <a:bodyPr wrap="square" rtlCol="0">
+            <a:spAutoFit/>
+          </a:bodyPr>
+          <a:lstStyle/>
+          <a:p>
+            <a:r>
+              <a:rPr lang="en-US" sz="5400" b="1" dirty="0"/>
+              <a:t>Development of an Agile Educational Robot</a:t>
+            </a:r>
+            <a:endParaRPr lang="en-US" sz="5400" dirty="0"/>
+          </a:p>
+          <a:p>
+            <a:pPr algn="ctr"/>
+            <a:r>
+              <a:rPr lang="en-US" sz="4800" dirty="0"/>
+              <a:t>Team A.R.C</a:t>
+            </a:r>
+            <a:r>
+              <a:rPr lang="en-US" sz="4800" dirty="0" smtClean="0"/>
+              <a:t>.</a:t>
+            </a:r>
+          </a:p>
+          <a:p>
+            <a:pPr algn="ctr"/>
+            <a:r>
+              <a:rPr lang="en-US" sz="2000" dirty="0"/>
+              <a:t>Logan Beaver</a:t>
+            </a:r>
+          </a:p>
+          <a:p>
+            <a:pPr algn="ctr"/>
+            <a:r>
+              <a:rPr lang="en-US" sz="2000" dirty="0"/>
+              <a:t>Justin Campbell</a:t>
+            </a:r>
+          </a:p>
+          <a:p>
+            <a:pPr algn="ctr"/>
+            <a:r>
+              <a:rPr lang="en-US" sz="2000" dirty="0"/>
+              <a:t>Tyler Paddock</a:t>
+            </a:r>
+          </a:p>
+          <a:p>
+            <a:pPr algn="ctr"/>
+            <a:r>
+              <a:rPr lang="en-US" sz="2000" dirty="0"/>
+              <a:t>Ronald Shipman</a:t>
+            </a:r>
+          </a:p>
+          <a:p>
+            <a:pPr algn="ctr"/>
+            <a:endParaRPr lang="en-US" sz="4800" dirty="0"/>
+          </a:p>
+        </p:txBody>
+      </p:sp>
+      <p:sp>
+        <p:nvSpPr>
+          <p:cNvPr id="30" name="TextBox 29"/>
+          <p:cNvSpPr txBox="1"/>
+          <p:nvPr/>
+        </p:nvSpPr>
+        <p:spPr>
+          <a:xfrm>
+            <a:off x="762000" y="1584603"/>
+            <a:ext cx="1826474" cy="400110"/>
+          </a:xfrm>
+          <a:prstGeom prst="rect">
+            <a:avLst/>
+          </a:prstGeom>
+          <a:noFill/>
+        </p:spPr>
+        <p:txBody>
+          <a:bodyPr wrap="square" rtlCol="0">
+            <a:spAutoFit/>
+          </a:bodyPr>
+          <a:lstStyle/>
+          <a:p>
+            <a:r>
+              <a:rPr lang="en-US" sz="2000" dirty="0" smtClean="0"/>
+              <a:t>Spring, 2015</a:t>
+            </a:r>
+            <a:endParaRPr lang="en-US" sz="2000" dirty="0"/>
+          </a:p>
+        </p:txBody>
+      </p:sp>
+      <p:sp>
+        <p:nvSpPr>
+          <p:cNvPr id="31" name="TextBox 30"/>
+          <p:cNvSpPr txBox="1"/>
+          <p:nvPr/>
+        </p:nvSpPr>
+        <p:spPr>
+          <a:xfrm>
+            <a:off x="27227791" y="26140247"/>
+            <a:ext cx="8124224" cy="1815882"/>
+          </a:xfrm>
+          <a:prstGeom prst="rect">
+            <a:avLst/>
+          </a:prstGeom>
+          <a:noFill/>
+        </p:spPr>
+        <p:txBody>
+          <a:bodyPr wrap="square" rtlCol="0">
+            <a:spAutoFit/>
+          </a:bodyPr>
+          <a:lstStyle/>
+          <a:p>
+            <a:r>
+              <a:rPr lang="en-US" sz="2800" b="1" dirty="0" smtClean="0"/>
+              <a:t>Acknowledgements</a:t>
+            </a:r>
+          </a:p>
+          <a:p>
+            <a:r>
+              <a:rPr lang="en-US" sz="2800" i="1" dirty="0" smtClean="0"/>
+              <a:t>Special thanks to Joy Global, Inc., the National Fluid Power Association, Emerson and  Dr. Luis A. Rodriguez for their support</a:t>
+            </a:r>
+            <a:endParaRPr lang="en-US" sz="2800" i="1" dirty="0"/>
+          </a:p>
+        </p:txBody>
+      </p:sp>
+      <p:sp>
+        <p:nvSpPr>
+          <p:cNvPr id="33" name="TextBox 32"/>
+          <p:cNvSpPr txBox="1"/>
+          <p:nvPr/>
+        </p:nvSpPr>
+        <p:spPr>
+          <a:xfrm>
+            <a:off x="300847" y="17983200"/>
+            <a:ext cx="9525000" cy="830997"/>
+          </a:xfrm>
+          <a:prstGeom prst="rect">
+            <a:avLst/>
+          </a:prstGeom>
+          <a:noFill/>
+        </p:spPr>
+        <p:txBody>
+          <a:bodyPr wrap="square" rtlCol="0">
+            <a:spAutoFit/>
+          </a:bodyPr>
+          <a:lstStyle/>
+          <a:p>
+            <a:r>
+              <a:rPr lang="en-US" sz="2800" b="1" dirty="0" smtClean="0"/>
+              <a:t>Electrical Design</a:t>
+            </a:r>
+          </a:p>
+          <a:p>
+            <a:endParaRPr lang="en-US" sz="2000" dirty="0"/>
+          </a:p>
+        </p:txBody>
+      </p:sp>
+      <p:pic>
+        <p:nvPicPr>
+          <p:cNvPr id="34" name="Content Placeholder 3"/>
+          <p:cNvPicPr>
+            <a:picLocks noChangeAspect="1"/>
+          </p:cNvPicPr>
+          <p:nvPr/>
+        </p:nvPicPr>
+        <p:blipFill>
+          <a:blip r:embed="rId12"/>
+          <a:stretch>
+            <a:fillRect/>
+          </a:stretch>
+        </p:blipFill>
+        <p:spPr>
+          <a:xfrm>
+            <a:off x="27311472" y="7990357"/>
+            <a:ext cx="7942105" cy="4351338"/>
+          </a:xfrm>
+          <a:prstGeom prst="rect">
+            <a:avLst/>
+          </a:prstGeom>
+        </p:spPr>
+      </p:pic>
+      <p:pic>
+        <p:nvPicPr>
+          <p:cNvPr id="35" name="Content Placeholder 3"/>
+          <p:cNvPicPr>
+            <a:picLocks noChangeAspect="1"/>
+          </p:cNvPicPr>
+          <p:nvPr/>
+        </p:nvPicPr>
+        <p:blipFill>
+          <a:blip r:embed="rId13">
+            <a:extLst>
+              <a:ext uri="{28A0092B-C50C-407E-A947-70E740481C1C}">
+                <a14:useLocalDpi xmlns:a14="http://schemas.microsoft.com/office/drawing/2010/main" val="0"/>
+              </a:ext>
+            </a:extLst>
+          </a:blip>
+          <a:stretch>
+            <a:fillRect/>
+          </a:stretch>
+        </p:blipFill>
+        <p:spPr>
+          <a:xfrm>
+            <a:off x="453247" y="23964578"/>
+            <a:ext cx="6457020" cy="4351338"/>
+          </a:xfrm>
+          <a:prstGeom prst="rect">
+            <a:avLst/>
+          </a:prstGeom>
+        </p:spPr>
+      </p:pic>
+      <p:pic>
+        <p:nvPicPr>
+          <p:cNvPr id="36" name="Picture 35"/>
+          <p:cNvPicPr/>
+          <p:nvPr/>
+        </p:nvPicPr>
+        <p:blipFill>
+          <a:blip r:embed="rId14" cstate="print">
+            <a:extLst>
+              <a:ext uri="{28A0092B-C50C-407E-A947-70E740481C1C}">
+                <a14:useLocalDpi xmlns:a14="http://schemas.microsoft.com/office/drawing/2010/main" val="0"/>
+              </a:ext>
+            </a:extLst>
+          </a:blip>
+          <a:stretch>
+            <a:fillRect/>
+          </a:stretch>
+        </p:blipFill>
+        <p:spPr>
+          <a:xfrm>
+            <a:off x="515861" y="20726400"/>
+            <a:ext cx="5943600" cy="2583815"/>
+          </a:xfrm>
+          <a:prstGeom prst="rect">
+            <a:avLst/>
+          </a:prstGeom>
         </p:spPr>
       </p:pic>
     </p:spTree>

</xml_diff>

<commit_message>
Senior Design Show Poster Updated
Electrical Section FLushed Out (Probably too long)

Still need pictures

Communication System Section renamed Human Machine Interface Section.
Brief description added.
</commit_message>
<xml_diff>
--- a/Documentation/Design Show Poster/Senior Design Show Poster.pptx
+++ b/Documentation/Design Show Poster/Senior Design Show Poster.pptx
@@ -304,7 +304,7 @@
           <a:p>
             <a:fld id="{08F7D037-1E52-45C7-976A-93EFD4975647}" type="datetimeFigureOut">
               <a:rPr lang="en-US" smtClean="0"/>
-              <a:t>5/12/2015</a:t>
+              <a:t>5/14/2015</a:t>
             </a:fld>
             <a:endParaRPr lang="en-US"/>
           </a:p>
@@ -474,7 +474,7 @@
           <a:p>
             <a:fld id="{08F7D037-1E52-45C7-976A-93EFD4975647}" type="datetimeFigureOut">
               <a:rPr lang="en-US" smtClean="0"/>
-              <a:t>5/12/2015</a:t>
+              <a:t>5/14/2015</a:t>
             </a:fld>
             <a:endParaRPr lang="en-US"/>
           </a:p>
@@ -654,7 +654,7 @@
           <a:p>
             <a:fld id="{08F7D037-1E52-45C7-976A-93EFD4975647}" type="datetimeFigureOut">
               <a:rPr lang="en-US" smtClean="0"/>
-              <a:t>5/12/2015</a:t>
+              <a:t>5/14/2015</a:t>
             </a:fld>
             <a:endParaRPr lang="en-US"/>
           </a:p>
@@ -824,7 +824,7 @@
           <a:p>
             <a:fld id="{08F7D037-1E52-45C7-976A-93EFD4975647}" type="datetimeFigureOut">
               <a:rPr lang="en-US" smtClean="0"/>
-              <a:t>5/12/2015</a:t>
+              <a:t>5/14/2015</a:t>
             </a:fld>
             <a:endParaRPr lang="en-US"/>
           </a:p>
@@ -1070,7 +1070,7 @@
           <a:p>
             <a:fld id="{08F7D037-1E52-45C7-976A-93EFD4975647}" type="datetimeFigureOut">
               <a:rPr lang="en-US" smtClean="0"/>
-              <a:t>5/12/2015</a:t>
+              <a:t>5/14/2015</a:t>
             </a:fld>
             <a:endParaRPr lang="en-US"/>
           </a:p>
@@ -1358,7 +1358,7 @@
           <a:p>
             <a:fld id="{08F7D037-1E52-45C7-976A-93EFD4975647}" type="datetimeFigureOut">
               <a:rPr lang="en-US" smtClean="0"/>
-              <a:t>5/12/2015</a:t>
+              <a:t>5/14/2015</a:t>
             </a:fld>
             <a:endParaRPr lang="en-US"/>
           </a:p>
@@ -1785,7 +1785,7 @@
           <a:p>
             <a:fld id="{08F7D037-1E52-45C7-976A-93EFD4975647}" type="datetimeFigureOut">
               <a:rPr lang="en-US" smtClean="0"/>
-              <a:t>5/12/2015</a:t>
+              <a:t>5/14/2015</a:t>
             </a:fld>
             <a:endParaRPr lang="en-US"/>
           </a:p>
@@ -1903,7 +1903,7 @@
           <a:p>
             <a:fld id="{08F7D037-1E52-45C7-976A-93EFD4975647}" type="datetimeFigureOut">
               <a:rPr lang="en-US" smtClean="0"/>
-              <a:t>5/12/2015</a:t>
+              <a:t>5/14/2015</a:t>
             </a:fld>
             <a:endParaRPr lang="en-US"/>
           </a:p>
@@ -1998,7 +1998,7 @@
           <a:p>
             <a:fld id="{08F7D037-1E52-45C7-976A-93EFD4975647}" type="datetimeFigureOut">
               <a:rPr lang="en-US" smtClean="0"/>
-              <a:t>5/12/2015</a:t>
+              <a:t>5/14/2015</a:t>
             </a:fld>
             <a:endParaRPr lang="en-US"/>
           </a:p>
@@ -2275,7 +2275,7 @@
           <a:p>
             <a:fld id="{08F7D037-1E52-45C7-976A-93EFD4975647}" type="datetimeFigureOut">
               <a:rPr lang="en-US" smtClean="0"/>
-              <a:t>5/12/2015</a:t>
+              <a:t>5/14/2015</a:t>
             </a:fld>
             <a:endParaRPr lang="en-US"/>
           </a:p>
@@ -2528,7 +2528,7 @@
           <a:p>
             <a:fld id="{08F7D037-1E52-45C7-976A-93EFD4975647}" type="datetimeFigureOut">
               <a:rPr lang="en-US" smtClean="0"/>
-              <a:t>5/12/2015</a:t>
+              <a:t>5/14/2015</a:t>
             </a:fld>
             <a:endParaRPr lang="en-US"/>
           </a:p>
@@ -2741,7 +2741,7 @@
           <a:p>
             <a:fld id="{08F7D037-1E52-45C7-976A-93EFD4975647}" type="datetimeFigureOut">
               <a:rPr lang="en-US" smtClean="0"/>
-              <a:t>5/12/2015</a:t>
+              <a:t>5/14/2015</a:t>
             </a:fld>
             <a:endParaRPr lang="en-US"/>
           </a:p>
@@ -3343,7 +3343,7 @@
         <p:spPr>
           <a:xfrm>
             <a:off x="11201400" y="3886200"/>
-            <a:ext cx="9525000" cy="4524315"/>
+            <a:ext cx="9525000" cy="4585871"/>
           </a:xfrm>
           <a:prstGeom prst="rect">
             <a:avLst/>
@@ -3358,7 +3358,7 @@
           <a:p>
             <a:pPr lvl="0"/>
             <a:r>
-              <a:rPr lang="en-US" sz="2800" b="1" dirty="0" smtClean="0"/>
+              <a:rPr lang="en-US" sz="3200" b="1" dirty="0" smtClean="0"/>
               <a:t>Design Constraints/Criteria</a:t>
             </a:r>
           </a:p>
@@ -3459,8 +3459,8 @@
         </p:nvSpPr>
         <p:spPr>
           <a:xfrm>
-            <a:off x="453247" y="3886200"/>
-            <a:ext cx="9525000" cy="2985433"/>
+            <a:off x="515861" y="4015554"/>
+            <a:ext cx="9525000" cy="3046988"/>
           </a:xfrm>
           <a:prstGeom prst="rect">
             <a:avLst/>
@@ -3475,7 +3475,7 @@
           <a:p>
             <a:pPr lvl="0"/>
             <a:r>
-              <a:rPr lang="en-US" sz="2800" b="1" dirty="0" smtClean="0"/>
+              <a:rPr lang="en-US" sz="3200" b="1" dirty="0" smtClean="0"/>
               <a:t>Problem Statement</a:t>
             </a:r>
           </a:p>
@@ -3499,7 +3499,7 @@
         <p:spPr>
           <a:xfrm>
             <a:off x="515861" y="7645122"/>
-            <a:ext cx="9525000" cy="2369880"/>
+            <a:ext cx="9525000" cy="2431435"/>
           </a:xfrm>
           <a:prstGeom prst="rect">
             <a:avLst/>
@@ -3513,7 +3513,7 @@
           <a:lstStyle/>
           <a:p>
             <a:r>
-              <a:rPr lang="en-US" sz="2800" b="1" dirty="0" smtClean="0"/>
+              <a:rPr lang="en-US" sz="3200" b="1" dirty="0" smtClean="0"/>
               <a:t>Mechanical Design</a:t>
             </a:r>
           </a:p>
@@ -3702,7 +3702,7 @@
         <p:spPr>
           <a:xfrm>
             <a:off x="11216640" y="8469510"/>
-            <a:ext cx="9525000" cy="4339650"/>
+            <a:ext cx="9525000" cy="4401205"/>
           </a:xfrm>
           <a:prstGeom prst="rect">
             <a:avLst/>
@@ -3716,7 +3716,7 @@
           <a:lstStyle/>
           <a:p>
             <a:r>
-              <a:rPr lang="en-US" sz="2800" b="1" dirty="0" smtClean="0"/>
+              <a:rPr lang="en-US" sz="3200" b="1" dirty="0" smtClean="0"/>
               <a:t>Pneumatic Design</a:t>
             </a:r>
           </a:p>
@@ -3886,8 +3886,8 @@
         </p:nvSpPr>
         <p:spPr>
           <a:xfrm>
-            <a:off x="23107211" y="3886200"/>
-            <a:ext cx="9525000" cy="2062103"/>
+            <a:off x="23084207" y="3533402"/>
+            <a:ext cx="9525000" cy="3724096"/>
           </a:xfrm>
           <a:prstGeom prst="rect">
             <a:avLst/>
@@ -3901,24 +3901,43 @@
           <a:lstStyle/>
           <a:p>
             <a:r>
-              <a:rPr lang="en-US" sz="2800" b="1" dirty="0" smtClean="0"/>
-              <a:t>User Control</a:t>
-            </a:r>
-          </a:p>
-          <a:p>
-            <a:pPr marL="342900" indent="-342900">
-              <a:buFont typeface="Arial" panose="020B0604020202020204" pitchFamily="34" charset="0"/>
-              <a:buChar char="•"/>
+              <a:rPr lang="en-US" sz="3200" b="1" dirty="0" smtClean="0"/>
+              <a:t>Human Machine Interface</a:t>
+            </a:r>
+          </a:p>
+          <a:p>
+            <a:r>
+              <a:rPr lang="en-US" sz="2000" dirty="0" smtClean="0"/>
+              <a:t>The user requests a direction of movement using a joy stick. The microcontroller onboard the robot receives the user’s request, but does not move until it is in a stable state and ready to accept another command.</a:t>
+            </a:r>
+          </a:p>
+          <a:p>
+            <a:endParaRPr lang="en-US" sz="2000" dirty="0" smtClean="0"/>
+          </a:p>
+          <a:p>
+            <a:r>
+              <a:rPr lang="en-US" sz="2400" b="1" dirty="0" smtClean="0"/>
+              <a:t>Sequence of Events in Sending a Command</a:t>
+            </a:r>
+          </a:p>
+          <a:p>
+            <a:pPr marL="457200" indent="-457200">
+              <a:buFont typeface="+mj-lt"/>
+              <a:buAutoNum type="arabicPeriod"/>
             </a:pPr>
             <a:r>
               <a:rPr lang="en-US" sz="2000" dirty="0" smtClean="0"/>
-              <a:t>User input is read by a USB controller</a:t>
-            </a:r>
-          </a:p>
-          <a:p>
-            <a:pPr marL="342900" indent="-342900">
-              <a:buFont typeface="Arial" panose="020B0604020202020204" pitchFamily="34" charset="0"/>
-              <a:buChar char="•"/>
+              <a:t>User </a:t>
+            </a:r>
+            <a:r>
+              <a:rPr lang="en-US" sz="2000" dirty="0" smtClean="0"/>
+              <a:t>input is read by a USB controller</a:t>
+            </a:r>
+          </a:p>
+          <a:p>
+            <a:pPr marL="457200" indent="-457200">
+              <a:buFont typeface="+mj-lt"/>
+              <a:buAutoNum type="arabicPeriod"/>
             </a:pPr>
             <a:r>
               <a:rPr lang="en-US" sz="2000" dirty="0" smtClean="0"/>
@@ -3926,9 +3945,9 @@
             </a:r>
           </a:p>
           <a:p>
-            <a:pPr marL="342900" indent="-342900">
-              <a:buFont typeface="Arial" panose="020B0604020202020204" pitchFamily="34" charset="0"/>
-              <a:buChar char="•"/>
+            <a:pPr marL="457200" indent="-457200">
+              <a:buFont typeface="+mj-lt"/>
+              <a:buAutoNum type="arabicPeriod"/>
             </a:pPr>
             <a:r>
               <a:rPr lang="en-US" sz="2000" dirty="0" smtClean="0"/>
@@ -3936,17 +3955,18 @@
             </a:r>
             <a:r>
               <a:rPr lang="en-US" sz="2000" dirty="0" err="1" smtClean="0"/>
-              <a:t>Xbee</a:t>
+              <a:t>XBee</a:t>
             </a:r>
             <a:r>
               <a:rPr lang="en-US" sz="2000" dirty="0" smtClean="0"/>
-              <a:t> wireless chip</a:t>
-            </a:r>
-          </a:p>
-          <a:p>
-            <a:pPr marL="342900" indent="-342900">
-              <a:buFont typeface="Arial" panose="020B0604020202020204" pitchFamily="34" charset="0"/>
-              <a:buChar char="•"/>
+              <a:t> radio module</a:t>
+            </a:r>
+            <a:endParaRPr lang="en-US" sz="2000" dirty="0" smtClean="0"/>
+          </a:p>
+          <a:p>
+            <a:pPr marL="457200" indent="-457200">
+              <a:buFont typeface="+mj-lt"/>
+              <a:buAutoNum type="arabicPeriod"/>
             </a:pPr>
             <a:r>
               <a:rPr lang="en-US" sz="2000" dirty="0" smtClean="0"/>
@@ -3954,21 +3974,34 @@
             </a:r>
             <a:r>
               <a:rPr lang="en-US" sz="2000" dirty="0" err="1" smtClean="0"/>
-              <a:t>Xbee</a:t>
+              <a:t>XBee</a:t>
             </a:r>
             <a:r>
               <a:rPr lang="en-US" sz="2000" dirty="0" smtClean="0"/>
-              <a:t> chip receives the command and sends it to the Arduino</a:t>
-            </a:r>
-          </a:p>
-          <a:p>
-            <a:pPr marL="342900" indent="-342900">
-              <a:buFont typeface="Arial" panose="020B0604020202020204" pitchFamily="34" charset="0"/>
-              <a:buChar char="•"/>
+              <a:t> </a:t>
+            </a:r>
+            <a:r>
+              <a:rPr lang="en-US" sz="2000" dirty="0" smtClean="0"/>
+              <a:t>chip receives the command and sends it to the </a:t>
+            </a:r>
+            <a:r>
+              <a:rPr lang="en-US" sz="2000" dirty="0" smtClean="0"/>
+              <a:t>Arduino microcontroller</a:t>
+            </a:r>
+            <a:endParaRPr lang="en-US" sz="2000" dirty="0" smtClean="0"/>
+          </a:p>
+          <a:p>
+            <a:pPr marL="457200" indent="-457200">
+              <a:buFont typeface="+mj-lt"/>
+              <a:buAutoNum type="arabicPeriod"/>
             </a:pPr>
             <a:r>
               <a:rPr lang="en-US" sz="2000" dirty="0" smtClean="0"/>
-              <a:t>Arduino decodes the serial command and adjusts the robot state accordingly</a:t>
+              <a:t>Arduino decodes the serial command </a:t>
+            </a:r>
+            <a:r>
+              <a:rPr lang="en-US" sz="2000" dirty="0" smtClean="0"/>
+              <a:t>executes an action accordingly</a:t>
             </a:r>
             <a:endParaRPr lang="en-US" sz="2000" dirty="0"/>
           </a:p>
@@ -4121,8 +4154,8 @@
         </p:nvSpPr>
         <p:spPr>
           <a:xfrm>
-            <a:off x="300847" y="17983200"/>
-            <a:ext cx="9525000" cy="830997"/>
+            <a:off x="300847" y="17979914"/>
+            <a:ext cx="9632507" cy="892552"/>
           </a:xfrm>
           <a:prstGeom prst="rect">
             <a:avLst/>
@@ -4136,7 +4169,7 @@
           <a:lstStyle/>
           <a:p>
             <a:r>
-              <a:rPr lang="en-US" sz="2800" b="1" dirty="0" smtClean="0"/>
+              <a:rPr lang="en-US" sz="3200" b="1" dirty="0" smtClean="0"/>
               <a:t>Electrical Design</a:t>
             </a:r>
           </a:p>
@@ -4145,64 +4178,6 @@
           </a:p>
         </p:txBody>
       </p:sp>
-      <p:pic>
-        <p:nvPicPr>
-          <p:cNvPr id="35" name="Content Placeholder 3"/>
-          <p:cNvPicPr>
-            <a:picLocks noChangeAspect="1"/>
-          </p:cNvPicPr>
-          <p:nvPr/>
-        </p:nvPicPr>
-        <p:blipFill>
-          <a:blip r:embed="rId11">
-            <a:extLst>
-              <a:ext uri="{28A0092B-C50C-407E-A947-70E740481C1C}">
-                <a14:useLocalDpi xmlns:a14="http://schemas.microsoft.com/office/drawing/2010/main" val="0"/>
-              </a:ext>
-            </a:extLst>
-          </a:blip>
-          <a:stretch>
-            <a:fillRect/>
-          </a:stretch>
-        </p:blipFill>
-        <p:spPr>
-          <a:xfrm>
-            <a:off x="453247" y="23964578"/>
-            <a:ext cx="6457020" cy="4351338"/>
-          </a:xfrm>
-          <a:prstGeom prst="rect">
-            <a:avLst/>
-          </a:prstGeom>
-        </p:spPr>
-      </p:pic>
-      <p:pic>
-        <p:nvPicPr>
-          <p:cNvPr id="36" name="Picture 35"/>
-          <p:cNvPicPr/>
-          <p:nvPr/>
-        </p:nvPicPr>
-        <p:blipFill>
-          <a:blip r:embed="rId12" cstate="print">
-            <a:extLst>
-              <a:ext uri="{28A0092B-C50C-407E-A947-70E740481C1C}">
-                <a14:useLocalDpi xmlns:a14="http://schemas.microsoft.com/office/drawing/2010/main" val="0"/>
-              </a:ext>
-            </a:extLst>
-          </a:blip>
-          <a:stretch>
-            <a:fillRect/>
-          </a:stretch>
-        </p:blipFill>
-        <p:spPr>
-          <a:xfrm>
-            <a:off x="515861" y="20726400"/>
-            <a:ext cx="5943600" cy="2583815"/>
-          </a:xfrm>
-          <a:prstGeom prst="rect">
-            <a:avLst/>
-          </a:prstGeom>
-        </p:spPr>
-      </p:pic>
       <p:sp>
         <p:nvSpPr>
           <p:cNvPr id="99" name="TextBox 98"/>
@@ -4211,8 +4186,8 @@
         </p:nvSpPr>
         <p:spPr>
           <a:xfrm>
-            <a:off x="23107211" y="8953157"/>
-            <a:ext cx="9525000" cy="1754326"/>
+            <a:off x="23233523" y="10906222"/>
+            <a:ext cx="9525000" cy="1815882"/>
           </a:xfrm>
           <a:prstGeom prst="rect">
             <a:avLst/>
@@ -4226,9 +4201,14 @@
           <a:lstStyle/>
           <a:p>
             <a:r>
-              <a:rPr lang="en-US" sz="2800" b="1" dirty="0" smtClean="0"/>
-              <a:t>Control System</a:t>
-            </a:r>
+              <a:rPr lang="en-US" sz="3200" b="1" dirty="0" smtClean="0"/>
+              <a:t>Control </a:t>
+            </a:r>
+            <a:r>
+              <a:rPr lang="en-US" sz="3200" b="1" dirty="0" smtClean="0"/>
+              <a:t>Architecture: Two Link Leg</a:t>
+            </a:r>
+            <a:endParaRPr lang="en-US" sz="3200" b="1" dirty="0" smtClean="0"/>
           </a:p>
           <a:p>
             <a:pPr marL="342900" indent="-342900">
@@ -4281,7 +4261,7 @@
         </p:nvGrpSpPr>
         <p:grpSpPr>
           <a:xfrm>
-            <a:off x="23698200" y="6233964"/>
+            <a:off x="23614523" y="7406123"/>
             <a:ext cx="8763000" cy="2223550"/>
             <a:chOff x="23698200" y="6233964"/>
             <a:chExt cx="8763000" cy="2223550"/>
@@ -5700,7 +5680,7 @@
                 <p:nvPr/>
               </p:nvPicPr>
               <p:blipFill rotWithShape="1">
-                <a:blip r:embed="rId13"/>
+                <a:blip r:embed="rId11"/>
                 <a:srcRect l="16517" t="5696" r="17632" b="12101"/>
                 <a:stretch/>
               </p:blipFill>
@@ -6471,7 +6451,19 @@
               <a:pPr algn="ctr"/>
               <a:r>
                 <a:rPr lang="en-US" sz="1600" dirty="0" smtClean="0"/>
-                <a:t>High Level System Communication Diagram</a:t>
+                <a:t>High </a:t>
+              </a:r>
+              <a:r>
+                <a:rPr lang="en-US" sz="1600" dirty="0" smtClean="0"/>
+                <a:t>Level </a:t>
+              </a:r>
+              <a:r>
+                <a:rPr lang="en-US" sz="1600" dirty="0" smtClean="0"/>
+                <a:t>Communication </a:t>
+              </a:r>
+              <a:r>
+                <a:rPr lang="en-US" sz="1600" dirty="0" smtClean="0"/>
+                <a:t>System Diagram</a:t>
               </a:r>
               <a:endParaRPr lang="en-US" sz="1600" dirty="0"/>
             </a:p>
@@ -6486,7 +6478,7 @@
         </p:nvGrpSpPr>
         <p:grpSpPr>
           <a:xfrm>
-            <a:off x="23670735" y="10834472"/>
+            <a:off x="23797047" y="12787537"/>
             <a:ext cx="7944709" cy="3383011"/>
             <a:chOff x="23670735" y="10834472"/>
             <a:chExt cx="7944709" cy="3383011"/>
@@ -6501,7 +6493,7 @@
             <p:nvPr/>
           </p:nvPicPr>
           <p:blipFill rotWithShape="1">
-            <a:blip r:embed="rId14"/>
+            <a:blip r:embed="rId12"/>
             <a:srcRect b="49539"/>
             <a:stretch/>
           </p:blipFill>
@@ -6524,7 +6516,7 @@
             <p:nvPr/>
           </p:nvPicPr>
           <p:blipFill rotWithShape="1">
-            <a:blip r:embed="rId14"/>
+            <a:blip r:embed="rId12"/>
             <a:srcRect t="72715"/>
             <a:stretch/>
           </p:blipFill>
@@ -6547,7 +6539,7 @@
         </p:nvSpPr>
         <p:spPr>
           <a:xfrm>
-            <a:off x="23260287" y="14013909"/>
+            <a:off x="23386599" y="15966974"/>
             <a:ext cx="8763000" cy="338554"/>
           </a:xfrm>
           <a:prstGeom prst="rect">
@@ -6564,9 +6556,80 @@
             <a:pPr algn="ctr"/>
             <a:r>
               <a:rPr lang="en-US" sz="1600" dirty="0" smtClean="0"/>
-              <a:t>PID Control subsystem for a single cylinder</a:t>
+              <a:t>Control </a:t>
+            </a:r>
+            <a:r>
+              <a:rPr lang="en-US" sz="1600" dirty="0"/>
+              <a:t>S</a:t>
+            </a:r>
+            <a:r>
+              <a:rPr lang="en-US" sz="1600" dirty="0" smtClean="0"/>
+              <a:t>ubsystem For a Single Leg</a:t>
             </a:r>
             <a:endParaRPr lang="en-US" sz="1600" dirty="0"/>
+          </a:p>
+        </p:txBody>
+      </p:sp>
+      <p:sp>
+        <p:nvSpPr>
+          <p:cNvPr id="19" name="TextBox 18"/>
+          <p:cNvSpPr txBox="1"/>
+          <p:nvPr/>
+        </p:nvSpPr>
+        <p:spPr>
+          <a:xfrm>
+            <a:off x="318432" y="18721159"/>
+            <a:ext cx="9740014" cy="6555641"/>
+          </a:xfrm>
+          <a:prstGeom prst="rect">
+            <a:avLst/>
+          </a:prstGeom>
+          <a:noFill/>
+        </p:spPr>
+        <p:txBody>
+          <a:bodyPr wrap="square" rtlCol="0">
+            <a:spAutoFit/>
+          </a:bodyPr>
+          <a:lstStyle/>
+          <a:p>
+            <a:r>
+              <a:rPr lang="en-US" sz="2000" dirty="0" smtClean="0"/>
+              <a:t>The electronics of the robot are separated into subsystems. The communication subsystem, microcontroller subsystem, motherboard subsystem, and debug panel subsystem. The communication subsystem interfaces a user controlled computer with the Arduino microcontroller using </a:t>
+            </a:r>
+            <a:r>
+              <a:rPr lang="en-US" sz="2000" dirty="0" err="1" smtClean="0"/>
+              <a:t>Xbee</a:t>
+            </a:r>
+            <a:r>
+              <a:rPr lang="en-US" sz="2000" dirty="0" smtClean="0"/>
+              <a:t> modules. The microcontroller subsystem includes the microcontroller, </a:t>
+            </a:r>
+            <a:r>
+              <a:rPr lang="en-US" sz="2000" dirty="0" err="1" smtClean="0"/>
+              <a:t>Xbee</a:t>
+            </a:r>
+            <a:r>
+              <a:rPr lang="en-US" sz="2000" dirty="0" smtClean="0"/>
+              <a:t> shield, and battery supply for the microcontroller. This microcontroller battery supply is implemented as a standard replaceable 9 volt battery. The motherboard subsystem handles to signal conditioning for the command and feedback signals.</a:t>
+            </a:r>
+          </a:p>
+          <a:p>
+            <a:endParaRPr lang="en-US" sz="2000" dirty="0" smtClean="0"/>
+          </a:p>
+          <a:p>
+            <a:r>
+              <a:rPr lang="en-US" sz="2000" dirty="0" smtClean="0"/>
+              <a:t>The microcontroller uses a pulse width modulated signal with a varying duty cycle to indicate an open or close command to each of the eight pneumatic valves. The motherboard’s signal conditioning hardware includes a third order active low pass filter to convert the pulse width modulated signal into an analog signal. This analog signal is then scaled by another amplifier circuit to the proper magnitude for the pneumatic valve. The current extension of the pneumatic cylinder is reported as feedback to the microcontroller. This feedback signal passes through an analog filter to scale down the voltage for the Arduino.</a:t>
+            </a:r>
+          </a:p>
+          <a:p>
+            <a:endParaRPr lang="en-US" sz="2000" dirty="0"/>
+          </a:p>
+          <a:p>
+            <a:r>
+              <a:rPr lang="en-US" sz="2000" dirty="0" smtClean="0"/>
+              <a:t>A debug panel is included to provide electrical access to the command and feedback signals to and from the pneumatic cylinder. Additionally the debug panel has a toggle switch for the microcontroller battery, status LEDs, battery level LEDs, and an emergency stop a higher power battery bank that powers the pneumatic valves.</a:t>
+            </a:r>
           </a:p>
         </p:txBody>
       </p:sp>

</xml_diff>

<commit_message>
Updated poster from meeting
</commit_message>
<xml_diff>
--- a/Documentation/Design Show Poster/Senior Design Show Poster.pptx
+++ b/Documentation/Design Show Poster/Senior Design Show Poster.pptx
@@ -106,7 +106,7 @@
   </p:defaultTextStyle>
   <p:extLst>
     <p:ext uri="{EFAFB233-063F-42B5-8137-9DF3F51BA10A}">
-      <p15:sldGuideLst xmlns:p15="http://schemas.microsoft.com/office/powerpoint/2012/main" xmlns="">
+      <p15:sldGuideLst xmlns:p15="http://schemas.microsoft.com/office/powerpoint/2012/main">
         <p15:guide id="1" orient="horz" pos="9216">
           <p15:clr>
             <a:srgbClr val="A4A3A4"/>
@@ -3124,7 +3124,7 @@
         </p:nvSpPr>
         <p:spPr>
           <a:xfrm>
-            <a:off x="11183442" y="3790124"/>
+            <a:off x="553824" y="9360834"/>
             <a:ext cx="9525000" cy="5632311"/>
           </a:xfrm>
           <a:prstGeom prst="rect">
@@ -3150,7 +3150,6 @@
               <a:rPr lang="en-US" sz="2000" b="1" dirty="0" smtClean="0"/>
               <a:t>Mechanical</a:t>
             </a:r>
-            <a:endParaRPr lang="en-US" sz="2000" b="1" dirty="0" smtClean="0"/>
           </a:p>
           <a:p>
             <a:pPr marL="342900" lvl="0" indent="-342900">
@@ -3241,7 +3240,6 @@
               <a:rPr lang="en-US" sz="2000" dirty="0" smtClean="0"/>
               <a:t>components</a:t>
             </a:r>
-            <a:endParaRPr lang="en-US" sz="2000" dirty="0" smtClean="0"/>
           </a:p>
           <a:p>
             <a:r>
@@ -3306,7 +3304,7 @@
         </p:nvSpPr>
         <p:spPr>
           <a:xfrm>
-            <a:off x="515861" y="4015554"/>
+            <a:off x="553824" y="3257398"/>
             <a:ext cx="9525000" cy="3354765"/>
           </a:xfrm>
           <a:prstGeom prst="rect">
@@ -3327,6 +3325,7 @@
             </a:r>
           </a:p>
           <a:p>
+            <a:pPr algn="just"/>
             <a:r>
               <a:rPr lang="en-US" sz="2000" dirty="0" smtClean="0"/>
               <a:t>Recently there has been a decline in interest and proficiency related to science, technology, engineering, and mathematics (STEM) fields. According to a 2013 survey by Junior Achievement USA, 46% of US teenagers showed interest in pursuing a STEM or medical related career, which was a 15% decrease from previous years. In addition there is a huge deficit of fluid power engineers in the United States with only 1% of Universities with engineering programs teaching a fluid power concentration. It has also been shown by a study conducted at the University of Nebraska that introducing students to topics in robotics not only improves their attitude towards STEM topics, but also increase their self-efficacy of topics within robotics.</a:t>
@@ -3343,7 +3342,7 @@
         </p:nvSpPr>
         <p:spPr>
           <a:xfrm>
-            <a:off x="484508" y="9563744"/>
+            <a:off x="626882" y="15324509"/>
             <a:ext cx="9525000" cy="2431435"/>
           </a:xfrm>
           <a:prstGeom prst="rect">
@@ -3359,13 +3358,8 @@
           <a:p>
             <a:r>
               <a:rPr lang="en-US" sz="3200" b="1" dirty="0" smtClean="0"/>
-              <a:t>Mechanical </a:t>
-            </a:r>
-            <a:r>
-              <a:rPr lang="en-US" sz="3200" b="1" dirty="0" smtClean="0"/>
-              <a:t>Design of Chassis</a:t>
-            </a:r>
-            <a:endParaRPr lang="en-US" sz="3200" b="1" dirty="0" smtClean="0"/>
+              <a:t>Mechanical Design of Chassis</a:t>
+            </a:r>
           </a:p>
           <a:p>
             <a:r>
@@ -3470,7 +3464,7 @@
         </p:nvGrpSpPr>
         <p:grpSpPr>
           <a:xfrm>
-            <a:off x="5580248" y="12157849"/>
+            <a:off x="2140814" y="18135867"/>
             <a:ext cx="5011552" cy="5634355"/>
             <a:chOff x="586740" y="13258800"/>
             <a:chExt cx="5943600" cy="6624955"/>
@@ -3551,7 +3545,7 @@
         </p:nvSpPr>
         <p:spPr>
           <a:xfrm>
-            <a:off x="11201400" y="9067052"/>
+            <a:off x="11088911" y="8688378"/>
             <a:ext cx="9525000" cy="4401205"/>
           </a:xfrm>
           <a:prstGeom prst="rect">
@@ -3567,13 +3561,8 @@
           <a:p>
             <a:r>
               <a:rPr lang="en-US" sz="3200" b="1" dirty="0" smtClean="0"/>
-              <a:t>Leg Pneumatic </a:t>
-            </a:r>
-            <a:r>
-              <a:rPr lang="en-US" sz="3200" b="1" dirty="0" smtClean="0"/>
-              <a:t>Circuit</a:t>
-            </a:r>
-            <a:endParaRPr lang="en-US" sz="3200" b="1" dirty="0" smtClean="0"/>
+              <a:t>Leg Pneumatic Circuit</a:t>
+            </a:r>
           </a:p>
           <a:p>
             <a:r>
@@ -3687,7 +3676,7 @@
         </p:blipFill>
         <p:spPr>
           <a:xfrm>
-            <a:off x="377001" y="12157849"/>
+            <a:off x="13934426" y="3802986"/>
             <a:ext cx="4888785" cy="4157169"/>
           </a:xfrm>
           <a:prstGeom prst="rect">
@@ -3708,8 +3697,8 @@
         </p:nvSpPr>
         <p:spPr>
           <a:xfrm>
-            <a:off x="8874369" y="135057"/>
-            <a:ext cx="16002450" cy="3631763"/>
+            <a:off x="8674258" y="247976"/>
+            <a:ext cx="18959279" cy="2985433"/>
           </a:xfrm>
           <a:prstGeom prst="rect">
             <a:avLst/>
@@ -3722,58 +3711,39 @@
           </a:bodyPr>
           <a:lstStyle/>
           <a:p>
-            <a:r>
-              <a:rPr lang="en-US" sz="5400" b="1" dirty="0"/>
+            <a:pPr algn="ctr"/>
+            <a:r>
+              <a:rPr lang="en-US" sz="6000" b="1" dirty="0"/>
               <a:t>Development of an </a:t>
             </a:r>
             <a:r>
-              <a:rPr lang="en-US" sz="5400" b="1" dirty="0" smtClean="0"/>
+              <a:rPr lang="en-US" sz="6000" b="1" dirty="0" smtClean="0"/>
               <a:t>Agile Pneumatic </a:t>
             </a:r>
             <a:r>
-              <a:rPr lang="en-US" sz="5400" b="1" dirty="0"/>
-              <a:t>Educational Robot</a:t>
-            </a:r>
-            <a:endParaRPr lang="en-US" sz="5400" dirty="0"/>
+              <a:rPr lang="en-US" sz="6000" b="1" dirty="0"/>
+              <a:t>Educational </a:t>
+            </a:r>
+            <a:r>
+              <a:rPr lang="en-US" sz="6000" b="1" dirty="0" smtClean="0"/>
+              <a:t>Robot</a:t>
+            </a:r>
+            <a:endParaRPr lang="en-US" sz="6000" dirty="0" smtClean="0"/>
           </a:p>
           <a:p>
             <a:pPr algn="ctr"/>
             <a:r>
-              <a:rPr lang="en-US" sz="4800" dirty="0"/>
-              <a:t>Team A.R.C</a:t>
-            </a:r>
-            <a:r>
-              <a:rPr lang="en-US" sz="4800" dirty="0" smtClean="0"/>
-              <a:t>.</a:t>
+              <a:rPr lang="en-US" sz="4000" dirty="0" smtClean="0"/>
+              <a:t>Team ARC: Logan Beaver, Justin Campbell, Tyler Paddock Ron Shipman</a:t>
             </a:r>
           </a:p>
           <a:p>
             <a:pPr algn="ctr"/>
             <a:r>
-              <a:rPr lang="en-US" sz="2000" dirty="0"/>
-              <a:t>Logan Beaver</a:t>
-            </a:r>
-          </a:p>
-          <a:p>
-            <a:pPr algn="ctr"/>
-            <a:r>
-              <a:rPr lang="en-US" sz="2000" dirty="0"/>
-              <a:t>Justin Campbell</a:t>
-            </a:r>
-          </a:p>
-          <a:p>
-            <a:pPr algn="ctr"/>
-            <a:r>
-              <a:rPr lang="en-US" sz="2000" dirty="0"/>
-              <a:t>Tyler Paddock</a:t>
-            </a:r>
-          </a:p>
-          <a:p>
-            <a:pPr algn="ctr"/>
-            <a:r>
-              <a:rPr lang="en-US" sz="2000" dirty="0"/>
-              <a:t>Ronald Shipman</a:t>
-            </a:r>
+              <a:rPr lang="en-US" sz="4000" dirty="0" smtClean="0"/>
+              <a:t>Milwaukee School of Engineering – Mechanical Engineering Department</a:t>
+            </a:r>
+            <a:endParaRPr lang="en-US" sz="4000" dirty="0"/>
           </a:p>
           <a:p>
             <a:pPr algn="ctr"/>
@@ -4021,11 +3991,7 @@
           <a:p>
             <a:r>
               <a:rPr lang="en-US" sz="2800" i="1" dirty="0" smtClean="0"/>
-              <a:t>Special thanks to Joy Global, Inc., the National Fluid Power Association, Emerson, Otto </a:t>
-            </a:r>
-            <a:r>
-              <a:rPr lang="en-US" sz="2800" i="1" dirty="0" smtClean="0"/>
-              <a:t>J. </a:t>
+              <a:t>Special thanks to Joy Global, Inc., the National Fluid Power Association, Emerson, Otto J. </a:t>
             </a:r>
             <a:r>
               <a:rPr lang="en-US" sz="2800" i="1" dirty="0" err="1" smtClean="0"/>
@@ -4047,7 +4013,7 @@
         </p:nvGrpSpPr>
         <p:grpSpPr>
           <a:xfrm>
-            <a:off x="23055670" y="3533402"/>
+            <a:off x="24587084" y="8677726"/>
             <a:ext cx="9525000" cy="6614948"/>
             <a:chOff x="23084207" y="3533402"/>
             <a:chExt cx="9525000" cy="6614948"/>
@@ -4081,6 +4047,7 @@
               </a:r>
             </a:p>
             <a:p>
+              <a:pPr algn="just"/>
               <a:r>
                 <a:rPr lang="en-US" sz="2000" dirty="0" smtClean="0"/>
                 <a:t>To control the robot the user sends a direction request to the Java Graphical User Interface (GUI), which encodes the request and wirelessly transmits it to the robot’s onboard Arduino microcontroller. The microcontroller then updates the robot’s desired foot positions based on its current state.</a:t>
@@ -6370,152 +6337,76 @@
           </p:sp>
         </p:grpSp>
       </p:grpSp>
-      <p:grpSp>
-        <p:nvGrpSpPr>
-          <p:cNvPr id="170" name="Group 169"/>
-          <p:cNvGrpSpPr/>
+      <p:sp>
+        <p:nvSpPr>
+          <p:cNvPr id="99" name="TextBox 98"/>
+          <p:cNvSpPr txBox="1"/>
           <p:nvPr/>
-        </p:nvGrpSpPr>
-        <p:grpSpPr>
+        </p:nvSpPr>
+        <p:spPr>
           <a:xfrm>
-            <a:off x="23233523" y="10906222"/>
-            <a:ext cx="9525000" cy="5264326"/>
-            <a:chOff x="23233523" y="10906222"/>
-            <a:chExt cx="9525000" cy="5264326"/>
+            <a:off x="24764937" y="16050546"/>
+            <a:ext cx="9525000" cy="1815882"/>
           </a:xfrm>
-        </p:grpSpPr>
-        <p:sp>
-          <p:nvSpPr>
-            <p:cNvPr id="99" name="TextBox 98"/>
-            <p:cNvSpPr txBox="1"/>
-            <p:nvPr/>
-          </p:nvSpPr>
-          <p:spPr>
-            <a:xfrm>
-              <a:off x="23233523" y="10906222"/>
-              <a:ext cx="9525000" cy="1815882"/>
-            </a:xfrm>
-            <a:prstGeom prst="rect">
-              <a:avLst/>
-            </a:prstGeom>
-            <a:noFill/>
-          </p:spPr>
-          <p:txBody>
-            <a:bodyPr wrap="square" rtlCol="0">
-              <a:spAutoFit/>
-            </a:bodyPr>
-            <a:lstStyle/>
-            <a:p>
-              <a:r>
-                <a:rPr lang="en-US" sz="3200" b="1" dirty="0" smtClean="0"/>
-                <a:t>Control Architecture: Two Link Leg</a:t>
-              </a:r>
-            </a:p>
-            <a:p>
-              <a:pPr marL="342900" indent="-342900">
-                <a:buFont typeface="Arial" panose="020B0604020202020204" pitchFamily="34" charset="0"/>
-                <a:buChar char="•"/>
-              </a:pPr>
-              <a:r>
-                <a:rPr lang="en-US" sz="2000" dirty="0" err="1" smtClean="0"/>
-                <a:t>Mathworks</a:t>
-              </a:r>
-              <a:r>
-                <a:rPr lang="en-US" sz="2000" dirty="0" smtClean="0"/>
-                <a:t> Simulink model is loaded onto the Arduino</a:t>
-              </a:r>
-            </a:p>
-            <a:p>
-              <a:pPr marL="342900" indent="-342900">
-                <a:buFont typeface="Arial" panose="020B0604020202020204" pitchFamily="34" charset="0"/>
-                <a:buChar char="•"/>
-              </a:pPr>
-              <a:r>
-                <a:rPr lang="en-US" sz="2000" dirty="0" smtClean="0"/>
-                <a:t>Utilizes PID feedback loops to control cylinder lengths</a:t>
-              </a:r>
-            </a:p>
-            <a:p>
-              <a:pPr marL="342900" indent="-342900">
-                <a:buFont typeface="Arial" panose="020B0604020202020204" pitchFamily="34" charset="0"/>
-                <a:buChar char="•"/>
-              </a:pPr>
-              <a:r>
-                <a:rPr lang="en-US" sz="2000" dirty="0" smtClean="0"/>
-                <a:t>Desired length is calculated by a state machine based on user input and current length</a:t>
-              </a:r>
-            </a:p>
-            <a:p>
-              <a:pPr marL="342900" indent="-342900">
-                <a:buFont typeface="Arial" panose="020B0604020202020204" pitchFamily="34" charset="0"/>
-                <a:buChar char="•"/>
-              </a:pPr>
-              <a:endParaRPr lang="en-US" sz="2000" dirty="0"/>
-            </a:p>
-          </p:txBody>
-        </p:sp>
-        <p:grpSp>
-          <p:nvGrpSpPr>
-            <p:cNvPr id="100" name="Group 99"/>
-            <p:cNvGrpSpPr/>
-            <p:nvPr/>
-          </p:nvGrpSpPr>
-          <p:grpSpPr>
-            <a:xfrm>
-              <a:off x="23797047" y="12787537"/>
-              <a:ext cx="7944709" cy="3383011"/>
-              <a:chOff x="23670735" y="10834472"/>
-              <a:chExt cx="7944709" cy="3383011"/>
-            </a:xfrm>
-          </p:grpSpPr>
-          <p:pic>
-            <p:nvPicPr>
-              <p:cNvPr id="101" name="Content Placeholder 3"/>
-              <p:cNvPicPr>
-                <a:picLocks noChangeAspect="1"/>
-              </p:cNvPicPr>
-              <p:nvPr/>
-            </p:nvPicPr>
-            <p:blipFill rotWithShape="1">
-              <a:blip r:embed="rId11"/>
-              <a:srcRect b="49539"/>
-              <a:stretch/>
-            </p:blipFill>
-            <p:spPr>
-              <a:xfrm>
-                <a:off x="23673339" y="10834472"/>
-                <a:ext cx="7942105" cy="2195728"/>
-              </a:xfrm>
-              <a:prstGeom prst="rect">
-                <a:avLst/>
-              </a:prstGeom>
-            </p:spPr>
-          </p:pic>
-          <p:pic>
-            <p:nvPicPr>
-              <p:cNvPr id="102" name="Content Placeholder 3"/>
-              <p:cNvPicPr>
-                <a:picLocks noChangeAspect="1"/>
-              </p:cNvPicPr>
-              <p:nvPr/>
-            </p:nvPicPr>
-            <p:blipFill rotWithShape="1">
-              <a:blip r:embed="rId11"/>
-              <a:srcRect t="72715"/>
-              <a:stretch/>
-            </p:blipFill>
-            <p:spPr>
-              <a:xfrm>
-                <a:off x="23670735" y="13030200"/>
-                <a:ext cx="7942105" cy="1187283"/>
-              </a:xfrm>
-              <a:prstGeom prst="rect">
-                <a:avLst/>
-              </a:prstGeom>
-            </p:spPr>
-          </p:pic>
-        </p:grpSp>
-      </p:grpSp>
+          <a:prstGeom prst="rect">
+            <a:avLst/>
+          </a:prstGeom>
+          <a:noFill/>
+        </p:spPr>
+        <p:txBody>
+          <a:bodyPr wrap="square" rtlCol="0">
+            <a:spAutoFit/>
+          </a:bodyPr>
+          <a:lstStyle/>
+          <a:p>
+            <a:r>
+              <a:rPr lang="en-US" sz="3200" b="1" dirty="0" smtClean="0"/>
+              <a:t>Control Architecture: Two Link Leg</a:t>
+            </a:r>
+          </a:p>
+          <a:p>
+            <a:pPr marL="342900" indent="-342900">
+              <a:buFont typeface="Arial" panose="020B0604020202020204" pitchFamily="34" charset="0"/>
+              <a:buChar char="•"/>
+            </a:pPr>
+            <a:r>
+              <a:rPr lang="en-US" sz="2000" dirty="0" err="1" smtClean="0"/>
+              <a:t>Mathworks</a:t>
+            </a:r>
+            <a:r>
+              <a:rPr lang="en-US" sz="2000" dirty="0" smtClean="0"/>
+              <a:t> Simulink model is loaded onto the Arduino</a:t>
+            </a:r>
+          </a:p>
+          <a:p>
+            <a:pPr marL="342900" indent="-342900">
+              <a:buFont typeface="Arial" panose="020B0604020202020204" pitchFamily="34" charset="0"/>
+              <a:buChar char="•"/>
+            </a:pPr>
+            <a:r>
+              <a:rPr lang="en-US" sz="2000" dirty="0" smtClean="0"/>
+              <a:t>Utilizes PID feedback loops to control cylinder lengths</a:t>
+            </a:r>
+          </a:p>
+          <a:p>
+            <a:pPr marL="342900" indent="-342900">
+              <a:buFont typeface="Arial" panose="020B0604020202020204" pitchFamily="34" charset="0"/>
+              <a:buChar char="•"/>
+            </a:pPr>
+            <a:r>
+              <a:rPr lang="en-US" sz="2000" dirty="0" smtClean="0"/>
+              <a:t>Desired length is calculated by a state machine based on user input and current length</a:t>
+            </a:r>
+          </a:p>
+          <a:p>
+            <a:pPr marL="342900" indent="-342900">
+              <a:buFont typeface="Arial" panose="020B0604020202020204" pitchFamily="34" charset="0"/>
+              <a:buChar char="•"/>
+            </a:pPr>
+            <a:endParaRPr lang="en-US" sz="2000" dirty="0"/>
+          </a:p>
+        </p:txBody>
+      </p:sp>
       <p:sp>
         <p:nvSpPr>
           <p:cNvPr id="104" name="TextBox 103"/>
@@ -6524,7 +6415,7 @@
         </p:nvSpPr>
         <p:spPr>
           <a:xfrm>
-            <a:off x="23386599" y="15966974"/>
+            <a:off x="24918013" y="20323627"/>
             <a:ext cx="8763000" cy="338554"/>
           </a:xfrm>
           <a:prstGeom prst="rect">
@@ -6541,15 +6432,7 @@
             <a:pPr algn="ctr"/>
             <a:r>
               <a:rPr lang="en-US" sz="1600" dirty="0" smtClean="0"/>
-              <a:t>Control </a:t>
-            </a:r>
-            <a:r>
-              <a:rPr lang="en-US" sz="1600" dirty="0"/>
-              <a:t>S</a:t>
-            </a:r>
-            <a:r>
-              <a:rPr lang="en-US" sz="1600" dirty="0" smtClean="0"/>
-              <a:t>ubsystem For a Single Leg</a:t>
+              <a:t>Control block diagram for a single leg</a:t>
             </a:r>
             <a:endParaRPr lang="en-US" sz="1600" dirty="0"/>
           </a:p>
@@ -6563,10 +6446,10 @@
         </p:nvGrpSpPr>
         <p:grpSpPr>
           <a:xfrm>
-            <a:off x="377001" y="19354800"/>
-            <a:ext cx="9757599" cy="7296886"/>
+            <a:off x="24632371" y="3257396"/>
+            <a:ext cx="9757599" cy="2372461"/>
             <a:chOff x="300847" y="17979914"/>
-            <a:chExt cx="9757599" cy="7296886"/>
+            <a:chExt cx="9757599" cy="2372461"/>
           </a:xfrm>
         </p:grpSpPr>
         <p:sp>
@@ -6610,7 +6493,7 @@
           <p:spPr>
             <a:xfrm>
               <a:off x="318432" y="18721159"/>
-              <a:ext cx="9740014" cy="6555641"/>
+              <a:ext cx="9740014" cy="1631216"/>
             </a:xfrm>
             <a:prstGeom prst="rect">
               <a:avLst/>
@@ -6623,40 +6506,10 @@
             </a:bodyPr>
             <a:lstStyle/>
             <a:p>
-              <a:r>
-                <a:rPr lang="en-US" sz="2000" dirty="0" smtClean="0"/>
-                <a:t>The electronics of the robot are separated into subsystems. The communication subsystem, microcontroller subsystem, motherboard subsystem, and debug panel subsystem. The communication subsystem interfaces a user controlled computer with the Arduino microcontroller using </a:t>
-              </a:r>
-              <a:r>
-                <a:rPr lang="en-US" sz="2000" dirty="0" err="1" smtClean="0"/>
-                <a:t>Xbee</a:t>
-              </a:r>
-              <a:r>
-                <a:rPr lang="en-US" sz="2000" dirty="0" smtClean="0"/>
-                <a:t> modules. The microcontroller subsystem includes the microcontroller, </a:t>
-              </a:r>
-              <a:r>
-                <a:rPr lang="en-US" sz="2000" dirty="0" err="1" smtClean="0"/>
-                <a:t>Xbee</a:t>
-              </a:r>
-              <a:r>
-                <a:rPr lang="en-US" sz="2000" dirty="0" smtClean="0"/>
-                <a:t> shield, and battery supply for the microcontroller. This microcontroller battery supply is implemented as a standard replaceable 9 volt battery. The motherboard subsystem handles to signal conditioning for the command and feedback signals.</a:t>
-              </a:r>
-            </a:p>
-            <a:p>
-              <a:endParaRPr lang="en-US" sz="2000" dirty="0" smtClean="0"/>
-            </a:p>
-            <a:p>
-              <a:r>
-                <a:rPr lang="en-US" sz="2000" dirty="0" smtClean="0"/>
-                <a:t>The microcontroller uses a pulse width modulated signal with a varying duty cycle to indicate an open or close command to each of the eight pneumatic valves. The motherboard’s signal conditioning hardware includes a third order active low pass filter to convert the pulse width modulated signal into an analog signal. This analog signal is then scaled by another amplifier circuit to the proper magnitude for the pneumatic valve. The current extension of the pneumatic cylinder is reported as feedback to the microcontroller. This feedback signal passes through an analog filter to scale down the voltage for the Arduino.</a:t>
-              </a:r>
-            </a:p>
-            <a:p>
               <a:endParaRPr lang="en-US" sz="2000" dirty="0"/>
             </a:p>
             <a:p>
+              <a:pPr algn="just"/>
               <a:r>
                 <a:rPr lang="en-US" sz="2000" dirty="0" smtClean="0"/>
                 <a:t>A debug panel is included to provide electrical access to the command and feedback signals to and from the pneumatic cylinder. Additionally the debug panel has a toggle switch for the microcontroller battery, status LEDs, battery level LEDs, and an emergency stop a higher power battery bank that powers the pneumatic valves.</a:t>
@@ -6673,7 +6526,7 @@
         </p:nvGrpSpPr>
         <p:grpSpPr>
           <a:xfrm>
-            <a:off x="11216640" y="15457670"/>
+            <a:off x="11104151" y="15352662"/>
             <a:ext cx="9868969" cy="6792730"/>
             <a:chOff x="11216640" y="16219670"/>
             <a:chExt cx="9868969" cy="6792730"/>
@@ -6707,6 +6560,7 @@
               </a:r>
             </a:p>
             <a:p>
+              <a:pPr algn="just"/>
               <a:r>
                 <a:rPr lang="en-US" sz="2000" dirty="0" smtClean="0"/>
                 <a:t>In order to ensure dynamic stability for the robot the Zero Moment Point (ZMP) method was used. The zero moment point can be calculated from the reaction forces acting on each foot. The location where the torque induced by these reactions is zero is the ZMP. In low speed applications such as this one the ZMP can be approximated by the center of gravity (CG). As long as the CG falls within the convex polygon created by the robot’s contact points with the ground it is in a statically stable pose. When the CG passes outside of this polygon an unbalanced tipping moment is created and the robot becomes unstable.</a:t>
@@ -8443,7 +8297,7 @@
         </p:nvSpPr>
         <p:spPr>
           <a:xfrm>
-            <a:off x="23084207" y="16970406"/>
+            <a:off x="24931288" y="20883660"/>
             <a:ext cx="9525000" cy="892552"/>
           </a:xfrm>
           <a:prstGeom prst="rect">
@@ -8469,17 +8323,8 @@
             </a:pPr>
             <a:r>
               <a:rPr lang="en-US" sz="2000" dirty="0" smtClean="0"/>
-              <a:t>Robots are </a:t>
-            </a:r>
-            <a:r>
-              <a:rPr lang="en-US" sz="2000" dirty="0" smtClean="0"/>
-              <a:t>hard. </a:t>
-            </a:r>
-            <a:r>
-              <a:rPr lang="en-US" sz="2000" dirty="0" smtClean="0"/>
-              <a:t>No, seriously.</a:t>
-            </a:r>
-            <a:endParaRPr lang="en-US" sz="2000" dirty="0" smtClean="0"/>
+              <a:t>Robots are hard. No, seriously.</a:t>
+            </a:r>
           </a:p>
         </p:txBody>
       </p:sp>
@@ -8491,7 +8336,7 @@
         </p:nvSpPr>
         <p:spPr>
           <a:xfrm>
-            <a:off x="23233523" y="20123107"/>
+            <a:off x="24931288" y="24416381"/>
             <a:ext cx="9525000" cy="3970318"/>
           </a:xfrm>
           <a:prstGeom prst="rect">
@@ -8631,7 +8476,7 @@
         </p:nvSpPr>
         <p:spPr>
           <a:xfrm>
-            <a:off x="531101" y="7620000"/>
+            <a:off x="569064" y="6861844"/>
             <a:ext cx="9525000" cy="1815882"/>
           </a:xfrm>
           <a:prstGeom prst="rect">
@@ -8652,6 +8497,7 @@
             </a:r>
           </a:p>
           <a:p>
+            <a:pPr algn="just"/>
             <a:r>
               <a:rPr lang="en-US" sz="2000" dirty="0" smtClean="0"/>
               <a:t>To address the existing challenges an educational robotics platform was developed to increase student interest in STEM fields, fluid power, and robotics through outreach opportunities, laboratory exercises, and research experiences.</a:t>
@@ -8698,7 +8544,7 @@
               <p:nvPr/>
             </p:nvPicPr>
             <p:blipFill>
-              <a:blip r:embed="rId12">
+              <a:blip r:embed="rId11">
                 <a:extLst>
                   <a:ext uri="{28A0092B-C50C-407E-A947-70E740481C1C}">
                     <a14:useLocalDpi xmlns:a14="http://schemas.microsoft.com/office/drawing/2010/main" val="0"/>
@@ -8798,7 +8644,7 @@
         </p:nvGrpSpPr>
         <p:grpSpPr>
           <a:xfrm>
-            <a:off x="12256770" y="11832092"/>
+            <a:off x="12144281" y="11453418"/>
             <a:ext cx="7444740" cy="3559210"/>
             <a:chOff x="12256770" y="11762609"/>
             <a:chExt cx="7444740" cy="3559210"/>
@@ -8811,11 +8657,11 @@
             <p:nvPr/>
           </p:nvPicPr>
           <p:blipFill>
-            <a:blip r:embed="rId13">
+            <a:blip r:embed="rId12">
               <a:extLst>
                 <a:ext uri="{BEBA8EAE-BF5A-486C-A8C5-ECC9F3942E4B}">
                   <a14:imgProps xmlns:a14="http://schemas.microsoft.com/office/drawing/2010/main">
-                    <a14:imgLayer r:embed="rId14">
+                    <a14:imgLayer r:embed="rId13">
                       <a14:imgEffect>
                         <a14:backgroundRemoval t="1867" b="96533" l="2541" r="97967">
                           <a14:foregroundMark x1="4574" y1="18133" x2="95807" y2="86133"/>
@@ -8889,6 +8735,83 @@
           </p:txBody>
         </p:sp>
       </p:grpSp>
+      <p:pic>
+        <p:nvPicPr>
+          <p:cNvPr id="159" name="Picture 158"/>
+          <p:cNvPicPr/>
+          <p:nvPr/>
+        </p:nvPicPr>
+        <p:blipFill rotWithShape="1">
+          <a:blip r:embed="rId14">
+            <a:extLst>
+              <a:ext uri="{BEBA8EAE-BF5A-486C-A8C5-ECC9F3942E4B}">
+                <a14:imgProps xmlns:a14="http://schemas.microsoft.com/office/drawing/2010/main">
+                  <a14:imgLayer r:embed="rId15">
+                    <a14:imgEffect>
+                      <a14:sharpenSoften amount="50000"/>
+                    </a14:imgEffect>
+                  </a14:imgLayer>
+                </a14:imgProps>
+              </a:ext>
+              <a:ext uri="{28A0092B-C50C-407E-A947-70E740481C1C}">
+                <a14:useLocalDpi xmlns:a14="http://schemas.microsoft.com/office/drawing/2010/main" val="0"/>
+              </a:ext>
+            </a:extLst>
+          </a:blip>
+          <a:srcRect l="11132" r="28321" b="27402"/>
+          <a:stretch/>
+        </p:blipFill>
+        <p:spPr bwMode="auto">
+          <a:xfrm>
+            <a:off x="34366200" y="360354"/>
+            <a:ext cx="1759585" cy="1158240"/>
+          </a:xfrm>
+          <a:prstGeom prst="rect">
+            <a:avLst/>
+          </a:prstGeom>
+          <a:ln>
+            <a:noFill/>
+          </a:ln>
+          <a:extLst>
+            <a:ext uri="{53640926-AAD7-44D8-BBD7-CCE9431645EC}">
+              <a14:shadowObscured xmlns:a14="http://schemas.microsoft.com/office/drawing/2010/main"/>
+            </a:ext>
+          </a:extLst>
+        </p:spPr>
+      </p:pic>
+      <p:pic>
+        <p:nvPicPr>
+          <p:cNvPr id="162" name="Picture 161" descr="D:\MyDocs\Documents\GitHub\AgileRoboticControls\System Modelling\Control\Control - Implementation.png"/>
+          <p:cNvPicPr/>
+          <p:nvPr/>
+        </p:nvPicPr>
+        <p:blipFill>
+          <a:blip r:embed="rId16">
+            <a:extLst>
+              <a:ext uri="{28A0092B-C50C-407E-A947-70E740481C1C}">
+                <a14:useLocalDpi xmlns:a14="http://schemas.microsoft.com/office/drawing/2010/main" val="0"/>
+              </a:ext>
+            </a:extLst>
+          </a:blip>
+          <a:srcRect/>
+          <a:stretch>
+            <a:fillRect/>
+          </a:stretch>
+        </p:blipFill>
+        <p:spPr bwMode="auto">
+          <a:xfrm>
+            <a:off x="24918013" y="18135600"/>
+            <a:ext cx="9431294" cy="1925001"/>
+          </a:xfrm>
+          <a:prstGeom prst="rect">
+            <a:avLst/>
+          </a:prstGeom>
+          <a:noFill/>
+          <a:ln>
+            <a:noFill/>
+          </a:ln>
+        </p:spPr>
+      </p:pic>
     </p:spTree>
     <p:extLst>
       <p:ext uri="{BB962C8B-B14F-4D97-AF65-F5344CB8AC3E}">

</xml_diff>

<commit_message>
Senior Design Poster Updates
Rodriguez Feedback Second Draft used to update our poster.

Figure numbers added.
</commit_message>
<xml_diff>
--- a/Documentation/Design Show Poster/Senior Design Show Poster.pptx
+++ b/Documentation/Design Show Poster/Senior Design Show Poster.pptx
@@ -3561,7 +3561,7 @@
         </p:nvSpPr>
         <p:spPr>
           <a:xfrm>
-            <a:off x="554261" y="9770301"/>
+            <a:off x="554261" y="9828879"/>
             <a:ext cx="9525000" cy="5016758"/>
           </a:xfrm>
           <a:prstGeom prst="rect">
@@ -3734,7 +3734,7 @@
         </p:nvSpPr>
         <p:spPr>
           <a:xfrm>
-            <a:off x="553286" y="3839346"/>
+            <a:off x="553286" y="3897924"/>
             <a:ext cx="9525000" cy="2862322"/>
           </a:xfrm>
           <a:prstGeom prst="rect">
@@ -3765,7 +3765,7 @@
         </p:nvGrpSpPr>
         <p:grpSpPr>
           <a:xfrm>
-            <a:off x="1585237" y="22783798"/>
+            <a:off x="1585237" y="22842376"/>
             <a:ext cx="6949163" cy="4089395"/>
             <a:chOff x="2118637" y="23001954"/>
             <a:chExt cx="4987788" cy="2935179"/>
@@ -3836,8 +3836,8 @@
         </p:blipFill>
         <p:spPr>
           <a:xfrm>
-            <a:off x="14730375" y="2561653"/>
-            <a:ext cx="4752767" cy="4041506"/>
+            <a:off x="15316200" y="2561653"/>
+            <a:ext cx="6377025" cy="4786584"/>
           </a:xfrm>
           <a:prstGeom prst="rect">
             <a:avLst/>
@@ -3857,7 +3857,7 @@
         </p:nvSpPr>
         <p:spPr>
           <a:xfrm>
-            <a:off x="8674258" y="247976"/>
+            <a:off x="9158521" y="247976"/>
             <a:ext cx="18959279" cy="2985433"/>
           </a:xfrm>
           <a:prstGeom prst="rect">
@@ -3894,7 +3894,15 @@
             <a:pPr algn="ctr"/>
             <a:r>
               <a:rPr lang="en-US" sz="4000" dirty="0" smtClean="0"/>
-              <a:t>Team ARC: Logan Beaver, Justin Campbell, Tyler Paddock Ron Shipman</a:t>
+              <a:t>Team ARC: Logan Beaver, Justin Campbell, Tyler </a:t>
+            </a:r>
+            <a:r>
+              <a:rPr lang="en-US" sz="4000" dirty="0" smtClean="0"/>
+              <a:t>Paddock, and </a:t>
+            </a:r>
+            <a:r>
+              <a:rPr lang="en-US" sz="4000" dirty="0" smtClean="0"/>
+              <a:t>Ron Shipman</a:t>
             </a:r>
           </a:p>
           <a:p>
@@ -3919,8 +3927,8 @@
         </p:nvGrpSpPr>
         <p:grpSpPr>
           <a:xfrm>
-            <a:off x="553286" y="463380"/>
-            <a:ext cx="5619392" cy="2070022"/>
+            <a:off x="553285" y="463380"/>
+            <a:ext cx="8120972" cy="2912136"/>
             <a:chOff x="361590" y="285906"/>
             <a:chExt cx="5619392" cy="2070022"/>
           </a:xfrm>
@@ -4159,7 +4167,23 @@
             </a:r>
             <a:r>
               <a:rPr lang="en-US" sz="2800" i="1" dirty="0" smtClean="0"/>
-              <a:t> Endowment Fund, MSOE, and  Dr. Luis A. Rodriguez for their support</a:t>
+              <a:t> Endowment Fund, MSOE</a:t>
+            </a:r>
+            <a:r>
+              <a:rPr lang="en-US" sz="2800" i="1" dirty="0" smtClean="0"/>
+              <a:t>, Quinn </a:t>
+            </a:r>
+            <a:r>
+              <a:rPr lang="en-US" sz="2800" i="1" dirty="0" err="1" smtClean="0"/>
+              <a:t>McCartin</a:t>
+            </a:r>
+            <a:r>
+              <a:rPr lang="en-US" sz="2800" i="1" dirty="0" smtClean="0"/>
+              <a:t>, </a:t>
+            </a:r>
+            <a:r>
+              <a:rPr lang="en-US" sz="2800" i="1" dirty="0" smtClean="0"/>
+              <a:t>and  Dr. Luis A. Rodriguez for their support</a:t>
             </a:r>
             <a:endParaRPr lang="en-US" sz="2800" i="1" dirty="0"/>
           </a:p>
@@ -4173,7 +4197,7 @@
         </p:nvGrpSpPr>
         <p:grpSpPr>
           <a:xfrm>
-            <a:off x="24560168" y="9410902"/>
+            <a:off x="26272160" y="9244644"/>
             <a:ext cx="9525000" cy="5881772"/>
             <a:chOff x="23057291" y="4266578"/>
             <a:chExt cx="9525000" cy="5881772"/>
@@ -4204,8 +4228,33 @@
               <a:pPr algn="just"/>
               <a:r>
                 <a:rPr lang="en-US" sz="2000" dirty="0" smtClean="0"/>
-                <a:t>To control the robot the user sends a direction request to the Java Graphical User Interface (GUI), which encodes the request and wirelessly transmits it to the robot’s onboard Arduino microcontroller. The microcontroller then updates the robot’s desired foot positions based on its current state.</a:t>
+                <a:t>To control the </a:t>
               </a:r>
+              <a:r>
+                <a:rPr lang="en-US" sz="2000" dirty="0" smtClean="0"/>
+                <a:t>motion of the robot </a:t>
+              </a:r>
+              <a:r>
+                <a:rPr lang="en-US" sz="2000" dirty="0" smtClean="0"/>
+                <a:t>the user sends a direction request to the Java Graphical User Interface (GUI), which encodes the request and wirelessly transmits it to </a:t>
+              </a:r>
+              <a:r>
+                <a:rPr lang="en-US" sz="2000" dirty="0" smtClean="0"/>
+                <a:t>the</a:t>
+              </a:r>
+              <a:r>
+                <a:rPr lang="en-US" sz="2000" dirty="0" smtClean="0"/>
+                <a:t> </a:t>
+              </a:r>
+              <a:r>
+                <a:rPr lang="en-US" sz="2000" dirty="0" smtClean="0"/>
+                <a:t>onboard Arduino microcontroller. </a:t>
+              </a:r>
+              <a:r>
+                <a:rPr lang="en-US" sz="2000" dirty="0" smtClean="0"/>
+                <a:t>The microcontroller responds to a user request by taking a step in the requested direction.</a:t>
+              </a:r>
+              <a:endParaRPr lang="en-US" sz="2000" dirty="0" smtClean="0"/>
             </a:p>
             <a:p>
               <a:endParaRPr lang="en-US" sz="2000" dirty="0" smtClean="0"/>
@@ -6483,7 +6532,15 @@
                 <a:pPr algn="ctr"/>
                 <a:r>
                   <a:rPr lang="en-US" sz="1600" dirty="0" smtClean="0"/>
-                  <a:t>High Level Communication System Diagram</a:t>
+                  <a:t>Figure 7: </a:t>
+                </a:r>
+                <a:r>
+                  <a:rPr lang="en-US" sz="1600" dirty="0" smtClean="0"/>
+                  <a:t>High </a:t>
+                </a:r>
+                <a:r>
+                  <a:rPr lang="en-US" sz="1600" dirty="0" smtClean="0"/>
+                  <a:t>Level Communication System Diagram</a:t>
                 </a:r>
                 <a:endParaRPr lang="en-US" sz="1600" dirty="0"/>
               </a:p>
@@ -6499,7 +6556,7 @@
         </p:nvSpPr>
         <p:spPr>
           <a:xfrm>
-            <a:off x="24817016" y="16738935"/>
+            <a:off x="26341045" y="16104097"/>
             <a:ext cx="9525000" cy="1323439"/>
           </a:xfrm>
           <a:prstGeom prst="rect">
@@ -6563,7 +6620,7 @@
         </p:nvSpPr>
         <p:spPr>
           <a:xfrm>
-            <a:off x="24931288" y="19971603"/>
+            <a:off x="26643280" y="19489034"/>
             <a:ext cx="8763000" cy="830997"/>
           </a:xfrm>
           <a:prstGeom prst="rect">
@@ -6580,11 +6637,11 @@
             <a:pPr algn="ctr"/>
             <a:r>
               <a:rPr lang="en-US" sz="1600" dirty="0" smtClean="0"/>
-              <a:t>Block diagram for a single leg controller. The left loop determines the desired cylinder legs based on the current foot position. The right loop is a PID controller fo</a:t>
+              <a:t>Figure 8: Block </a:t>
             </a:r>
             <a:r>
               <a:rPr lang="en-US" sz="1600" dirty="0" smtClean="0"/>
-              <a:t>r a single leg which moves the foot into position. For a full robot there are eight copies of the right loop.</a:t>
+              <a:t>diagram for a single leg controller. The left loop determines the desired cylinder legs based on the current foot position. The right loop is a PID controller for a single leg which moves the foot into position. For a full robot there are eight copies of the right loop.</a:t>
             </a:r>
             <a:endParaRPr lang="en-US" sz="1600" dirty="0"/>
           </a:p>
@@ -6598,7 +6655,7 @@
         </p:nvGrpSpPr>
         <p:grpSpPr>
           <a:xfrm>
-            <a:off x="24632371" y="3257396"/>
+            <a:off x="26344362" y="3237237"/>
             <a:ext cx="9763054" cy="2494103"/>
             <a:chOff x="300847" y="17979914"/>
             <a:chExt cx="9763054" cy="2494103"/>
@@ -6654,7 +6711,27 @@
             <a:p>
               <a:r>
                 <a:rPr lang="en-US" sz="2000" dirty="0" smtClean="0"/>
-                <a:t>The Arduino Mega microcontroller outputs pulse-width modulated signals which are converted into analog signals using a low pass filter and amplifiers as signal conditioning circuitry. The analog signal directly controls the valves on the pneumatic subsystem. Sensors inside the pneumatic cylinders are used as feedback to the control running on the Arduino microcontroller.</a:t>
+                <a:t>The Arduino Mega microcontroller outputs pulse-width modulated signals which are converted into analog signals using </a:t>
+              </a:r>
+              <a:r>
+                <a:rPr lang="en-US" sz="2000" dirty="0" smtClean="0"/>
+                <a:t>signal conditioning circuitry consisting of a low pass filter and a second-stage amplifier. </a:t>
+              </a:r>
+              <a:r>
+                <a:rPr lang="en-US" sz="2000" dirty="0" smtClean="0"/>
+                <a:t>The analog signal directly controls </a:t>
+              </a:r>
+              <a:r>
+                <a:rPr lang="en-US" sz="2000" dirty="0" smtClean="0"/>
+                <a:t>valve positions</a:t>
+              </a:r>
+              <a:r>
+                <a:rPr lang="en-US" sz="2000" dirty="0" smtClean="0"/>
+                <a:t>. </a:t>
+              </a:r>
+              <a:r>
+                <a:rPr lang="en-US" sz="2000" dirty="0" smtClean="0"/>
+                <a:t>Sensors inside the pneumatic cylinders are used as feedback to the control running on the Arduino microcontroller.</a:t>
               </a:r>
             </a:p>
           </p:txBody>
@@ -6668,7 +6745,7 @@
         </p:nvGrpSpPr>
         <p:grpSpPr>
           <a:xfrm>
-            <a:off x="12457631" y="15758854"/>
+            <a:off x="13753031" y="16359139"/>
             <a:ext cx="9868969" cy="6386538"/>
             <a:chOff x="11216640" y="16642468"/>
             <a:chExt cx="9868969" cy="6369932"/>
@@ -8066,7 +8143,11 @@
                   <a:p>
                     <a:r>
                       <a:rPr lang="en-US" sz="1600" dirty="0" smtClean="0"/>
-                      <a:t>Top and side view of the robot model’s convex support polygon and an induced tipping moment. The tipping moment is caused by the center of gravity being outside of the convex support polygon.</a:t>
+                      <a:t>Figure 4: Top </a:t>
+                    </a:r>
+                    <a:r>
+                      <a:rPr lang="en-US" sz="1600" dirty="0" smtClean="0"/>
+                      <a:t>and side view of the robot model’s convex support polygon and an induced tipping moment. The tipping moment is caused by the center of gravity being outside of the convex support polygon.</a:t>
                     </a:r>
                     <a:endParaRPr lang="en-US" sz="1600" dirty="0"/>
                   </a:p>
@@ -8427,14 +8508,14 @@
       </p:grpSp>
       <p:sp>
         <p:nvSpPr>
-          <p:cNvPr id="206" name="TextBox 205"/>
+          <p:cNvPr id="207" name="TextBox 206"/>
           <p:cNvSpPr txBox="1"/>
           <p:nvPr/>
         </p:nvSpPr>
         <p:spPr>
           <a:xfrm>
-            <a:off x="24920108" y="21767868"/>
-            <a:ext cx="9525000" cy="400110"/>
+            <a:off x="26392996" y="25874008"/>
+            <a:ext cx="9525000" cy="1938992"/>
           </a:xfrm>
           <a:prstGeom prst="rect">
             <a:avLst/>
@@ -8453,32 +8534,10 @@
             </a:pPr>
             <a:r>
               <a:rPr lang="en-US" sz="2000" dirty="0" smtClean="0"/>
-              <a:t>Robots are hard. No, seriously.</a:t>
-            </a:r>
-          </a:p>
-        </p:txBody>
-      </p:sp>
-      <p:sp>
-        <p:nvSpPr>
-          <p:cNvPr id="207" name="TextBox 206"/>
-          <p:cNvSpPr txBox="1"/>
-          <p:nvPr/>
-        </p:nvSpPr>
-        <p:spPr>
-          <a:xfrm>
-            <a:off x="24931288" y="24416381"/>
-            <a:ext cx="9525000" cy="3477875"/>
-          </a:xfrm>
-          <a:prstGeom prst="rect">
-            <a:avLst/>
-          </a:prstGeom>
-          <a:noFill/>
-        </p:spPr>
-        <p:txBody>
-          <a:bodyPr wrap="square" rtlCol="0">
-            <a:spAutoFit/>
-          </a:bodyPr>
-          <a:lstStyle/>
+              <a:t>Mobile app interface</a:t>
+            </a:r>
+            <a:endParaRPr lang="en-US" sz="2000" dirty="0" smtClean="0"/>
+          </a:p>
           <a:p>
             <a:pPr marL="342900" indent="-342900">
               <a:buFont typeface="Arial" panose="020B0604020202020204" pitchFamily="34" charset="0"/>
@@ -8486,7 +8545,11 @@
             </a:pPr>
             <a:r>
               <a:rPr lang="en-US" sz="2000" dirty="0" smtClean="0"/>
-              <a:t>Controlling the robot with a cellphone application</a:t>
+              <a:t>CAN </a:t>
+            </a:r>
+            <a:r>
+              <a:rPr lang="en-US" sz="2000" dirty="0" smtClean="0"/>
+              <a:t>network development</a:t>
             </a:r>
           </a:p>
           <a:p>
@@ -8496,7 +8559,7 @@
             </a:pPr>
             <a:r>
               <a:rPr lang="en-US" sz="2000" dirty="0" smtClean="0"/>
-              <a:t>Integrating gyroscopes and force sensors to determine real time stability</a:t>
+              <a:t>Air supply mounting on robot chassis</a:t>
             </a:r>
           </a:p>
           <a:p>
@@ -8506,8 +8569,13 @@
             </a:pPr>
             <a:r>
               <a:rPr lang="en-US" sz="2000" dirty="0" smtClean="0"/>
-              <a:t>Foot trajectory optimization</a:t>
-            </a:r>
+              <a:t>External disturbance </a:t>
+            </a:r>
+            <a:r>
+              <a:rPr lang="en-US" sz="2000" dirty="0" smtClean="0"/>
+              <a:t>detection</a:t>
+            </a:r>
+            <a:endParaRPr lang="en-US" sz="2000" dirty="0" smtClean="0"/>
           </a:p>
           <a:p>
             <a:pPr marL="342900" indent="-342900">
@@ -8516,7 +8584,7 @@
             </a:pPr>
             <a:r>
               <a:rPr lang="en-US" sz="2000" dirty="0" smtClean="0"/>
-              <a:t>Mechanical design optimizations</a:t>
+              <a:t>Feed forward control design and implementation</a:t>
             </a:r>
           </a:p>
           <a:p>
@@ -8526,69 +8594,13 @@
             </a:pPr>
             <a:r>
               <a:rPr lang="en-US" sz="2000" dirty="0" smtClean="0"/>
-              <a:t>Implementation of dynamically stable but statically unstable gaits</a:t>
-            </a:r>
-            <a:endParaRPr lang="en-US" sz="2000" dirty="0"/>
-          </a:p>
-          <a:p>
-            <a:pPr marL="342900" indent="-342900">
-              <a:buFont typeface="Arial" panose="020B0604020202020204" pitchFamily="34" charset="0"/>
-              <a:buChar char="•"/>
-            </a:pPr>
+              <a:t>Autonomous </a:t>
+            </a:r>
             <a:r>
               <a:rPr lang="en-US" sz="2000" dirty="0" smtClean="0"/>
-              <a:t>CAN network development</a:t>
-            </a:r>
-          </a:p>
-          <a:p>
-            <a:pPr marL="342900" indent="-342900">
-              <a:buFont typeface="Arial" panose="020B0604020202020204" pitchFamily="34" charset="0"/>
-              <a:buChar char="•"/>
-            </a:pPr>
-            <a:r>
-              <a:rPr lang="en-US" sz="2000" dirty="0" smtClean="0"/>
-              <a:t>Air supply mounting on robot chassis</a:t>
-            </a:r>
-          </a:p>
-          <a:p>
-            <a:pPr marL="342900" indent="-342900">
-              <a:buFont typeface="Arial" panose="020B0604020202020204" pitchFamily="34" charset="0"/>
-              <a:buChar char="•"/>
-            </a:pPr>
-            <a:r>
-              <a:rPr lang="en-US" sz="2000" dirty="0" smtClean="0"/>
-              <a:t>External disturbance resistance</a:t>
-            </a:r>
-          </a:p>
-          <a:p>
-            <a:pPr marL="342900" indent="-342900">
-              <a:buFont typeface="Arial" panose="020B0604020202020204" pitchFamily="34" charset="0"/>
-              <a:buChar char="•"/>
-            </a:pPr>
-            <a:r>
-              <a:rPr lang="en-US" sz="2000" dirty="0" smtClean="0"/>
-              <a:t>Feed forward control design and implementation</a:t>
-            </a:r>
-          </a:p>
-          <a:p>
-            <a:pPr marL="342900" indent="-342900">
-              <a:buFont typeface="Arial" panose="020B0604020202020204" pitchFamily="34" charset="0"/>
-              <a:buChar char="•"/>
-            </a:pPr>
-            <a:r>
-              <a:rPr lang="en-US" sz="2000" dirty="0" smtClean="0"/>
-              <a:t>Autonomous navigation</a:t>
-            </a:r>
-          </a:p>
-          <a:p>
-            <a:pPr marL="342900" indent="-342900">
-              <a:buFont typeface="Arial" panose="020B0604020202020204" pitchFamily="34" charset="0"/>
-              <a:buChar char="•"/>
-            </a:pPr>
-            <a:r>
-              <a:rPr lang="en-US" sz="2000" dirty="0" smtClean="0"/>
-              <a:t>Embedded valve driver creation</a:t>
-            </a:r>
+              <a:t>navigation and advanced gaits</a:t>
+            </a:r>
+            <a:endParaRPr lang="en-US" sz="2000" dirty="0" smtClean="0"/>
           </a:p>
         </p:txBody>
       </p:sp>
@@ -8600,7 +8612,7 @@
         </p:nvSpPr>
         <p:spPr>
           <a:xfrm>
-            <a:off x="553286" y="7514192"/>
+            <a:off x="553286" y="7572770"/>
             <a:ext cx="9525000" cy="1323439"/>
           </a:xfrm>
           <a:prstGeom prst="rect">
@@ -8634,7 +8646,7 @@
         </p:nvGrpSpPr>
         <p:grpSpPr>
           <a:xfrm>
-            <a:off x="12326280" y="22479000"/>
+            <a:off x="13621680" y="23079285"/>
             <a:ext cx="9784080" cy="4962315"/>
             <a:chOff x="10972800" y="22479000"/>
             <a:chExt cx="9784080" cy="4962315"/>
@@ -8746,7 +8758,11 @@
             <a:p>
               <a:r>
                 <a:rPr lang="en-US" sz="1600" dirty="0" smtClean="0"/>
-                <a:t>Three slow gait patterns for a four legged robot. The drag and creep gait involve moving a single leg, and are statically stable. The walk gait involves moving two legs at once, and is dynamically stable.</a:t>
+                <a:t>Figure 5: Three </a:t>
+              </a:r>
+              <a:r>
+                <a:rPr lang="en-US" sz="1600" dirty="0" smtClean="0"/>
+                <a:t>slow gait patterns for a four legged robot. The drag and creep gait involve moving a single leg, and are statically stable. The walk gait involves moving two legs at once, and is dynamically stable.</a:t>
               </a:r>
               <a:endParaRPr lang="en-US" sz="1600" dirty="0"/>
             </a:p>
@@ -8761,10 +8777,10 @@
         </p:nvGrpSpPr>
         <p:grpSpPr>
           <a:xfrm>
-            <a:off x="12600600" y="10842590"/>
-            <a:ext cx="9397270" cy="3559210"/>
+            <a:off x="13896000" y="11442875"/>
+            <a:ext cx="9397270" cy="3805431"/>
             <a:chOff x="11359609" y="11762609"/>
-            <a:chExt cx="9397270" cy="3559210"/>
+            <a:chExt cx="9397270" cy="3805431"/>
           </a:xfrm>
         </p:grpSpPr>
         <p:pic>
@@ -8829,7 +8845,7 @@
           <p:spPr>
             <a:xfrm>
               <a:off x="11359609" y="14983265"/>
-              <a:ext cx="9397270" cy="338554"/>
+              <a:ext cx="9397270" cy="584775"/>
             </a:xfrm>
             <a:prstGeom prst="rect">
               <a:avLst/>
@@ -8845,11 +8861,11 @@
               <a:pPr algn="ctr"/>
               <a:r>
                 <a:rPr lang="en-US" sz="1600" dirty="0" smtClean="0"/>
-                <a:t>The pneumatic circuit diagram for a single cylinder. </a:t>
+                <a:t>Figure 3: The </a:t>
               </a:r>
               <a:r>
                 <a:rPr lang="en-US" sz="1600" dirty="0" smtClean="0"/>
-                <a:t>Eight of these work in parallel to move the robot’s four legs.</a:t>
+                <a:t>pneumatic circuit diagram for a single cylinder. Eight of these work in parallel to move the robot’s four legs.</a:t>
               </a:r>
               <a:endParaRPr lang="en-US" sz="1600" dirty="0"/>
             </a:p>
@@ -8884,8 +8900,8 @@
         </p:blipFill>
         <p:spPr bwMode="auto">
           <a:xfrm>
-            <a:off x="34366200" y="360354"/>
-            <a:ext cx="1759585" cy="1158240"/>
+            <a:off x="34142022" y="360354"/>
+            <a:ext cx="1983764" cy="1735982"/>
           </a:xfrm>
           <a:prstGeom prst="rect">
             <a:avLst/>
@@ -8902,1186 +8918,13 @@
       </p:pic>
       <p:sp>
         <p:nvSpPr>
-          <p:cNvPr id="157" name="Freeform 156"/>
-          <p:cNvSpPr/>
-          <p:nvPr/>
-        </p:nvSpPr>
-        <p:spPr>
-          <a:xfrm>
-            <a:off x="29818788" y="5925956"/>
-            <a:ext cx="2034540" cy="1075055"/>
-          </a:xfrm>
-          <a:custGeom>
-            <a:avLst/>
-            <a:gdLst>
-              <a:gd name="connsiteX0" fmla="*/ 0 w 2034540"/>
-              <a:gd name="connsiteY0" fmla="*/ 1075552 h 1075552"/>
-              <a:gd name="connsiteX1" fmla="*/ 434340 w 2034540"/>
-              <a:gd name="connsiteY1" fmla="*/ 717412 h 1075552"/>
-              <a:gd name="connsiteX2" fmla="*/ 640080 w 2034540"/>
-              <a:gd name="connsiteY2" fmla="*/ 168772 h 1075552"/>
-              <a:gd name="connsiteX3" fmla="*/ 952500 w 2034540"/>
-              <a:gd name="connsiteY3" fmla="*/ 1132 h 1075552"/>
-              <a:gd name="connsiteX4" fmla="*/ 1272540 w 2034540"/>
-              <a:gd name="connsiteY4" fmla="*/ 229732 h 1075552"/>
-              <a:gd name="connsiteX5" fmla="*/ 1554480 w 2034540"/>
-              <a:gd name="connsiteY5" fmla="*/ 260212 h 1075552"/>
-              <a:gd name="connsiteX6" fmla="*/ 1767840 w 2034540"/>
-              <a:gd name="connsiteY6" fmla="*/ 176392 h 1075552"/>
-              <a:gd name="connsiteX7" fmla="*/ 2034540 w 2034540"/>
-              <a:gd name="connsiteY7" fmla="*/ 168772 h 1075552"/>
-            </a:gdLst>
-            <a:ahLst/>
-            <a:cxnLst>
-              <a:cxn ang="0">
-                <a:pos x="connsiteX0" y="connsiteY0"/>
-              </a:cxn>
-              <a:cxn ang="0">
-                <a:pos x="connsiteX1" y="connsiteY1"/>
-              </a:cxn>
-              <a:cxn ang="0">
-                <a:pos x="connsiteX2" y="connsiteY2"/>
-              </a:cxn>
-              <a:cxn ang="0">
-                <a:pos x="connsiteX3" y="connsiteY3"/>
-              </a:cxn>
-              <a:cxn ang="0">
-                <a:pos x="connsiteX4" y="connsiteY4"/>
-              </a:cxn>
-              <a:cxn ang="0">
-                <a:pos x="connsiteX5" y="connsiteY5"/>
-              </a:cxn>
-              <a:cxn ang="0">
-                <a:pos x="connsiteX6" y="connsiteY6"/>
-              </a:cxn>
-              <a:cxn ang="0">
-                <a:pos x="connsiteX7" y="connsiteY7"/>
-              </a:cxn>
-            </a:cxnLst>
-            <a:rect l="l" t="t" r="r" b="b"/>
-            <a:pathLst>
-              <a:path w="2034540" h="1075552">
-                <a:moveTo>
-                  <a:pt x="0" y="1075552"/>
-                </a:moveTo>
-                <a:cubicBezTo>
-                  <a:pt x="163830" y="972047"/>
-                  <a:pt x="327660" y="868542"/>
-                  <a:pt x="434340" y="717412"/>
-                </a:cubicBezTo>
-                <a:cubicBezTo>
-                  <a:pt x="541020" y="566282"/>
-                  <a:pt x="553720" y="288152"/>
-                  <a:pt x="640080" y="168772"/>
-                </a:cubicBezTo>
-                <a:cubicBezTo>
-                  <a:pt x="726440" y="49392"/>
-                  <a:pt x="847090" y="-9028"/>
-                  <a:pt x="952500" y="1132"/>
-                </a:cubicBezTo>
-                <a:cubicBezTo>
-                  <a:pt x="1057910" y="11292"/>
-                  <a:pt x="1172210" y="186552"/>
-                  <a:pt x="1272540" y="229732"/>
-                </a:cubicBezTo>
-                <a:cubicBezTo>
-                  <a:pt x="1372870" y="272912"/>
-                  <a:pt x="1471930" y="269102"/>
-                  <a:pt x="1554480" y="260212"/>
-                </a:cubicBezTo>
-                <a:cubicBezTo>
-                  <a:pt x="1637030" y="251322"/>
-                  <a:pt x="1687830" y="191632"/>
-                  <a:pt x="1767840" y="176392"/>
-                </a:cubicBezTo>
-                <a:cubicBezTo>
-                  <a:pt x="1847850" y="161152"/>
-                  <a:pt x="1969770" y="170042"/>
-                  <a:pt x="2034540" y="168772"/>
-                </a:cubicBezTo>
-              </a:path>
-            </a:pathLst>
-          </a:custGeom>
-        </p:spPr>
-        <p:style>
-          <a:lnRef idx="1">
-            <a:schemeClr val="dk1"/>
-          </a:lnRef>
-          <a:fillRef idx="0">
-            <a:schemeClr val="dk1"/>
-          </a:fillRef>
-          <a:effectRef idx="0">
-            <a:schemeClr val="dk1"/>
-          </a:effectRef>
-          <a:fontRef idx="minor">
-            <a:schemeClr val="tx1"/>
-          </a:fontRef>
-        </p:style>
-        <p:txBody>
-          <a:bodyPr rot="0" spcFirstLastPara="0" vert="horz" wrap="square" lIns="91440" tIns="45720" rIns="91440" bIns="45720" numCol="1" spcCol="0" rtlCol="0" fromWordArt="0" anchor="ctr" anchorCtr="0" forceAA="0" compatLnSpc="1">
-            <a:prstTxWarp prst="textNoShape">
-              <a:avLst/>
-            </a:prstTxWarp>
-            <a:noAutofit/>
-          </a:bodyPr>
-          <a:lstStyle/>
-          <a:p>
-            <a:endParaRPr lang="en-US"/>
-          </a:p>
-        </p:txBody>
-      </p:sp>
-      <p:sp>
-        <p:nvSpPr>
-          <p:cNvPr id="163" name="Rectangle 162"/>
-          <p:cNvSpPr/>
-          <p:nvPr/>
-        </p:nvSpPr>
-        <p:spPr>
-          <a:xfrm>
-            <a:off x="26237388" y="5797686"/>
-            <a:ext cx="815340" cy="1478280"/>
-          </a:xfrm>
-          <a:prstGeom prst="rect">
-            <a:avLst/>
-          </a:prstGeom>
-        </p:spPr>
-        <p:style>
-          <a:lnRef idx="2">
-            <a:schemeClr val="accent1">
-              <a:shade val="50000"/>
-            </a:schemeClr>
-          </a:lnRef>
-          <a:fillRef idx="1">
-            <a:schemeClr val="accent1"/>
-          </a:fillRef>
-          <a:effectRef idx="0">
-            <a:schemeClr val="accent1"/>
-          </a:effectRef>
-          <a:fontRef idx="minor">
-            <a:schemeClr val="lt1"/>
-          </a:fontRef>
-        </p:style>
-        <p:txBody>
-          <a:bodyPr rot="0" spcFirstLastPara="0" vert="horz" wrap="square" lIns="91440" tIns="45720" rIns="91440" bIns="45720" numCol="1" spcCol="0" rtlCol="0" fromWordArt="0" anchor="ctr" anchorCtr="0" forceAA="0" compatLnSpc="1">
-            <a:prstTxWarp prst="textNoShape">
-              <a:avLst/>
-            </a:prstTxWarp>
-            <a:noAutofit/>
-          </a:bodyPr>
-          <a:lstStyle/>
-          <a:p>
-            <a:endParaRPr lang="en-US"/>
-          </a:p>
-        </p:txBody>
-      </p:sp>
-      <p:sp>
-        <p:nvSpPr>
-          <p:cNvPr id="170" name="Rectangle 169"/>
-          <p:cNvSpPr/>
-          <p:nvPr/>
-        </p:nvSpPr>
-        <p:spPr>
-          <a:xfrm>
-            <a:off x="26283108" y="5911986"/>
-            <a:ext cx="45720" cy="1196340"/>
-          </a:xfrm>
-          <a:prstGeom prst="rect">
-            <a:avLst/>
-          </a:prstGeom>
-        </p:spPr>
-        <p:style>
-          <a:lnRef idx="2">
-            <a:schemeClr val="dk1">
-              <a:shade val="50000"/>
-            </a:schemeClr>
-          </a:lnRef>
-          <a:fillRef idx="1">
-            <a:schemeClr val="dk1"/>
-          </a:fillRef>
-          <a:effectRef idx="0">
-            <a:schemeClr val="dk1"/>
-          </a:effectRef>
-          <a:fontRef idx="minor">
-            <a:schemeClr val="lt1"/>
-          </a:fontRef>
-        </p:style>
-        <p:txBody>
-          <a:bodyPr rot="0" spcFirstLastPara="0" vert="horz" wrap="square" lIns="91440" tIns="45720" rIns="91440" bIns="45720" numCol="1" spcCol="0" rtlCol="0" fromWordArt="0" anchor="ctr" anchorCtr="0" forceAA="0" compatLnSpc="1">
-            <a:prstTxWarp prst="textNoShape">
-              <a:avLst/>
-            </a:prstTxWarp>
-            <a:noAutofit/>
-          </a:bodyPr>
-          <a:lstStyle/>
-          <a:p>
-            <a:endParaRPr lang="en-US"/>
-          </a:p>
-        </p:txBody>
-      </p:sp>
-      <p:sp>
-        <p:nvSpPr>
-          <p:cNvPr id="174" name="Rectangle 173"/>
-          <p:cNvSpPr/>
-          <p:nvPr/>
-        </p:nvSpPr>
-        <p:spPr>
-          <a:xfrm>
-            <a:off x="26976528" y="5896746"/>
-            <a:ext cx="45720" cy="1196340"/>
-          </a:xfrm>
-          <a:prstGeom prst="rect">
-            <a:avLst/>
-          </a:prstGeom>
-        </p:spPr>
-        <p:style>
-          <a:lnRef idx="2">
-            <a:schemeClr val="dk1">
-              <a:shade val="50000"/>
-            </a:schemeClr>
-          </a:lnRef>
-          <a:fillRef idx="1">
-            <a:schemeClr val="dk1"/>
-          </a:fillRef>
-          <a:effectRef idx="0">
-            <a:schemeClr val="dk1"/>
-          </a:effectRef>
-          <a:fontRef idx="minor">
-            <a:schemeClr val="lt1"/>
-          </a:fontRef>
-        </p:style>
-        <p:txBody>
-          <a:bodyPr rot="0" spcFirstLastPara="0" vert="horz" wrap="square" lIns="91440" tIns="45720" rIns="91440" bIns="45720" numCol="1" spcCol="0" rtlCol="0" fromWordArt="0" anchor="ctr" anchorCtr="0" forceAA="0" compatLnSpc="1">
-            <a:prstTxWarp prst="textNoShape">
-              <a:avLst/>
-            </a:prstTxWarp>
-            <a:noAutofit/>
-          </a:bodyPr>
-          <a:lstStyle/>
-          <a:p>
-            <a:endParaRPr lang="en-US"/>
-          </a:p>
-        </p:txBody>
-      </p:sp>
-      <p:sp>
-        <p:nvSpPr>
-          <p:cNvPr id="175" name="Rectangle 174"/>
-          <p:cNvSpPr/>
-          <p:nvPr/>
-        </p:nvSpPr>
-        <p:spPr>
-          <a:xfrm>
-            <a:off x="26412648" y="5819911"/>
-            <a:ext cx="472440" cy="45085"/>
-          </a:xfrm>
-          <a:prstGeom prst="rect">
-            <a:avLst/>
-          </a:prstGeom>
-        </p:spPr>
-        <p:style>
-          <a:lnRef idx="2">
-            <a:schemeClr val="dk1">
-              <a:shade val="50000"/>
-            </a:schemeClr>
-          </a:lnRef>
-          <a:fillRef idx="1">
-            <a:schemeClr val="dk1"/>
-          </a:fillRef>
-          <a:effectRef idx="0">
-            <a:schemeClr val="dk1"/>
-          </a:effectRef>
-          <a:fontRef idx="minor">
-            <a:schemeClr val="lt1"/>
-          </a:fontRef>
-        </p:style>
-        <p:txBody>
-          <a:bodyPr rot="0" spcFirstLastPara="0" vert="horz" wrap="square" lIns="91440" tIns="45720" rIns="91440" bIns="45720" numCol="1" spcCol="0" rtlCol="0" fromWordArt="0" anchor="ctr" anchorCtr="0" forceAA="0" compatLnSpc="1">
-            <a:prstTxWarp prst="textNoShape">
-              <a:avLst/>
-            </a:prstTxWarp>
-            <a:noAutofit/>
-          </a:bodyPr>
-          <a:lstStyle/>
-          <a:p>
-            <a:endParaRPr lang="en-US"/>
-          </a:p>
-        </p:txBody>
-      </p:sp>
-      <p:sp>
-        <p:nvSpPr>
-          <p:cNvPr id="176" name="Text Box 1"/>
-          <p:cNvSpPr txBox="1"/>
-          <p:nvPr/>
-        </p:nvSpPr>
-        <p:spPr>
-          <a:xfrm>
-            <a:off x="26298348" y="6110106"/>
-            <a:ext cx="739140" cy="723900"/>
-          </a:xfrm>
-          <a:prstGeom prst="rect">
-            <a:avLst/>
-          </a:prstGeom>
-          <a:noFill/>
-          <a:ln>
-            <a:noFill/>
-          </a:ln>
-          <a:effectLst/>
-        </p:spPr>
-        <p:txBody>
-          <a:bodyPr rot="0" spcFirstLastPara="0" vert="horz" wrap="square" lIns="91440" tIns="45720" rIns="91440" bIns="45720" numCol="1" spcCol="0" rtlCol="0" fromWordArt="0" anchor="t" anchorCtr="0" forceAA="0" compatLnSpc="1">
-            <a:prstTxWarp prst="textNoShape">
-              <a:avLst/>
-            </a:prstTxWarp>
-            <a:noAutofit/>
-          </a:bodyPr>
-          <a:lstStyle/>
-          <a:p>
-            <a:pPr marL="0" marR="0">
-              <a:lnSpc>
-                <a:spcPct val="107000"/>
-              </a:lnSpc>
-              <a:spcBef>
-                <a:spcPts val="0"/>
-              </a:spcBef>
-              <a:spcAft>
-                <a:spcPts val="800"/>
-              </a:spcAft>
-            </a:pPr>
-            <a:r>
-              <a:rPr lang="en-US" sz="1200" dirty="0">
-                <a:ln>
-                  <a:noFill/>
-                </a:ln>
-                <a:solidFill>
-                  <a:schemeClr val="bg1"/>
-                </a:solidFill>
-                <a:effectLst>
-                  <a:outerShdw blurRad="38100" dist="19050" dir="2700000" algn="tl">
-                    <a:schemeClr val="dk1">
-                      <a:alpha val="40000"/>
-                    </a:schemeClr>
-                  </a:outerShdw>
-                </a:effectLst>
-                <a:latin typeface="Calibri" panose="020F0502020204030204" pitchFamily="34" charset="0"/>
-                <a:ea typeface="Calibri" panose="020F0502020204030204" pitchFamily="34" charset="0"/>
-                <a:cs typeface="Times New Roman" panose="02020603050405020304" pitchFamily="18" charset="0"/>
-              </a:rPr>
-              <a:t>Arduino</a:t>
-            </a:r>
-            <a:endParaRPr lang="en-US" sz="1100" dirty="0">
-              <a:solidFill>
-                <a:schemeClr val="bg1"/>
-              </a:solidFill>
-              <a:effectLst/>
-              <a:latin typeface="Calibri" panose="020F0502020204030204" pitchFamily="34" charset="0"/>
-              <a:ea typeface="Calibri" panose="020F0502020204030204" pitchFamily="34" charset="0"/>
-              <a:cs typeface="Times New Roman" panose="02020603050405020304" pitchFamily="18" charset="0"/>
-            </a:endParaRPr>
-          </a:p>
-          <a:p>
-            <a:pPr marL="0" marR="0">
-              <a:lnSpc>
-                <a:spcPct val="107000"/>
-              </a:lnSpc>
-              <a:spcBef>
-                <a:spcPts val="0"/>
-              </a:spcBef>
-              <a:spcAft>
-                <a:spcPts val="800"/>
-              </a:spcAft>
-            </a:pPr>
-            <a:r>
-              <a:rPr lang="en-US" sz="1200" dirty="0">
-                <a:ln>
-                  <a:noFill/>
-                </a:ln>
-                <a:solidFill>
-                  <a:schemeClr val="bg1"/>
-                </a:solidFill>
-                <a:effectLst>
-                  <a:outerShdw blurRad="38100" dist="19050" dir="2700000" algn="tl">
-                    <a:schemeClr val="dk1">
-                      <a:alpha val="40000"/>
-                    </a:schemeClr>
-                  </a:outerShdw>
-                </a:effectLst>
-                <a:latin typeface="Calibri" panose="020F0502020204030204" pitchFamily="34" charset="0"/>
-                <a:ea typeface="Calibri" panose="020F0502020204030204" pitchFamily="34" charset="0"/>
-                <a:cs typeface="Times New Roman" panose="02020603050405020304" pitchFamily="18" charset="0"/>
-              </a:rPr>
-              <a:t>Mega</a:t>
-            </a:r>
-            <a:endParaRPr lang="en-US" sz="1100" dirty="0">
-              <a:solidFill>
-                <a:schemeClr val="bg1"/>
-              </a:solidFill>
-              <a:effectLst/>
-              <a:latin typeface="Calibri" panose="020F0502020204030204" pitchFamily="34" charset="0"/>
-              <a:ea typeface="Calibri" panose="020F0502020204030204" pitchFamily="34" charset="0"/>
-              <a:cs typeface="Times New Roman" panose="02020603050405020304" pitchFamily="18" charset="0"/>
-            </a:endParaRPr>
-          </a:p>
-        </p:txBody>
-      </p:sp>
-      <p:cxnSp>
-        <p:nvCxnSpPr>
-          <p:cNvPr id="177" name="Elbow Connector 176"/>
-          <p:cNvCxnSpPr/>
-          <p:nvPr/>
-        </p:nvCxnSpPr>
-        <p:spPr>
-          <a:xfrm>
-            <a:off x="27106068" y="6079626"/>
-            <a:ext cx="914400" cy="914400"/>
-          </a:xfrm>
-          <a:prstGeom prst="bentConnector3">
-            <a:avLst/>
-          </a:prstGeom>
-        </p:spPr>
-        <p:style>
-          <a:lnRef idx="1">
-            <a:schemeClr val="dk1"/>
-          </a:lnRef>
-          <a:fillRef idx="0">
-            <a:schemeClr val="dk1"/>
-          </a:fillRef>
-          <a:effectRef idx="0">
-            <a:schemeClr val="dk1"/>
-          </a:effectRef>
-          <a:fontRef idx="minor">
-            <a:schemeClr val="tx1"/>
-          </a:fontRef>
-        </p:style>
-      </p:cxnSp>
-      <p:cxnSp>
-        <p:nvCxnSpPr>
-          <p:cNvPr id="178" name="Elbow Connector 177"/>
-          <p:cNvCxnSpPr/>
-          <p:nvPr/>
-        </p:nvCxnSpPr>
-        <p:spPr>
-          <a:xfrm flipV="1">
-            <a:off x="28035708" y="6072006"/>
-            <a:ext cx="426720" cy="922020"/>
-          </a:xfrm>
-          <a:prstGeom prst="bentConnector3">
-            <a:avLst>
-              <a:gd name="adj1" fmla="val 15517"/>
-            </a:avLst>
-          </a:prstGeom>
-        </p:spPr>
-        <p:style>
-          <a:lnRef idx="1">
-            <a:schemeClr val="dk1"/>
-          </a:lnRef>
-          <a:fillRef idx="0">
-            <a:schemeClr val="dk1"/>
-          </a:fillRef>
-          <a:effectRef idx="0">
-            <a:schemeClr val="dk1"/>
-          </a:effectRef>
-          <a:fontRef idx="minor">
-            <a:schemeClr val="tx1"/>
-          </a:fontRef>
-        </p:style>
-      </p:cxnSp>
-      <p:cxnSp>
-        <p:nvCxnSpPr>
-          <p:cNvPr id="179" name="Elbow Connector 178"/>
-          <p:cNvCxnSpPr/>
-          <p:nvPr/>
-        </p:nvCxnSpPr>
-        <p:spPr>
-          <a:xfrm>
-            <a:off x="28218588" y="6072006"/>
-            <a:ext cx="914400" cy="914400"/>
-          </a:xfrm>
-          <a:prstGeom prst="bentConnector3">
-            <a:avLst/>
-          </a:prstGeom>
-        </p:spPr>
-        <p:style>
-          <a:lnRef idx="1">
-            <a:schemeClr val="dk1"/>
-          </a:lnRef>
-          <a:fillRef idx="0">
-            <a:schemeClr val="dk1"/>
-          </a:fillRef>
-          <a:effectRef idx="0">
-            <a:schemeClr val="dk1"/>
-          </a:effectRef>
-          <a:fontRef idx="minor">
-            <a:schemeClr val="tx1"/>
-          </a:fontRef>
-        </p:style>
-      </p:cxnSp>
-      <p:sp>
-        <p:nvSpPr>
-          <p:cNvPr id="180" name="Rectangle 179"/>
-          <p:cNvSpPr/>
-          <p:nvPr/>
-        </p:nvSpPr>
-        <p:spPr>
-          <a:xfrm>
-            <a:off x="29033928" y="5820546"/>
-            <a:ext cx="982980" cy="1447800"/>
-          </a:xfrm>
-          <a:prstGeom prst="rect">
-            <a:avLst/>
-          </a:prstGeom>
-        </p:spPr>
-        <p:style>
-          <a:lnRef idx="2">
-            <a:schemeClr val="accent3">
-              <a:shade val="50000"/>
-            </a:schemeClr>
-          </a:lnRef>
-          <a:fillRef idx="1">
-            <a:schemeClr val="accent3"/>
-          </a:fillRef>
-          <a:effectRef idx="0">
-            <a:schemeClr val="accent3"/>
-          </a:effectRef>
-          <a:fontRef idx="minor">
-            <a:schemeClr val="lt1"/>
-          </a:fontRef>
-        </p:style>
-        <p:txBody>
-          <a:bodyPr rot="0" spcFirstLastPara="0" vert="horz" wrap="square" lIns="91440" tIns="45720" rIns="91440" bIns="45720" numCol="1" spcCol="0" rtlCol="0" fromWordArt="0" anchor="ctr" anchorCtr="0" forceAA="0" compatLnSpc="1">
-            <a:prstTxWarp prst="textNoShape">
-              <a:avLst/>
-            </a:prstTxWarp>
-            <a:noAutofit/>
-          </a:bodyPr>
-          <a:lstStyle/>
-          <a:p>
-            <a:endParaRPr lang="en-US"/>
-          </a:p>
-        </p:txBody>
-      </p:sp>
-      <p:sp>
-        <p:nvSpPr>
-          <p:cNvPr id="181" name="Text Box 17"/>
-          <p:cNvSpPr txBox="1"/>
-          <p:nvPr/>
-        </p:nvSpPr>
-        <p:spPr>
-          <a:xfrm>
-            <a:off x="28962296" y="6430146"/>
-            <a:ext cx="1104020" cy="281231"/>
-          </a:xfrm>
-          <a:prstGeom prst="rect">
-            <a:avLst/>
-          </a:prstGeom>
-          <a:noFill/>
-          <a:ln>
-            <a:noFill/>
-          </a:ln>
-          <a:effectLst/>
-        </p:spPr>
-        <p:txBody>
-          <a:bodyPr rot="0" spcFirstLastPara="0" vert="horz" wrap="none" lIns="91440" tIns="45720" rIns="91440" bIns="45720" numCol="1" spcCol="0" rtlCol="0" fromWordArt="0" anchor="t" anchorCtr="0" forceAA="0" compatLnSpc="1">
-            <a:prstTxWarp prst="textNoShape">
-              <a:avLst/>
-            </a:prstTxWarp>
-            <a:spAutoFit/>
-          </a:bodyPr>
-          <a:lstStyle/>
-          <a:p>
-            <a:pPr marL="0" marR="0" algn="ctr">
-              <a:lnSpc>
-                <a:spcPct val="107000"/>
-              </a:lnSpc>
-              <a:spcBef>
-                <a:spcPts val="0"/>
-              </a:spcBef>
-              <a:spcAft>
-                <a:spcPts val="800"/>
-              </a:spcAft>
-            </a:pPr>
-            <a:r>
-              <a:rPr lang="en-US" sz="1200" dirty="0">
-                <a:ln>
-                  <a:noFill/>
-                </a:ln>
-                <a:solidFill>
-                  <a:schemeClr val="bg1"/>
-                </a:solidFill>
-                <a:effectLst>
-                  <a:outerShdw blurRad="38100" dist="19050" dir="2700000" algn="tl">
-                    <a:schemeClr val="dk1">
-                      <a:alpha val="40000"/>
-                    </a:schemeClr>
-                  </a:outerShdw>
-                </a:effectLst>
-                <a:latin typeface="Calibri" panose="020F0502020204030204" pitchFamily="34" charset="0"/>
-                <a:ea typeface="Calibri" panose="020F0502020204030204" pitchFamily="34" charset="0"/>
-                <a:cs typeface="Times New Roman" panose="02020603050405020304" pitchFamily="18" charset="0"/>
-              </a:rPr>
-              <a:t>Low Pass Filter</a:t>
-            </a:r>
-            <a:endParaRPr lang="en-US" sz="1100" dirty="0">
-              <a:solidFill>
-                <a:schemeClr val="bg1"/>
-              </a:solidFill>
-              <a:effectLst/>
-              <a:latin typeface="Calibri" panose="020F0502020204030204" pitchFamily="34" charset="0"/>
-              <a:ea typeface="Calibri" panose="020F0502020204030204" pitchFamily="34" charset="0"/>
-              <a:cs typeface="Times New Roman" panose="02020603050405020304" pitchFamily="18" charset="0"/>
-            </a:endParaRPr>
-          </a:p>
-        </p:txBody>
-      </p:sp>
-      <p:sp>
-        <p:nvSpPr>
-          <p:cNvPr id="182" name="Rounded Rectangle 181"/>
-          <p:cNvSpPr/>
-          <p:nvPr/>
-        </p:nvSpPr>
-        <p:spPr>
-          <a:xfrm>
-            <a:off x="31590438" y="5843406"/>
-            <a:ext cx="1478280" cy="1531620"/>
-          </a:xfrm>
-          <a:prstGeom prst="roundRect">
-            <a:avLst/>
-          </a:prstGeom>
-        </p:spPr>
-        <p:style>
-          <a:lnRef idx="2">
-            <a:schemeClr val="accent1">
-              <a:shade val="50000"/>
-            </a:schemeClr>
-          </a:lnRef>
-          <a:fillRef idx="1">
-            <a:schemeClr val="accent1"/>
-          </a:fillRef>
-          <a:effectRef idx="0">
-            <a:schemeClr val="accent1"/>
-          </a:effectRef>
-          <a:fontRef idx="minor">
-            <a:schemeClr val="lt1"/>
-          </a:fontRef>
-        </p:style>
-        <p:txBody>
-          <a:bodyPr rot="0" spcFirstLastPara="0" vert="horz" wrap="square" lIns="91440" tIns="45720" rIns="91440" bIns="45720" numCol="1" spcCol="0" rtlCol="0" fromWordArt="0" anchor="ctr" anchorCtr="0" forceAA="0" compatLnSpc="1">
-            <a:prstTxWarp prst="textNoShape">
-              <a:avLst/>
-            </a:prstTxWarp>
-            <a:noAutofit/>
-          </a:bodyPr>
-          <a:lstStyle/>
-          <a:p>
-            <a:endParaRPr lang="en-US"/>
-          </a:p>
-        </p:txBody>
-      </p:sp>
-      <p:sp>
-        <p:nvSpPr>
-          <p:cNvPr id="184" name="Text Box 24"/>
-          <p:cNvSpPr txBox="1"/>
-          <p:nvPr/>
-        </p:nvSpPr>
-        <p:spPr>
-          <a:xfrm>
-            <a:off x="31551068" y="6110106"/>
-            <a:ext cx="1550296" cy="890372"/>
-          </a:xfrm>
-          <a:prstGeom prst="rect">
-            <a:avLst/>
-          </a:prstGeom>
-          <a:noFill/>
-          <a:ln>
-            <a:noFill/>
-          </a:ln>
-          <a:effectLst/>
-        </p:spPr>
-        <p:txBody>
-          <a:bodyPr rot="0" spcFirstLastPara="0" vert="horz" wrap="none" lIns="91440" tIns="45720" rIns="91440" bIns="45720" numCol="1" spcCol="0" rtlCol="0" fromWordArt="0" anchor="t" anchorCtr="0" forceAA="0" compatLnSpc="1">
-            <a:prstTxWarp prst="textNoShape">
-              <a:avLst/>
-            </a:prstTxWarp>
-            <a:spAutoFit/>
-          </a:bodyPr>
-          <a:lstStyle/>
-          <a:p>
-            <a:pPr marL="0" marR="0">
-              <a:lnSpc>
-                <a:spcPct val="107000"/>
-              </a:lnSpc>
-              <a:spcBef>
-                <a:spcPts val="0"/>
-              </a:spcBef>
-              <a:spcAft>
-                <a:spcPts val="800"/>
-              </a:spcAft>
-            </a:pPr>
-            <a:r>
-              <a:rPr lang="en-US" sz="1200" dirty="0">
-                <a:ln>
-                  <a:noFill/>
-                </a:ln>
-                <a:solidFill>
-                  <a:schemeClr val="bg1"/>
-                </a:solidFill>
-                <a:effectLst>
-                  <a:outerShdw blurRad="38100" dist="19050" dir="2700000" algn="tl">
-                    <a:schemeClr val="dk1">
-                      <a:alpha val="40000"/>
-                    </a:schemeClr>
-                  </a:outerShdw>
-                </a:effectLst>
-                <a:latin typeface="Calibri" panose="020F0502020204030204" pitchFamily="34" charset="0"/>
-                <a:ea typeface="Calibri" panose="020F0502020204030204" pitchFamily="34" charset="0"/>
-                <a:cs typeface="Times New Roman" panose="02020603050405020304" pitchFamily="18" charset="0"/>
-              </a:rPr>
-              <a:t>Pneumatic Subsystem</a:t>
-            </a:r>
-            <a:endParaRPr lang="en-US" sz="1100" dirty="0">
-              <a:solidFill>
-                <a:schemeClr val="bg1"/>
-              </a:solidFill>
-              <a:effectLst/>
-              <a:latin typeface="Calibri" panose="020F0502020204030204" pitchFamily="34" charset="0"/>
-              <a:ea typeface="Calibri" panose="020F0502020204030204" pitchFamily="34" charset="0"/>
-              <a:cs typeface="Times New Roman" panose="02020603050405020304" pitchFamily="18" charset="0"/>
-            </a:endParaRPr>
-          </a:p>
-          <a:p>
-            <a:pPr marL="0" marR="0">
-              <a:lnSpc>
-                <a:spcPct val="107000"/>
-              </a:lnSpc>
-              <a:spcBef>
-                <a:spcPts val="0"/>
-              </a:spcBef>
-              <a:spcAft>
-                <a:spcPts val="800"/>
-              </a:spcAft>
-            </a:pPr>
-            <a:r>
-              <a:rPr lang="en-US" sz="1200" dirty="0">
-                <a:ln>
-                  <a:noFill/>
-                </a:ln>
-                <a:solidFill>
-                  <a:schemeClr val="bg1"/>
-                </a:solidFill>
-                <a:effectLst>
-                  <a:outerShdw blurRad="38100" dist="19050" dir="2700000" algn="tl">
-                    <a:schemeClr val="dk1">
-                      <a:alpha val="40000"/>
-                    </a:schemeClr>
-                  </a:outerShdw>
-                </a:effectLst>
-                <a:latin typeface="Calibri" panose="020F0502020204030204" pitchFamily="34" charset="0"/>
-                <a:ea typeface="Calibri" panose="020F0502020204030204" pitchFamily="34" charset="0"/>
-                <a:cs typeface="Times New Roman" panose="02020603050405020304" pitchFamily="18" charset="0"/>
-              </a:rPr>
-              <a:t> </a:t>
-            </a:r>
-            <a:endParaRPr lang="en-US" sz="1100" dirty="0">
-              <a:solidFill>
-                <a:schemeClr val="bg1"/>
-              </a:solidFill>
-              <a:effectLst/>
-              <a:latin typeface="Calibri" panose="020F0502020204030204" pitchFamily="34" charset="0"/>
-              <a:ea typeface="Calibri" panose="020F0502020204030204" pitchFamily="34" charset="0"/>
-              <a:cs typeface="Times New Roman" panose="02020603050405020304" pitchFamily="18" charset="0"/>
-            </a:endParaRPr>
-          </a:p>
-          <a:p>
-            <a:pPr marL="0" marR="0">
-              <a:lnSpc>
-                <a:spcPct val="107000"/>
-              </a:lnSpc>
-              <a:spcBef>
-                <a:spcPts val="0"/>
-              </a:spcBef>
-              <a:spcAft>
-                <a:spcPts val="800"/>
-              </a:spcAft>
-            </a:pPr>
-            <a:r>
-              <a:rPr lang="en-US" sz="1200" dirty="0">
-                <a:ln>
-                  <a:noFill/>
-                </a:ln>
-                <a:solidFill>
-                  <a:schemeClr val="bg1"/>
-                </a:solidFill>
-                <a:effectLst>
-                  <a:outerShdw blurRad="38100" dist="19050" dir="2700000" algn="tl">
-                    <a:schemeClr val="dk1">
-                      <a:alpha val="40000"/>
-                    </a:schemeClr>
-                  </a:outerShdw>
-                </a:effectLst>
-                <a:latin typeface="Calibri" panose="020F0502020204030204" pitchFamily="34" charset="0"/>
-                <a:ea typeface="Calibri" panose="020F0502020204030204" pitchFamily="34" charset="0"/>
-                <a:cs typeface="Times New Roman" panose="02020603050405020304" pitchFamily="18" charset="0"/>
-              </a:rPr>
-              <a:t>Valves and Cylinders</a:t>
-            </a:r>
-            <a:endParaRPr lang="en-US" sz="1100" dirty="0">
-              <a:solidFill>
-                <a:schemeClr val="bg1"/>
-              </a:solidFill>
-              <a:effectLst/>
-              <a:latin typeface="Calibri" panose="020F0502020204030204" pitchFamily="34" charset="0"/>
-              <a:ea typeface="Calibri" panose="020F0502020204030204" pitchFamily="34" charset="0"/>
-              <a:cs typeface="Times New Roman" panose="02020603050405020304" pitchFamily="18" charset="0"/>
-            </a:endParaRPr>
-          </a:p>
-        </p:txBody>
-      </p:sp>
-      <p:cxnSp>
-        <p:nvCxnSpPr>
-          <p:cNvPr id="186" name="Curved Connector 185"/>
-          <p:cNvCxnSpPr/>
-          <p:nvPr/>
-        </p:nvCxnSpPr>
-        <p:spPr>
-          <a:xfrm flipH="1">
-            <a:off x="30275988" y="7435986"/>
-            <a:ext cx="1607820" cy="1219200"/>
-          </a:xfrm>
-          <a:prstGeom prst="curvedConnector3">
-            <a:avLst/>
-          </a:prstGeom>
-          <a:ln>
-            <a:tailEnd type="triangle"/>
-          </a:ln>
-        </p:spPr>
-        <p:style>
-          <a:lnRef idx="1">
-            <a:schemeClr val="dk1"/>
-          </a:lnRef>
-          <a:fillRef idx="0">
-            <a:schemeClr val="dk1"/>
-          </a:fillRef>
-          <a:effectRef idx="0">
-            <a:schemeClr val="dk1"/>
-          </a:effectRef>
-          <a:fontRef idx="minor">
-            <a:schemeClr val="tx1"/>
-          </a:fontRef>
-        </p:style>
-      </p:cxnSp>
-      <p:cxnSp>
-        <p:nvCxnSpPr>
-          <p:cNvPr id="187" name="Curved Connector 186"/>
-          <p:cNvCxnSpPr/>
-          <p:nvPr/>
-        </p:nvCxnSpPr>
-        <p:spPr>
-          <a:xfrm flipH="1" flipV="1">
-            <a:off x="27106068" y="7184526"/>
-            <a:ext cx="2011680" cy="1508760"/>
-          </a:xfrm>
-          <a:prstGeom prst="curvedConnector3">
-            <a:avLst/>
-          </a:prstGeom>
-          <a:ln>
-            <a:tailEnd type="triangle"/>
-          </a:ln>
-        </p:spPr>
-        <p:style>
-          <a:lnRef idx="1">
-            <a:schemeClr val="dk1"/>
-          </a:lnRef>
-          <a:fillRef idx="0">
-            <a:schemeClr val="dk1"/>
-          </a:fillRef>
-          <a:effectRef idx="0">
-            <a:schemeClr val="dk1"/>
-          </a:effectRef>
-          <a:fontRef idx="minor">
-            <a:schemeClr val="tx1"/>
-          </a:fontRef>
-        </p:style>
-      </p:cxnSp>
-      <p:sp>
-        <p:nvSpPr>
-          <p:cNvPr id="188" name="Text Box 29"/>
-          <p:cNvSpPr txBox="1"/>
-          <p:nvPr/>
-        </p:nvSpPr>
-        <p:spPr>
-          <a:xfrm>
-            <a:off x="29125368" y="8525646"/>
-            <a:ext cx="1170940" cy="417195"/>
-          </a:xfrm>
-          <a:prstGeom prst="rect">
-            <a:avLst/>
-          </a:prstGeom>
-          <a:noFill/>
-          <a:ln>
-            <a:noFill/>
-          </a:ln>
-          <a:effectLst/>
-        </p:spPr>
-        <p:txBody>
-          <a:bodyPr rot="0" spcFirstLastPara="0" vert="horz" wrap="none" lIns="91440" tIns="45720" rIns="91440" bIns="45720" numCol="1" spcCol="0" rtlCol="0" fromWordArt="0" anchor="t" anchorCtr="0" forceAA="0" compatLnSpc="1">
-            <a:prstTxWarp prst="textNoShape">
-              <a:avLst/>
-            </a:prstTxWarp>
-            <a:spAutoFit/>
-          </a:bodyPr>
-          <a:lstStyle/>
-          <a:p>
-            <a:pPr marL="0" marR="0" algn="ctr">
-              <a:lnSpc>
-                <a:spcPct val="107000"/>
-              </a:lnSpc>
-              <a:spcBef>
-                <a:spcPts val="0"/>
-              </a:spcBef>
-              <a:spcAft>
-                <a:spcPts val="800"/>
-              </a:spcAft>
-            </a:pPr>
-            <a:r>
-              <a:rPr lang="en-US" sz="1200">
-                <a:ln>
-                  <a:noFill/>
-                </a:ln>
-                <a:solidFill>
-                  <a:srgbClr val="000000"/>
-                </a:solidFill>
-                <a:effectLst>
-                  <a:outerShdw blurRad="38100" dist="19050" dir="2700000" algn="tl">
-                    <a:schemeClr val="dk1">
-                      <a:alpha val="40000"/>
-                    </a:schemeClr>
-                  </a:outerShdw>
-                </a:effectLst>
-                <a:latin typeface="Calibri" panose="020F0502020204030204" pitchFamily="34" charset="0"/>
-                <a:ea typeface="Calibri" panose="020F0502020204030204" pitchFamily="34" charset="0"/>
-                <a:cs typeface="Times New Roman" panose="02020603050405020304" pitchFamily="18" charset="0"/>
-              </a:rPr>
-              <a:t>Feedback Signal</a:t>
-            </a:r>
-            <a:endParaRPr lang="en-US" sz="1100">
-              <a:effectLst/>
-              <a:latin typeface="Calibri" panose="020F0502020204030204" pitchFamily="34" charset="0"/>
-              <a:ea typeface="Calibri" panose="020F0502020204030204" pitchFamily="34" charset="0"/>
-              <a:cs typeface="Times New Roman" panose="02020603050405020304" pitchFamily="18" charset="0"/>
-            </a:endParaRPr>
-          </a:p>
-        </p:txBody>
-      </p:sp>
-      <p:sp>
-        <p:nvSpPr>
-          <p:cNvPr id="189" name="Text Box 30"/>
-          <p:cNvSpPr txBox="1"/>
-          <p:nvPr/>
-        </p:nvSpPr>
-        <p:spPr>
-          <a:xfrm>
-            <a:off x="27014628" y="5637666"/>
-            <a:ext cx="2047875" cy="417195"/>
-          </a:xfrm>
-          <a:prstGeom prst="rect">
-            <a:avLst/>
-          </a:prstGeom>
-          <a:noFill/>
-          <a:ln>
-            <a:noFill/>
-          </a:ln>
-          <a:effectLst/>
-        </p:spPr>
-        <p:txBody>
-          <a:bodyPr rot="0" spcFirstLastPara="0" vert="horz" wrap="none" lIns="91440" tIns="45720" rIns="91440" bIns="45720" numCol="1" spcCol="0" rtlCol="0" fromWordArt="0" anchor="t" anchorCtr="0" forceAA="0" compatLnSpc="1">
-            <a:prstTxWarp prst="textNoShape">
-              <a:avLst/>
-            </a:prstTxWarp>
-            <a:spAutoFit/>
-          </a:bodyPr>
-          <a:lstStyle/>
-          <a:p>
-            <a:pPr marL="0" marR="0" algn="ctr">
-              <a:lnSpc>
-                <a:spcPct val="107000"/>
-              </a:lnSpc>
-              <a:spcBef>
-                <a:spcPts val="0"/>
-              </a:spcBef>
-              <a:spcAft>
-                <a:spcPts val="800"/>
-              </a:spcAft>
-            </a:pPr>
-            <a:r>
-              <a:rPr lang="en-US" sz="1200">
-                <a:ln>
-                  <a:noFill/>
-                </a:ln>
-                <a:solidFill>
-                  <a:srgbClr val="000000"/>
-                </a:solidFill>
-                <a:effectLst>
-                  <a:outerShdw blurRad="38100" dist="19050" dir="2700000" algn="tl">
-                    <a:schemeClr val="dk1">
-                      <a:alpha val="40000"/>
-                    </a:schemeClr>
-                  </a:outerShdw>
-                </a:effectLst>
-                <a:latin typeface="Calibri" panose="020F0502020204030204" pitchFamily="34" charset="0"/>
-                <a:ea typeface="Calibri" panose="020F0502020204030204" pitchFamily="34" charset="0"/>
-                <a:cs typeface="Times New Roman" panose="02020603050405020304" pitchFamily="18" charset="0"/>
-              </a:rPr>
-              <a:t>Pulse Width Modulated Signal</a:t>
-            </a:r>
-            <a:endParaRPr lang="en-US" sz="1100">
-              <a:effectLst/>
-              <a:latin typeface="Calibri" panose="020F0502020204030204" pitchFamily="34" charset="0"/>
-              <a:ea typeface="Calibri" panose="020F0502020204030204" pitchFamily="34" charset="0"/>
-              <a:cs typeface="Times New Roman" panose="02020603050405020304" pitchFamily="18" charset="0"/>
-            </a:endParaRPr>
-          </a:p>
-        </p:txBody>
-      </p:sp>
-      <p:sp>
-        <p:nvSpPr>
-          <p:cNvPr id="190" name="Text Box 31"/>
-          <p:cNvSpPr txBox="1"/>
-          <p:nvPr/>
-        </p:nvSpPr>
-        <p:spPr>
-          <a:xfrm>
-            <a:off x="30344568" y="5614806"/>
-            <a:ext cx="941705" cy="399415"/>
-          </a:xfrm>
-          <a:prstGeom prst="rect">
-            <a:avLst/>
-          </a:prstGeom>
-          <a:noFill/>
-          <a:ln>
-            <a:noFill/>
-          </a:ln>
-          <a:effectLst/>
-        </p:spPr>
-        <p:txBody>
-          <a:bodyPr rot="0" spcFirstLastPara="0" vert="horz" wrap="none" lIns="91440" tIns="45720" rIns="91440" bIns="45720" numCol="1" spcCol="0" rtlCol="0" fromWordArt="0" anchor="t" anchorCtr="0" forceAA="0" compatLnSpc="1">
-            <a:prstTxWarp prst="textNoShape">
-              <a:avLst/>
-            </a:prstTxWarp>
-            <a:spAutoFit/>
-          </a:bodyPr>
-          <a:lstStyle/>
-          <a:p>
-            <a:pPr marL="0" marR="0" algn="ctr">
-              <a:lnSpc>
-                <a:spcPct val="107000"/>
-              </a:lnSpc>
-              <a:spcBef>
-                <a:spcPts val="0"/>
-              </a:spcBef>
-              <a:spcAft>
-                <a:spcPts val="800"/>
-              </a:spcAft>
-            </a:pPr>
-            <a:r>
-              <a:rPr lang="en-US" sz="1100">
-                <a:ln>
-                  <a:noFill/>
-                </a:ln>
-                <a:solidFill>
-                  <a:srgbClr val="000000"/>
-                </a:solidFill>
-                <a:effectLst>
-                  <a:outerShdw blurRad="38100" dist="19050" dir="2700000" algn="tl">
-                    <a:schemeClr val="dk1">
-                      <a:alpha val="40000"/>
-                    </a:schemeClr>
-                  </a:outerShdw>
-                </a:effectLst>
-                <a:latin typeface="Calibri" panose="020F0502020204030204" pitchFamily="34" charset="0"/>
-                <a:ea typeface="Calibri" panose="020F0502020204030204" pitchFamily="34" charset="0"/>
-                <a:cs typeface="Times New Roman" panose="02020603050405020304" pitchFamily="18" charset="0"/>
-              </a:rPr>
-              <a:t>Analog Signal</a:t>
-            </a:r>
-            <a:endParaRPr lang="en-US" sz="1100">
-              <a:effectLst/>
-              <a:latin typeface="Calibri" panose="020F0502020204030204" pitchFamily="34" charset="0"/>
-              <a:ea typeface="Calibri" panose="020F0502020204030204" pitchFamily="34" charset="0"/>
-              <a:cs typeface="Times New Roman" panose="02020603050405020304" pitchFamily="18" charset="0"/>
-            </a:endParaRPr>
-          </a:p>
-        </p:txBody>
-      </p:sp>
-      <p:sp>
-        <p:nvSpPr>
-          <p:cNvPr id="18" name="Rectangle 19"/>
-          <p:cNvSpPr>
-            <a:spLocks noChangeArrowheads="1"/>
-          </p:cNvSpPr>
-          <p:nvPr/>
-        </p:nvSpPr>
-        <p:spPr bwMode="auto">
-          <a:xfrm>
-            <a:off x="25322988" y="3382146"/>
-            <a:ext cx="36576000" cy="457200"/>
-          </a:xfrm>
-          <a:prstGeom prst="rect">
-            <a:avLst/>
-          </a:prstGeom>
-          <a:noFill/>
-          <a:ln>
-            <a:noFill/>
-          </a:ln>
-          <a:effectLst/>
-          <a:extLst>
-            <a:ext uri="{909E8E84-426E-40DD-AFC4-6F175D3DCCD1}">
-              <a14:hiddenFill xmlns:a14="http://schemas.microsoft.com/office/drawing/2010/main">
-                <a:solidFill>
-                  <a:schemeClr val="accent1"/>
-                </a:solidFill>
-              </a14:hiddenFill>
-            </a:ext>
-            <a:ext uri="{91240B29-F687-4F45-9708-019B960494DF}">
-              <a14:hiddenLine xmlns:a14="http://schemas.microsoft.com/office/drawing/2010/main" w="9525">
-                <a:solidFill>
-                  <a:schemeClr val="tx1"/>
-                </a:solidFill>
-                <a:miter lim="800000"/>
-                <a:headEnd/>
-                <a:tailEnd/>
-              </a14:hiddenLine>
-            </a:ext>
-            <a:ext uri="{AF507438-7753-43E0-B8FC-AC1667EBCBE1}">
-              <a14:hiddenEffects xmlns:a14="http://schemas.microsoft.com/office/drawing/2010/main">
-                <a:effectLst>
-                  <a:outerShdw dist="35921" dir="2700000" algn="ctr" rotWithShape="0">
-                    <a:schemeClr val="bg2"/>
-                  </a:outerShdw>
-                </a:effectLst>
-              </a14:hiddenEffects>
-            </a:ext>
-          </a:extLst>
-        </p:spPr>
-        <p:txBody>
-          <a:bodyPr vert="horz" wrap="none" lIns="91440" tIns="45720" rIns="91440" bIns="45720" numCol="1" anchor="ctr" anchorCtr="0" compatLnSpc="1">
-            <a:prstTxWarp prst="textNoShape">
-              <a:avLst/>
-            </a:prstTxWarp>
-            <a:spAutoFit/>
-          </a:bodyPr>
-          <a:lstStyle/>
-          <a:p>
-            <a:endParaRPr lang="en-US"/>
-          </a:p>
-        </p:txBody>
-      </p:sp>
-      <p:sp>
-        <p:nvSpPr>
           <p:cNvPr id="21" name="TextBox 20"/>
           <p:cNvSpPr txBox="1"/>
           <p:nvPr/>
         </p:nvSpPr>
         <p:spPr>
           <a:xfrm>
-            <a:off x="626881" y="3215594"/>
+            <a:off x="626881" y="3274172"/>
             <a:ext cx="9451403" cy="584775"/>
           </a:xfrm>
           <a:prstGeom prst="rect">
@@ -10121,7 +8964,7 @@
         </p:nvSpPr>
         <p:spPr>
           <a:xfrm>
-            <a:off x="630142" y="6891270"/>
+            <a:off x="630142" y="6949848"/>
             <a:ext cx="9448143" cy="584775"/>
           </a:xfrm>
           <a:prstGeom prst="rect">
@@ -10161,7 +9004,7 @@
         </p:nvSpPr>
         <p:spPr>
           <a:xfrm>
-            <a:off x="626880" y="9175846"/>
+            <a:off x="626880" y="9234424"/>
             <a:ext cx="9451403" cy="584775"/>
           </a:xfrm>
           <a:prstGeom prst="rect">
@@ -10201,7 +9044,7 @@
         </p:nvGrpSpPr>
         <p:grpSpPr>
           <a:xfrm>
-            <a:off x="553282" y="15034023"/>
+            <a:off x="553282" y="15092601"/>
             <a:ext cx="9525000" cy="2293277"/>
             <a:chOff x="553282" y="14969074"/>
             <a:chExt cx="9525000" cy="2293277"/>
@@ -10267,15 +9110,7 @@
                     <a:schemeClr val="bg1"/>
                   </a:solidFill>
                 </a:rPr>
-                <a:t>Mechanical </a:t>
-              </a:r>
-              <a:r>
-                <a:rPr lang="en-US" sz="3200" b="1" dirty="0" smtClean="0">
-                  <a:solidFill>
-                    <a:schemeClr val="bg1"/>
-                  </a:solidFill>
-                </a:rPr>
-                <a:t>Design</a:t>
+                <a:t>Mechanical Design</a:t>
               </a:r>
               <a:endParaRPr lang="en-US" sz="3200" b="1" dirty="0">
                 <a:solidFill>
@@ -10294,7 +9129,7 @@
         </p:nvGrpSpPr>
         <p:grpSpPr>
           <a:xfrm>
-            <a:off x="12478680" y="6932345"/>
+            <a:off x="13774080" y="7532630"/>
             <a:ext cx="9555480" cy="3583255"/>
             <a:chOff x="11088911" y="8340476"/>
             <a:chExt cx="9555480" cy="3583255"/>
@@ -10431,7 +9266,7 @@
         </p:nvSpPr>
         <p:spPr>
           <a:xfrm>
-            <a:off x="12463885" y="15045370"/>
+            <a:off x="13759285" y="15645655"/>
             <a:ext cx="9533985" cy="584775"/>
           </a:xfrm>
           <a:prstGeom prst="rect">
@@ -10471,7 +9306,7 @@
         </p:nvSpPr>
         <p:spPr>
           <a:xfrm>
-            <a:off x="24681005" y="3253568"/>
+            <a:off x="26392996" y="3233409"/>
             <a:ext cx="9583874" cy="584775"/>
           </a:xfrm>
           <a:prstGeom prst="rect">
@@ -10511,7 +9346,7 @@
         </p:nvSpPr>
         <p:spPr>
           <a:xfrm>
-            <a:off x="24681004" y="8853058"/>
+            <a:off x="26392996" y="8686800"/>
             <a:ext cx="9584370" cy="584775"/>
           </a:xfrm>
           <a:prstGeom prst="rect">
@@ -10551,7 +9386,7 @@
         </p:nvSpPr>
         <p:spPr>
           <a:xfrm>
-            <a:off x="24655411" y="15951169"/>
+            <a:off x="26367403" y="15468600"/>
             <a:ext cx="9751397" cy="584775"/>
           </a:xfrm>
           <a:prstGeom prst="rect">
@@ -10599,7 +9434,7 @@
         </p:nvSpPr>
         <p:spPr>
           <a:xfrm>
-            <a:off x="24681004" y="21037668"/>
+            <a:off x="26392996" y="20726400"/>
             <a:ext cx="9686966" cy="584775"/>
           </a:xfrm>
           <a:prstGeom prst="rect">
@@ -10639,7 +9474,7 @@
         </p:nvSpPr>
         <p:spPr>
           <a:xfrm>
-            <a:off x="24681004" y="23744360"/>
+            <a:off x="26392996" y="25125564"/>
             <a:ext cx="9685196" cy="584775"/>
           </a:xfrm>
           <a:prstGeom prst="rect">
@@ -10679,7 +9514,7 @@
         </p:nvSpPr>
         <p:spPr>
           <a:xfrm>
-            <a:off x="657196" y="20768608"/>
+            <a:off x="657196" y="20827186"/>
             <a:ext cx="9525000" cy="1938992"/>
           </a:xfrm>
           <a:prstGeom prst="rect">
@@ -10709,7 +9544,7 @@
         </p:nvGrpSpPr>
         <p:grpSpPr>
           <a:xfrm>
-            <a:off x="490016" y="17373600"/>
+            <a:off x="490016" y="17432178"/>
             <a:ext cx="9509760" cy="3178835"/>
             <a:chOff x="490016" y="17623765"/>
             <a:chExt cx="9509760" cy="3178835"/>
@@ -10761,7 +9596,11 @@
             <a:p>
               <a:r>
                 <a:rPr lang="en-US" sz="1600" dirty="0" smtClean="0"/>
-                <a:t>FE Analysis performed on the chassis in ANSYS. The simulation assumed a worst case static loading where the joints lock up completely during motion. The maximum stress was found to be 240 </a:t>
+                <a:t>Figure 1: FE </a:t>
+              </a:r>
+              <a:r>
+                <a:rPr lang="en-US" sz="1600" dirty="0" smtClean="0"/>
+                <a:t>Analysis performed on the chassis in ANSYS. The simulation assumed a worst case static loading where the joints lock up completely during motion. The maximum stress was found to be 240 </a:t>
               </a:r>
               <a:r>
                 <a:rPr lang="en-US" sz="1600" dirty="0" err="1" smtClean="0"/>
@@ -10784,7 +9623,7 @@
         </p:nvSpPr>
         <p:spPr>
           <a:xfrm>
-            <a:off x="548640" y="26999625"/>
+            <a:off x="548640" y="27058203"/>
             <a:ext cx="9509760" cy="830997"/>
           </a:xfrm>
           <a:prstGeom prst="rect">
@@ -10800,11 +9639,11 @@
           <a:p>
             <a:r>
               <a:rPr lang="en-US" sz="1600" dirty="0" smtClean="0"/>
-              <a:t>The FE analysis performed on the thigh (lef</a:t>
+              <a:t>Figure 2: The </a:t>
             </a:r>
             <a:r>
               <a:rPr lang="en-US" sz="1600" dirty="0" smtClean="0"/>
-              <a:t>t) and shank (right). A flange was added to the thigh to reduce the overall stress in the weld. A maximum stress of 155 </a:t>
+              <a:t>FE analysis performed on the thigh (left) and shank (right). A flange was added to the thigh to reduce the overall stress in the weld. A maximum stress of 155 </a:t>
             </a:r>
             <a:r>
               <a:rPr lang="en-US" sz="1600" dirty="0" err="1" smtClean="0"/>
@@ -10826,7 +9665,7 @@
         </p:nvGrpSpPr>
         <p:grpSpPr>
           <a:xfrm>
-            <a:off x="24895923" y="17983200"/>
+            <a:off x="26607915" y="17500631"/>
             <a:ext cx="9431294" cy="1925001"/>
             <a:chOff x="24895923" y="17983200"/>
             <a:chExt cx="9431294" cy="1925001"/>
@@ -11295,6 +10134,1271 @@
           </p:txBody>
         </p:sp>
       </p:grpSp>
+      <p:sp>
+        <p:nvSpPr>
+          <p:cNvPr id="205" name="Freeform 204"/>
+          <p:cNvSpPr/>
+          <p:nvPr/>
+        </p:nvSpPr>
+        <p:spPr>
+          <a:xfrm>
+            <a:off x="31350473" y="5899167"/>
+            <a:ext cx="2034540" cy="1075055"/>
+          </a:xfrm>
+          <a:custGeom>
+            <a:avLst/>
+            <a:gdLst>
+              <a:gd name="connsiteX0" fmla="*/ 0 w 2034540"/>
+              <a:gd name="connsiteY0" fmla="*/ 1075552 h 1075552"/>
+              <a:gd name="connsiteX1" fmla="*/ 434340 w 2034540"/>
+              <a:gd name="connsiteY1" fmla="*/ 717412 h 1075552"/>
+              <a:gd name="connsiteX2" fmla="*/ 640080 w 2034540"/>
+              <a:gd name="connsiteY2" fmla="*/ 168772 h 1075552"/>
+              <a:gd name="connsiteX3" fmla="*/ 952500 w 2034540"/>
+              <a:gd name="connsiteY3" fmla="*/ 1132 h 1075552"/>
+              <a:gd name="connsiteX4" fmla="*/ 1272540 w 2034540"/>
+              <a:gd name="connsiteY4" fmla="*/ 229732 h 1075552"/>
+              <a:gd name="connsiteX5" fmla="*/ 1554480 w 2034540"/>
+              <a:gd name="connsiteY5" fmla="*/ 260212 h 1075552"/>
+              <a:gd name="connsiteX6" fmla="*/ 1767840 w 2034540"/>
+              <a:gd name="connsiteY6" fmla="*/ 176392 h 1075552"/>
+              <a:gd name="connsiteX7" fmla="*/ 2034540 w 2034540"/>
+              <a:gd name="connsiteY7" fmla="*/ 168772 h 1075552"/>
+            </a:gdLst>
+            <a:ahLst/>
+            <a:cxnLst>
+              <a:cxn ang="0">
+                <a:pos x="connsiteX0" y="connsiteY0"/>
+              </a:cxn>
+              <a:cxn ang="0">
+                <a:pos x="connsiteX1" y="connsiteY1"/>
+              </a:cxn>
+              <a:cxn ang="0">
+                <a:pos x="connsiteX2" y="connsiteY2"/>
+              </a:cxn>
+              <a:cxn ang="0">
+                <a:pos x="connsiteX3" y="connsiteY3"/>
+              </a:cxn>
+              <a:cxn ang="0">
+                <a:pos x="connsiteX4" y="connsiteY4"/>
+              </a:cxn>
+              <a:cxn ang="0">
+                <a:pos x="connsiteX5" y="connsiteY5"/>
+              </a:cxn>
+              <a:cxn ang="0">
+                <a:pos x="connsiteX6" y="connsiteY6"/>
+              </a:cxn>
+              <a:cxn ang="0">
+                <a:pos x="connsiteX7" y="connsiteY7"/>
+              </a:cxn>
+            </a:cxnLst>
+            <a:rect l="l" t="t" r="r" b="b"/>
+            <a:pathLst>
+              <a:path w="2034540" h="1075552">
+                <a:moveTo>
+                  <a:pt x="0" y="1075552"/>
+                </a:moveTo>
+                <a:cubicBezTo>
+                  <a:pt x="163830" y="972047"/>
+                  <a:pt x="327660" y="868542"/>
+                  <a:pt x="434340" y="717412"/>
+                </a:cubicBezTo>
+                <a:cubicBezTo>
+                  <a:pt x="541020" y="566282"/>
+                  <a:pt x="553720" y="288152"/>
+                  <a:pt x="640080" y="168772"/>
+                </a:cubicBezTo>
+                <a:cubicBezTo>
+                  <a:pt x="726440" y="49392"/>
+                  <a:pt x="847090" y="-9028"/>
+                  <a:pt x="952500" y="1132"/>
+                </a:cubicBezTo>
+                <a:cubicBezTo>
+                  <a:pt x="1057910" y="11292"/>
+                  <a:pt x="1172210" y="186552"/>
+                  <a:pt x="1272540" y="229732"/>
+                </a:cubicBezTo>
+                <a:cubicBezTo>
+                  <a:pt x="1372870" y="272912"/>
+                  <a:pt x="1471930" y="269102"/>
+                  <a:pt x="1554480" y="260212"/>
+                </a:cubicBezTo>
+                <a:cubicBezTo>
+                  <a:pt x="1637030" y="251322"/>
+                  <a:pt x="1687830" y="191632"/>
+                  <a:pt x="1767840" y="176392"/>
+                </a:cubicBezTo>
+                <a:cubicBezTo>
+                  <a:pt x="1847850" y="161152"/>
+                  <a:pt x="1969770" y="170042"/>
+                  <a:pt x="2034540" y="168772"/>
+                </a:cubicBezTo>
+              </a:path>
+            </a:pathLst>
+          </a:custGeom>
+        </p:spPr>
+        <p:style>
+          <a:lnRef idx="1">
+            <a:schemeClr val="dk1"/>
+          </a:lnRef>
+          <a:fillRef idx="0">
+            <a:schemeClr val="dk1"/>
+          </a:fillRef>
+          <a:effectRef idx="0">
+            <a:schemeClr val="dk1"/>
+          </a:effectRef>
+          <a:fontRef idx="minor">
+            <a:schemeClr val="tx1"/>
+          </a:fontRef>
+        </p:style>
+        <p:txBody>
+          <a:bodyPr rot="0" spcFirstLastPara="0" vert="horz" wrap="square" lIns="91440" tIns="45720" rIns="91440" bIns="45720" numCol="1" spcCol="0" rtlCol="0" fromWordArt="0" anchor="ctr" anchorCtr="0" forceAA="0" compatLnSpc="1">
+            <a:prstTxWarp prst="textNoShape">
+              <a:avLst/>
+            </a:prstTxWarp>
+            <a:noAutofit/>
+          </a:bodyPr>
+          <a:lstStyle/>
+          <a:p>
+            <a:endParaRPr lang="en-US"/>
+          </a:p>
+        </p:txBody>
+      </p:sp>
+      <p:sp>
+        <p:nvSpPr>
+          <p:cNvPr id="208" name="Rectangle 207"/>
+          <p:cNvSpPr/>
+          <p:nvPr/>
+        </p:nvSpPr>
+        <p:spPr>
+          <a:xfrm>
+            <a:off x="27769073" y="5770897"/>
+            <a:ext cx="815340" cy="1478280"/>
+          </a:xfrm>
+          <a:prstGeom prst="rect">
+            <a:avLst/>
+          </a:prstGeom>
+        </p:spPr>
+        <p:style>
+          <a:lnRef idx="2">
+            <a:schemeClr val="accent1">
+              <a:shade val="50000"/>
+            </a:schemeClr>
+          </a:lnRef>
+          <a:fillRef idx="1">
+            <a:schemeClr val="accent1"/>
+          </a:fillRef>
+          <a:effectRef idx="0">
+            <a:schemeClr val="accent1"/>
+          </a:effectRef>
+          <a:fontRef idx="minor">
+            <a:schemeClr val="lt1"/>
+          </a:fontRef>
+        </p:style>
+        <p:txBody>
+          <a:bodyPr rot="0" spcFirstLastPara="0" vert="horz" wrap="square" lIns="91440" tIns="45720" rIns="91440" bIns="45720" numCol="1" spcCol="0" rtlCol="0" fromWordArt="0" anchor="ctr" anchorCtr="0" forceAA="0" compatLnSpc="1">
+            <a:prstTxWarp prst="textNoShape">
+              <a:avLst/>
+            </a:prstTxWarp>
+            <a:noAutofit/>
+          </a:bodyPr>
+          <a:lstStyle/>
+          <a:p>
+            <a:endParaRPr lang="en-US"/>
+          </a:p>
+        </p:txBody>
+      </p:sp>
+      <p:sp>
+        <p:nvSpPr>
+          <p:cNvPr id="210" name="Rectangle 209"/>
+          <p:cNvSpPr/>
+          <p:nvPr/>
+        </p:nvSpPr>
+        <p:spPr>
+          <a:xfrm>
+            <a:off x="27814793" y="5885197"/>
+            <a:ext cx="45720" cy="1196340"/>
+          </a:xfrm>
+          <a:prstGeom prst="rect">
+            <a:avLst/>
+          </a:prstGeom>
+        </p:spPr>
+        <p:style>
+          <a:lnRef idx="2">
+            <a:schemeClr val="dk1">
+              <a:shade val="50000"/>
+            </a:schemeClr>
+          </a:lnRef>
+          <a:fillRef idx="1">
+            <a:schemeClr val="dk1"/>
+          </a:fillRef>
+          <a:effectRef idx="0">
+            <a:schemeClr val="dk1"/>
+          </a:effectRef>
+          <a:fontRef idx="minor">
+            <a:schemeClr val="lt1"/>
+          </a:fontRef>
+        </p:style>
+        <p:txBody>
+          <a:bodyPr rot="0" spcFirstLastPara="0" vert="horz" wrap="square" lIns="91440" tIns="45720" rIns="91440" bIns="45720" numCol="1" spcCol="0" rtlCol="0" fromWordArt="0" anchor="ctr" anchorCtr="0" forceAA="0" compatLnSpc="1">
+            <a:prstTxWarp prst="textNoShape">
+              <a:avLst/>
+            </a:prstTxWarp>
+            <a:noAutofit/>
+          </a:bodyPr>
+          <a:lstStyle/>
+          <a:p>
+            <a:endParaRPr lang="en-US"/>
+          </a:p>
+        </p:txBody>
+      </p:sp>
+      <p:sp>
+        <p:nvSpPr>
+          <p:cNvPr id="212" name="Rectangle 211"/>
+          <p:cNvSpPr/>
+          <p:nvPr/>
+        </p:nvSpPr>
+        <p:spPr>
+          <a:xfrm>
+            <a:off x="28508213" y="5869957"/>
+            <a:ext cx="45720" cy="1196340"/>
+          </a:xfrm>
+          <a:prstGeom prst="rect">
+            <a:avLst/>
+          </a:prstGeom>
+        </p:spPr>
+        <p:style>
+          <a:lnRef idx="2">
+            <a:schemeClr val="dk1">
+              <a:shade val="50000"/>
+            </a:schemeClr>
+          </a:lnRef>
+          <a:fillRef idx="1">
+            <a:schemeClr val="dk1"/>
+          </a:fillRef>
+          <a:effectRef idx="0">
+            <a:schemeClr val="dk1"/>
+          </a:effectRef>
+          <a:fontRef idx="minor">
+            <a:schemeClr val="lt1"/>
+          </a:fontRef>
+        </p:style>
+        <p:txBody>
+          <a:bodyPr rot="0" spcFirstLastPara="0" vert="horz" wrap="square" lIns="91440" tIns="45720" rIns="91440" bIns="45720" numCol="1" spcCol="0" rtlCol="0" fromWordArt="0" anchor="ctr" anchorCtr="0" forceAA="0" compatLnSpc="1">
+            <a:prstTxWarp prst="textNoShape">
+              <a:avLst/>
+            </a:prstTxWarp>
+            <a:noAutofit/>
+          </a:bodyPr>
+          <a:lstStyle/>
+          <a:p>
+            <a:endParaRPr lang="en-US"/>
+          </a:p>
+        </p:txBody>
+      </p:sp>
+      <p:sp>
+        <p:nvSpPr>
+          <p:cNvPr id="213" name="Rectangle 212"/>
+          <p:cNvSpPr/>
+          <p:nvPr/>
+        </p:nvSpPr>
+        <p:spPr>
+          <a:xfrm>
+            <a:off x="27944333" y="5793122"/>
+            <a:ext cx="472440" cy="45085"/>
+          </a:xfrm>
+          <a:prstGeom prst="rect">
+            <a:avLst/>
+          </a:prstGeom>
+        </p:spPr>
+        <p:style>
+          <a:lnRef idx="2">
+            <a:schemeClr val="dk1">
+              <a:shade val="50000"/>
+            </a:schemeClr>
+          </a:lnRef>
+          <a:fillRef idx="1">
+            <a:schemeClr val="dk1"/>
+          </a:fillRef>
+          <a:effectRef idx="0">
+            <a:schemeClr val="dk1"/>
+          </a:effectRef>
+          <a:fontRef idx="minor">
+            <a:schemeClr val="lt1"/>
+          </a:fontRef>
+        </p:style>
+        <p:txBody>
+          <a:bodyPr rot="0" spcFirstLastPara="0" vert="horz" wrap="square" lIns="91440" tIns="45720" rIns="91440" bIns="45720" numCol="1" spcCol="0" rtlCol="0" fromWordArt="0" anchor="ctr" anchorCtr="0" forceAA="0" compatLnSpc="1">
+            <a:prstTxWarp prst="textNoShape">
+              <a:avLst/>
+            </a:prstTxWarp>
+            <a:noAutofit/>
+          </a:bodyPr>
+          <a:lstStyle/>
+          <a:p>
+            <a:endParaRPr lang="en-US"/>
+          </a:p>
+        </p:txBody>
+      </p:sp>
+      <p:sp>
+        <p:nvSpPr>
+          <p:cNvPr id="214" name="Text Box 1"/>
+          <p:cNvSpPr txBox="1"/>
+          <p:nvPr/>
+        </p:nvSpPr>
+        <p:spPr>
+          <a:xfrm>
+            <a:off x="27830033" y="6083317"/>
+            <a:ext cx="739140" cy="723900"/>
+          </a:xfrm>
+          <a:prstGeom prst="rect">
+            <a:avLst/>
+          </a:prstGeom>
+          <a:noFill/>
+          <a:ln>
+            <a:noFill/>
+          </a:ln>
+          <a:effectLst/>
+        </p:spPr>
+        <p:txBody>
+          <a:bodyPr rot="0" spcFirstLastPara="0" vert="horz" wrap="square" lIns="91440" tIns="45720" rIns="91440" bIns="45720" numCol="1" spcCol="0" rtlCol="0" fromWordArt="0" anchor="t" anchorCtr="0" forceAA="0" compatLnSpc="1">
+            <a:prstTxWarp prst="textNoShape">
+              <a:avLst/>
+            </a:prstTxWarp>
+            <a:noAutofit/>
+          </a:bodyPr>
+          <a:lstStyle/>
+          <a:p>
+            <a:pPr marL="0" marR="0">
+              <a:lnSpc>
+                <a:spcPct val="107000"/>
+              </a:lnSpc>
+              <a:spcBef>
+                <a:spcPts val="0"/>
+              </a:spcBef>
+              <a:spcAft>
+                <a:spcPts val="800"/>
+              </a:spcAft>
+            </a:pPr>
+            <a:r>
+              <a:rPr lang="en-US" sz="1200">
+                <a:ln>
+                  <a:noFill/>
+                </a:ln>
+                <a:solidFill>
+                  <a:srgbClr val="000000"/>
+                </a:solidFill>
+                <a:effectLst>
+                  <a:outerShdw blurRad="38100" dist="19050" dir="2700000" algn="tl">
+                    <a:schemeClr val="dk1">
+                      <a:alpha val="40000"/>
+                    </a:schemeClr>
+                  </a:outerShdw>
+                </a:effectLst>
+                <a:latin typeface="Calibri" panose="020F0502020204030204" pitchFamily="34" charset="0"/>
+                <a:ea typeface="Calibri" panose="020F0502020204030204" pitchFamily="34" charset="0"/>
+                <a:cs typeface="Times New Roman" panose="02020603050405020304" pitchFamily="18" charset="0"/>
+              </a:rPr>
+              <a:t>Arduino</a:t>
+            </a:r>
+            <a:endParaRPr lang="en-US" sz="1100">
+              <a:effectLst/>
+              <a:latin typeface="Calibri" panose="020F0502020204030204" pitchFamily="34" charset="0"/>
+              <a:ea typeface="Calibri" panose="020F0502020204030204" pitchFamily="34" charset="0"/>
+              <a:cs typeface="Times New Roman" panose="02020603050405020304" pitchFamily="18" charset="0"/>
+            </a:endParaRPr>
+          </a:p>
+          <a:p>
+            <a:pPr marL="0" marR="0">
+              <a:lnSpc>
+                <a:spcPct val="107000"/>
+              </a:lnSpc>
+              <a:spcBef>
+                <a:spcPts val="0"/>
+              </a:spcBef>
+              <a:spcAft>
+                <a:spcPts val="800"/>
+              </a:spcAft>
+            </a:pPr>
+            <a:r>
+              <a:rPr lang="en-US" sz="1200">
+                <a:ln>
+                  <a:noFill/>
+                </a:ln>
+                <a:solidFill>
+                  <a:srgbClr val="000000"/>
+                </a:solidFill>
+                <a:effectLst>
+                  <a:outerShdw blurRad="38100" dist="19050" dir="2700000" algn="tl">
+                    <a:schemeClr val="dk1">
+                      <a:alpha val="40000"/>
+                    </a:schemeClr>
+                  </a:outerShdw>
+                </a:effectLst>
+                <a:latin typeface="Calibri" panose="020F0502020204030204" pitchFamily="34" charset="0"/>
+                <a:ea typeface="Calibri" panose="020F0502020204030204" pitchFamily="34" charset="0"/>
+                <a:cs typeface="Times New Roman" panose="02020603050405020304" pitchFamily="18" charset="0"/>
+              </a:rPr>
+              <a:t>Mega</a:t>
+            </a:r>
+            <a:endParaRPr lang="en-US" sz="1100">
+              <a:effectLst/>
+              <a:latin typeface="Calibri" panose="020F0502020204030204" pitchFamily="34" charset="0"/>
+              <a:ea typeface="Calibri" panose="020F0502020204030204" pitchFamily="34" charset="0"/>
+              <a:cs typeface="Times New Roman" panose="02020603050405020304" pitchFamily="18" charset="0"/>
+            </a:endParaRPr>
+          </a:p>
+        </p:txBody>
+      </p:sp>
+      <p:cxnSp>
+        <p:nvCxnSpPr>
+          <p:cNvPr id="215" name="Elbow Connector 214"/>
+          <p:cNvCxnSpPr/>
+          <p:nvPr/>
+        </p:nvCxnSpPr>
+        <p:spPr>
+          <a:xfrm>
+            <a:off x="28637753" y="6052837"/>
+            <a:ext cx="914400" cy="914400"/>
+          </a:xfrm>
+          <a:prstGeom prst="bentConnector3">
+            <a:avLst/>
+          </a:prstGeom>
+        </p:spPr>
+        <p:style>
+          <a:lnRef idx="1">
+            <a:schemeClr val="dk1"/>
+          </a:lnRef>
+          <a:fillRef idx="0">
+            <a:schemeClr val="dk1"/>
+          </a:fillRef>
+          <a:effectRef idx="0">
+            <a:schemeClr val="dk1"/>
+          </a:effectRef>
+          <a:fontRef idx="minor">
+            <a:schemeClr val="tx1"/>
+          </a:fontRef>
+        </p:style>
+      </p:cxnSp>
+      <p:cxnSp>
+        <p:nvCxnSpPr>
+          <p:cNvPr id="216" name="Elbow Connector 215"/>
+          <p:cNvCxnSpPr/>
+          <p:nvPr/>
+        </p:nvCxnSpPr>
+        <p:spPr>
+          <a:xfrm flipV="1">
+            <a:off x="29567393" y="6045217"/>
+            <a:ext cx="426720" cy="922020"/>
+          </a:xfrm>
+          <a:prstGeom prst="bentConnector3">
+            <a:avLst>
+              <a:gd name="adj1" fmla="val 15517"/>
+            </a:avLst>
+          </a:prstGeom>
+        </p:spPr>
+        <p:style>
+          <a:lnRef idx="1">
+            <a:schemeClr val="dk1"/>
+          </a:lnRef>
+          <a:fillRef idx="0">
+            <a:schemeClr val="dk1"/>
+          </a:fillRef>
+          <a:effectRef idx="0">
+            <a:schemeClr val="dk1"/>
+          </a:effectRef>
+          <a:fontRef idx="minor">
+            <a:schemeClr val="tx1"/>
+          </a:fontRef>
+        </p:style>
+      </p:cxnSp>
+      <p:cxnSp>
+        <p:nvCxnSpPr>
+          <p:cNvPr id="217" name="Elbow Connector 216"/>
+          <p:cNvCxnSpPr/>
+          <p:nvPr/>
+        </p:nvCxnSpPr>
+        <p:spPr>
+          <a:xfrm>
+            <a:off x="29750273" y="6045217"/>
+            <a:ext cx="914400" cy="914400"/>
+          </a:xfrm>
+          <a:prstGeom prst="bentConnector3">
+            <a:avLst/>
+          </a:prstGeom>
+        </p:spPr>
+        <p:style>
+          <a:lnRef idx="1">
+            <a:schemeClr val="dk1"/>
+          </a:lnRef>
+          <a:fillRef idx="0">
+            <a:schemeClr val="dk1"/>
+          </a:fillRef>
+          <a:effectRef idx="0">
+            <a:schemeClr val="dk1"/>
+          </a:effectRef>
+          <a:fontRef idx="minor">
+            <a:schemeClr val="tx1"/>
+          </a:fontRef>
+        </p:style>
+      </p:cxnSp>
+      <p:sp>
+        <p:nvSpPr>
+          <p:cNvPr id="218" name="Rectangle 217"/>
+          <p:cNvSpPr/>
+          <p:nvPr/>
+        </p:nvSpPr>
+        <p:spPr>
+          <a:xfrm>
+            <a:off x="30565613" y="5793757"/>
+            <a:ext cx="982980" cy="1447800"/>
+          </a:xfrm>
+          <a:prstGeom prst="rect">
+            <a:avLst/>
+          </a:prstGeom>
+        </p:spPr>
+        <p:style>
+          <a:lnRef idx="2">
+            <a:schemeClr val="accent3">
+              <a:shade val="50000"/>
+            </a:schemeClr>
+          </a:lnRef>
+          <a:fillRef idx="1">
+            <a:schemeClr val="accent3"/>
+          </a:fillRef>
+          <a:effectRef idx="0">
+            <a:schemeClr val="accent3"/>
+          </a:effectRef>
+          <a:fontRef idx="minor">
+            <a:schemeClr val="lt1"/>
+          </a:fontRef>
+        </p:style>
+        <p:txBody>
+          <a:bodyPr rot="0" spcFirstLastPara="0" vert="horz" wrap="square" lIns="91440" tIns="45720" rIns="91440" bIns="45720" numCol="1" spcCol="0" rtlCol="0" fromWordArt="0" anchor="ctr" anchorCtr="0" forceAA="0" compatLnSpc="1">
+            <a:prstTxWarp prst="textNoShape">
+              <a:avLst/>
+            </a:prstTxWarp>
+            <a:noAutofit/>
+          </a:bodyPr>
+          <a:lstStyle/>
+          <a:p>
+            <a:endParaRPr lang="en-US"/>
+          </a:p>
+        </p:txBody>
+      </p:sp>
+      <p:sp>
+        <p:nvSpPr>
+          <p:cNvPr id="219" name="Text Box 17"/>
+          <p:cNvSpPr txBox="1"/>
+          <p:nvPr/>
+        </p:nvSpPr>
+        <p:spPr>
+          <a:xfrm>
+            <a:off x="30497668" y="6403357"/>
+            <a:ext cx="1096645" cy="417195"/>
+          </a:xfrm>
+          <a:prstGeom prst="rect">
+            <a:avLst/>
+          </a:prstGeom>
+          <a:noFill/>
+          <a:ln>
+            <a:noFill/>
+          </a:ln>
+          <a:effectLst/>
+        </p:spPr>
+        <p:txBody>
+          <a:bodyPr rot="0" spcFirstLastPara="0" vert="horz" wrap="none" lIns="91440" tIns="45720" rIns="91440" bIns="45720" numCol="1" spcCol="0" rtlCol="0" fromWordArt="0" anchor="t" anchorCtr="0" forceAA="0" compatLnSpc="1">
+            <a:prstTxWarp prst="textNoShape">
+              <a:avLst/>
+            </a:prstTxWarp>
+            <a:spAutoFit/>
+          </a:bodyPr>
+          <a:lstStyle/>
+          <a:p>
+            <a:pPr marL="0" marR="0" algn="ctr">
+              <a:lnSpc>
+                <a:spcPct val="107000"/>
+              </a:lnSpc>
+              <a:spcBef>
+                <a:spcPts val="0"/>
+              </a:spcBef>
+              <a:spcAft>
+                <a:spcPts val="800"/>
+              </a:spcAft>
+            </a:pPr>
+            <a:r>
+              <a:rPr lang="en-US" sz="1200">
+                <a:ln>
+                  <a:noFill/>
+                </a:ln>
+                <a:solidFill>
+                  <a:srgbClr val="000000"/>
+                </a:solidFill>
+                <a:effectLst>
+                  <a:outerShdw blurRad="38100" dist="19050" dir="2700000" algn="tl">
+                    <a:schemeClr val="dk1">
+                      <a:alpha val="40000"/>
+                    </a:schemeClr>
+                  </a:outerShdw>
+                </a:effectLst>
+                <a:latin typeface="Calibri" panose="020F0502020204030204" pitchFamily="34" charset="0"/>
+                <a:ea typeface="Calibri" panose="020F0502020204030204" pitchFamily="34" charset="0"/>
+                <a:cs typeface="Times New Roman" panose="02020603050405020304" pitchFamily="18" charset="0"/>
+              </a:rPr>
+              <a:t>Low Pass Filter</a:t>
+            </a:r>
+            <a:endParaRPr lang="en-US" sz="1100">
+              <a:effectLst/>
+              <a:latin typeface="Calibri" panose="020F0502020204030204" pitchFamily="34" charset="0"/>
+              <a:ea typeface="Calibri" panose="020F0502020204030204" pitchFamily="34" charset="0"/>
+              <a:cs typeface="Times New Roman" panose="02020603050405020304" pitchFamily="18" charset="0"/>
+            </a:endParaRPr>
+          </a:p>
+        </p:txBody>
+      </p:sp>
+      <p:sp>
+        <p:nvSpPr>
+          <p:cNvPr id="220" name="Rounded Rectangle 219"/>
+          <p:cNvSpPr/>
+          <p:nvPr/>
+        </p:nvSpPr>
+        <p:spPr>
+          <a:xfrm>
+            <a:off x="33122123" y="5816617"/>
+            <a:ext cx="1478280" cy="1531620"/>
+          </a:xfrm>
+          <a:prstGeom prst="roundRect">
+            <a:avLst/>
+          </a:prstGeom>
+        </p:spPr>
+        <p:style>
+          <a:lnRef idx="2">
+            <a:schemeClr val="accent1">
+              <a:shade val="50000"/>
+            </a:schemeClr>
+          </a:lnRef>
+          <a:fillRef idx="1">
+            <a:schemeClr val="accent1"/>
+          </a:fillRef>
+          <a:effectRef idx="0">
+            <a:schemeClr val="accent1"/>
+          </a:effectRef>
+          <a:fontRef idx="minor">
+            <a:schemeClr val="lt1"/>
+          </a:fontRef>
+        </p:style>
+        <p:txBody>
+          <a:bodyPr rot="0" spcFirstLastPara="0" vert="horz" wrap="square" lIns="91440" tIns="45720" rIns="91440" bIns="45720" numCol="1" spcCol="0" rtlCol="0" fromWordArt="0" anchor="ctr" anchorCtr="0" forceAA="0" compatLnSpc="1">
+            <a:prstTxWarp prst="textNoShape">
+              <a:avLst/>
+            </a:prstTxWarp>
+            <a:noAutofit/>
+          </a:bodyPr>
+          <a:lstStyle/>
+          <a:p>
+            <a:endParaRPr lang="en-US"/>
+          </a:p>
+        </p:txBody>
+      </p:sp>
+      <p:sp>
+        <p:nvSpPr>
+          <p:cNvPr id="221" name="Text Box 24"/>
+          <p:cNvSpPr txBox="1"/>
+          <p:nvPr/>
+        </p:nvSpPr>
+        <p:spPr>
+          <a:xfrm>
+            <a:off x="33174193" y="6083317"/>
+            <a:ext cx="1452880" cy="742950"/>
+          </a:xfrm>
+          <a:prstGeom prst="rect">
+            <a:avLst/>
+          </a:prstGeom>
+          <a:noFill/>
+          <a:ln>
+            <a:noFill/>
+          </a:ln>
+          <a:effectLst/>
+        </p:spPr>
+        <p:txBody>
+          <a:bodyPr rot="0" spcFirstLastPara="0" vert="horz" wrap="none" lIns="91440" tIns="45720" rIns="91440" bIns="45720" numCol="1" spcCol="0" rtlCol="0" fromWordArt="0" anchor="t" anchorCtr="0" forceAA="0" compatLnSpc="1">
+            <a:prstTxWarp prst="textNoShape">
+              <a:avLst/>
+            </a:prstTxWarp>
+            <a:spAutoFit/>
+          </a:bodyPr>
+          <a:lstStyle/>
+          <a:p>
+            <a:pPr marL="0" marR="0">
+              <a:lnSpc>
+                <a:spcPct val="107000"/>
+              </a:lnSpc>
+              <a:spcBef>
+                <a:spcPts val="0"/>
+              </a:spcBef>
+              <a:spcAft>
+                <a:spcPts val="800"/>
+              </a:spcAft>
+            </a:pPr>
+            <a:r>
+              <a:rPr lang="en-US" sz="1200">
+                <a:ln>
+                  <a:noFill/>
+                </a:ln>
+                <a:solidFill>
+                  <a:srgbClr val="000000"/>
+                </a:solidFill>
+                <a:effectLst>
+                  <a:outerShdw blurRad="38100" dist="19050" dir="2700000" algn="tl">
+                    <a:schemeClr val="dk1">
+                      <a:alpha val="40000"/>
+                    </a:schemeClr>
+                  </a:outerShdw>
+                </a:effectLst>
+                <a:latin typeface="Calibri" panose="020F0502020204030204" pitchFamily="34" charset="0"/>
+                <a:ea typeface="Calibri" panose="020F0502020204030204" pitchFamily="34" charset="0"/>
+                <a:cs typeface="Times New Roman" panose="02020603050405020304" pitchFamily="18" charset="0"/>
+              </a:rPr>
+              <a:t> </a:t>
+            </a:r>
+            <a:endParaRPr lang="en-US" sz="1100">
+              <a:effectLst/>
+              <a:latin typeface="Calibri" panose="020F0502020204030204" pitchFamily="34" charset="0"/>
+              <a:ea typeface="Calibri" panose="020F0502020204030204" pitchFamily="34" charset="0"/>
+              <a:cs typeface="Times New Roman" panose="02020603050405020304" pitchFamily="18" charset="0"/>
+            </a:endParaRPr>
+          </a:p>
+          <a:p>
+            <a:pPr marL="0" marR="0">
+              <a:lnSpc>
+                <a:spcPct val="107000"/>
+              </a:lnSpc>
+              <a:spcBef>
+                <a:spcPts val="0"/>
+              </a:spcBef>
+              <a:spcAft>
+                <a:spcPts val="800"/>
+              </a:spcAft>
+            </a:pPr>
+            <a:r>
+              <a:rPr lang="en-US" sz="1200">
+                <a:ln>
+                  <a:noFill/>
+                </a:ln>
+                <a:solidFill>
+                  <a:srgbClr val="000000"/>
+                </a:solidFill>
+                <a:effectLst>
+                  <a:outerShdw blurRad="38100" dist="19050" dir="2700000" algn="tl">
+                    <a:schemeClr val="dk1">
+                      <a:alpha val="40000"/>
+                    </a:schemeClr>
+                  </a:outerShdw>
+                </a:effectLst>
+                <a:latin typeface="Calibri" panose="020F0502020204030204" pitchFamily="34" charset="0"/>
+                <a:ea typeface="Calibri" panose="020F0502020204030204" pitchFamily="34" charset="0"/>
+                <a:cs typeface="Times New Roman" panose="02020603050405020304" pitchFamily="18" charset="0"/>
+              </a:rPr>
+              <a:t>Valves and Cylinders</a:t>
+            </a:r>
+            <a:endParaRPr lang="en-US" sz="1100">
+              <a:effectLst/>
+              <a:latin typeface="Calibri" panose="020F0502020204030204" pitchFamily="34" charset="0"/>
+              <a:ea typeface="Calibri" panose="020F0502020204030204" pitchFamily="34" charset="0"/>
+              <a:cs typeface="Times New Roman" panose="02020603050405020304" pitchFamily="18" charset="0"/>
+            </a:endParaRPr>
+          </a:p>
+        </p:txBody>
+      </p:sp>
+      <p:cxnSp>
+        <p:nvCxnSpPr>
+          <p:cNvPr id="222" name="Curved Connector 221"/>
+          <p:cNvCxnSpPr/>
+          <p:nvPr/>
+        </p:nvCxnSpPr>
+        <p:spPr>
+          <a:xfrm flipH="1">
+            <a:off x="31632413" y="7233937"/>
+            <a:ext cx="1409700" cy="579120"/>
+          </a:xfrm>
+          <a:prstGeom prst="curvedConnector3">
+            <a:avLst/>
+          </a:prstGeom>
+          <a:ln>
+            <a:tailEnd type="triangle"/>
+          </a:ln>
+        </p:spPr>
+        <p:style>
+          <a:lnRef idx="1">
+            <a:schemeClr val="dk1"/>
+          </a:lnRef>
+          <a:fillRef idx="0">
+            <a:schemeClr val="dk1"/>
+          </a:fillRef>
+          <a:effectRef idx="0">
+            <a:schemeClr val="dk1"/>
+          </a:effectRef>
+          <a:fontRef idx="minor">
+            <a:schemeClr val="tx1"/>
+          </a:fontRef>
+        </p:style>
+      </p:cxnSp>
+      <p:cxnSp>
+        <p:nvCxnSpPr>
+          <p:cNvPr id="223" name="Curved Connector 222"/>
+          <p:cNvCxnSpPr/>
+          <p:nvPr/>
+        </p:nvCxnSpPr>
+        <p:spPr>
+          <a:xfrm flipH="1" flipV="1">
+            <a:off x="28637753" y="7157737"/>
+            <a:ext cx="1874520" cy="670560"/>
+          </a:xfrm>
+          <a:prstGeom prst="curvedConnector3">
+            <a:avLst/>
+          </a:prstGeom>
+          <a:ln>
+            <a:tailEnd type="triangle"/>
+          </a:ln>
+        </p:spPr>
+        <p:style>
+          <a:lnRef idx="1">
+            <a:schemeClr val="dk1"/>
+          </a:lnRef>
+          <a:fillRef idx="0">
+            <a:schemeClr val="dk1"/>
+          </a:fillRef>
+          <a:effectRef idx="0">
+            <a:schemeClr val="dk1"/>
+          </a:effectRef>
+          <a:fontRef idx="minor">
+            <a:schemeClr val="tx1"/>
+          </a:fontRef>
+        </p:style>
+      </p:cxnSp>
+      <p:sp>
+        <p:nvSpPr>
+          <p:cNvPr id="224" name="Text Box 29"/>
+          <p:cNvSpPr txBox="1"/>
+          <p:nvPr/>
+        </p:nvSpPr>
+        <p:spPr>
+          <a:xfrm>
+            <a:off x="30497033" y="7668277"/>
+            <a:ext cx="1170940" cy="417195"/>
+          </a:xfrm>
+          <a:prstGeom prst="rect">
+            <a:avLst/>
+          </a:prstGeom>
+          <a:noFill/>
+          <a:ln>
+            <a:noFill/>
+          </a:ln>
+          <a:effectLst/>
+        </p:spPr>
+        <p:txBody>
+          <a:bodyPr rot="0" spcFirstLastPara="0" vert="horz" wrap="none" lIns="91440" tIns="45720" rIns="91440" bIns="45720" numCol="1" spcCol="0" rtlCol="0" fromWordArt="0" anchor="t" anchorCtr="0" forceAA="0" compatLnSpc="1">
+            <a:prstTxWarp prst="textNoShape">
+              <a:avLst/>
+            </a:prstTxWarp>
+            <a:spAutoFit/>
+          </a:bodyPr>
+          <a:lstStyle/>
+          <a:p>
+            <a:pPr marL="0" marR="0" algn="ctr">
+              <a:lnSpc>
+                <a:spcPct val="107000"/>
+              </a:lnSpc>
+              <a:spcBef>
+                <a:spcPts val="0"/>
+              </a:spcBef>
+              <a:spcAft>
+                <a:spcPts val="800"/>
+              </a:spcAft>
+            </a:pPr>
+            <a:r>
+              <a:rPr lang="en-US" sz="1200">
+                <a:ln>
+                  <a:noFill/>
+                </a:ln>
+                <a:solidFill>
+                  <a:srgbClr val="000000"/>
+                </a:solidFill>
+                <a:effectLst>
+                  <a:outerShdw blurRad="38100" dist="19050" dir="2700000" algn="tl">
+                    <a:schemeClr val="dk1">
+                      <a:alpha val="40000"/>
+                    </a:schemeClr>
+                  </a:outerShdw>
+                </a:effectLst>
+                <a:latin typeface="Calibri" panose="020F0502020204030204" pitchFamily="34" charset="0"/>
+                <a:ea typeface="Calibri" panose="020F0502020204030204" pitchFamily="34" charset="0"/>
+                <a:cs typeface="Times New Roman" panose="02020603050405020304" pitchFamily="18" charset="0"/>
+              </a:rPr>
+              <a:t>Feedback Signal</a:t>
+            </a:r>
+            <a:endParaRPr lang="en-US" sz="1100">
+              <a:effectLst/>
+              <a:latin typeface="Calibri" panose="020F0502020204030204" pitchFamily="34" charset="0"/>
+              <a:ea typeface="Calibri" panose="020F0502020204030204" pitchFamily="34" charset="0"/>
+              <a:cs typeface="Times New Roman" panose="02020603050405020304" pitchFamily="18" charset="0"/>
+            </a:endParaRPr>
+          </a:p>
+        </p:txBody>
+      </p:sp>
+      <p:sp>
+        <p:nvSpPr>
+          <p:cNvPr id="225" name="Text Box 30"/>
+          <p:cNvSpPr txBox="1"/>
+          <p:nvPr/>
+        </p:nvSpPr>
+        <p:spPr>
+          <a:xfrm>
+            <a:off x="28546313" y="5610877"/>
+            <a:ext cx="2047875" cy="417195"/>
+          </a:xfrm>
+          <a:prstGeom prst="rect">
+            <a:avLst/>
+          </a:prstGeom>
+          <a:noFill/>
+          <a:ln>
+            <a:noFill/>
+          </a:ln>
+          <a:effectLst/>
+        </p:spPr>
+        <p:txBody>
+          <a:bodyPr rot="0" spcFirstLastPara="0" vert="horz" wrap="none" lIns="91440" tIns="45720" rIns="91440" bIns="45720" numCol="1" spcCol="0" rtlCol="0" fromWordArt="0" anchor="t" anchorCtr="0" forceAA="0" compatLnSpc="1">
+            <a:prstTxWarp prst="textNoShape">
+              <a:avLst/>
+            </a:prstTxWarp>
+            <a:spAutoFit/>
+          </a:bodyPr>
+          <a:lstStyle/>
+          <a:p>
+            <a:pPr marL="0" marR="0" algn="ctr">
+              <a:lnSpc>
+                <a:spcPct val="107000"/>
+              </a:lnSpc>
+              <a:spcBef>
+                <a:spcPts val="0"/>
+              </a:spcBef>
+              <a:spcAft>
+                <a:spcPts val="800"/>
+              </a:spcAft>
+            </a:pPr>
+            <a:r>
+              <a:rPr lang="en-US" sz="1200">
+                <a:ln>
+                  <a:noFill/>
+                </a:ln>
+                <a:solidFill>
+                  <a:srgbClr val="000000"/>
+                </a:solidFill>
+                <a:effectLst>
+                  <a:outerShdw blurRad="38100" dist="19050" dir="2700000" algn="tl">
+                    <a:schemeClr val="dk1">
+                      <a:alpha val="40000"/>
+                    </a:schemeClr>
+                  </a:outerShdw>
+                </a:effectLst>
+                <a:latin typeface="Calibri" panose="020F0502020204030204" pitchFamily="34" charset="0"/>
+                <a:ea typeface="Calibri" panose="020F0502020204030204" pitchFamily="34" charset="0"/>
+                <a:cs typeface="Times New Roman" panose="02020603050405020304" pitchFamily="18" charset="0"/>
+              </a:rPr>
+              <a:t>Pulse Width Modulated Signal</a:t>
+            </a:r>
+            <a:endParaRPr lang="en-US" sz="1100">
+              <a:effectLst/>
+              <a:latin typeface="Calibri" panose="020F0502020204030204" pitchFamily="34" charset="0"/>
+              <a:ea typeface="Calibri" panose="020F0502020204030204" pitchFamily="34" charset="0"/>
+              <a:cs typeface="Times New Roman" panose="02020603050405020304" pitchFamily="18" charset="0"/>
+            </a:endParaRPr>
+          </a:p>
+        </p:txBody>
+      </p:sp>
+      <p:sp>
+        <p:nvSpPr>
+          <p:cNvPr id="226" name="Text Box 31"/>
+          <p:cNvSpPr txBox="1"/>
+          <p:nvPr/>
+        </p:nvSpPr>
+        <p:spPr>
+          <a:xfrm>
+            <a:off x="31876253" y="5588017"/>
+            <a:ext cx="941705" cy="399415"/>
+          </a:xfrm>
+          <a:prstGeom prst="rect">
+            <a:avLst/>
+          </a:prstGeom>
+          <a:noFill/>
+          <a:ln>
+            <a:noFill/>
+          </a:ln>
+          <a:effectLst/>
+        </p:spPr>
+        <p:txBody>
+          <a:bodyPr rot="0" spcFirstLastPara="0" vert="horz" wrap="none" lIns="91440" tIns="45720" rIns="91440" bIns="45720" numCol="1" spcCol="0" rtlCol="0" fromWordArt="0" anchor="t" anchorCtr="0" forceAA="0" compatLnSpc="1">
+            <a:prstTxWarp prst="textNoShape">
+              <a:avLst/>
+            </a:prstTxWarp>
+            <a:spAutoFit/>
+          </a:bodyPr>
+          <a:lstStyle/>
+          <a:p>
+            <a:pPr marL="0" marR="0" algn="ctr">
+              <a:lnSpc>
+                <a:spcPct val="107000"/>
+              </a:lnSpc>
+              <a:spcBef>
+                <a:spcPts val="0"/>
+              </a:spcBef>
+              <a:spcAft>
+                <a:spcPts val="800"/>
+              </a:spcAft>
+            </a:pPr>
+            <a:r>
+              <a:rPr lang="en-US" sz="1100">
+                <a:ln>
+                  <a:noFill/>
+                </a:ln>
+                <a:solidFill>
+                  <a:srgbClr val="000000"/>
+                </a:solidFill>
+                <a:effectLst>
+                  <a:outerShdw blurRad="38100" dist="19050" dir="2700000" algn="tl">
+                    <a:schemeClr val="dk1">
+                      <a:alpha val="40000"/>
+                    </a:schemeClr>
+                  </a:outerShdw>
+                </a:effectLst>
+                <a:latin typeface="Calibri" panose="020F0502020204030204" pitchFamily="34" charset="0"/>
+                <a:ea typeface="Calibri" panose="020F0502020204030204" pitchFamily="34" charset="0"/>
+                <a:cs typeface="Times New Roman" panose="02020603050405020304" pitchFamily="18" charset="0"/>
+              </a:rPr>
+              <a:t>Analog Signal</a:t>
+            </a:r>
+            <a:endParaRPr lang="en-US" sz="1100">
+              <a:effectLst/>
+              <a:latin typeface="Calibri" panose="020F0502020204030204" pitchFamily="34" charset="0"/>
+              <a:ea typeface="Calibri" panose="020F0502020204030204" pitchFamily="34" charset="0"/>
+              <a:cs typeface="Times New Roman" panose="02020603050405020304" pitchFamily="18" charset="0"/>
+            </a:endParaRPr>
+          </a:p>
+        </p:txBody>
+      </p:sp>
+      <p:sp>
+        <p:nvSpPr>
+          <p:cNvPr id="3" name="Rectangle 19"/>
+          <p:cNvSpPr>
+            <a:spLocks noChangeArrowheads="1"/>
+          </p:cNvSpPr>
+          <p:nvPr/>
+        </p:nvSpPr>
+        <p:spPr bwMode="auto">
+          <a:xfrm>
+            <a:off x="25142682" y="3375516"/>
+            <a:ext cx="36576000" cy="457200"/>
+          </a:xfrm>
+          <a:prstGeom prst="rect">
+            <a:avLst/>
+          </a:prstGeom>
+          <a:noFill/>
+          <a:ln>
+            <a:noFill/>
+          </a:ln>
+          <a:effectLst/>
+          <a:extLst>
+            <a:ext uri="{909E8E84-426E-40DD-AFC4-6F175D3DCCD1}">
+              <a14:hiddenFill xmlns:a14="http://schemas.microsoft.com/office/drawing/2010/main">
+                <a:solidFill>
+                  <a:schemeClr val="accent1"/>
+                </a:solidFill>
+              </a14:hiddenFill>
+            </a:ext>
+            <a:ext uri="{91240B29-F687-4F45-9708-019B960494DF}">
+              <a14:hiddenLine xmlns:a14="http://schemas.microsoft.com/office/drawing/2010/main" w="9525">
+                <a:solidFill>
+                  <a:schemeClr val="tx1"/>
+                </a:solidFill>
+                <a:miter lim="800000"/>
+                <a:headEnd/>
+                <a:tailEnd/>
+              </a14:hiddenLine>
+            </a:ext>
+            <a:ext uri="{AF507438-7753-43E0-B8FC-AC1667EBCBE1}">
+              <a14:hiddenEffects xmlns:a14="http://schemas.microsoft.com/office/drawing/2010/main">
+                <a:effectLst>
+                  <a:outerShdw dist="35921" dir="2700000" algn="ctr" rotWithShape="0">
+                    <a:schemeClr val="bg2"/>
+                  </a:outerShdw>
+                </a:effectLst>
+              </a14:hiddenEffects>
+            </a:ext>
+          </a:extLst>
+        </p:spPr>
+        <p:txBody>
+          <a:bodyPr vert="horz" wrap="none" lIns="91440" tIns="45720" rIns="91440" bIns="45720" numCol="1" anchor="ctr" anchorCtr="0" compatLnSpc="1">
+            <a:prstTxWarp prst="textNoShape">
+              <a:avLst/>
+            </a:prstTxWarp>
+            <a:spAutoFit/>
+          </a:bodyPr>
+          <a:lstStyle/>
+          <a:p>
+            <a:endParaRPr lang="en-US"/>
+          </a:p>
+        </p:txBody>
+      </p:sp>
+      <p:sp>
+        <p:nvSpPr>
+          <p:cNvPr id="227" name="TextBox 226"/>
+          <p:cNvSpPr txBox="1"/>
+          <p:nvPr/>
+        </p:nvSpPr>
+        <p:spPr>
+          <a:xfrm>
+            <a:off x="26370406" y="7934632"/>
+            <a:ext cx="9509760" cy="338554"/>
+          </a:xfrm>
+          <a:prstGeom prst="rect">
+            <a:avLst/>
+          </a:prstGeom>
+          <a:noFill/>
+        </p:spPr>
+        <p:txBody>
+          <a:bodyPr wrap="square" rtlCol="0">
+            <a:spAutoFit/>
+          </a:bodyPr>
+          <a:lstStyle/>
+          <a:p>
+            <a:r>
+              <a:rPr lang="en-US" sz="1600" dirty="0" smtClean="0"/>
+              <a:t>Figure 6: Electrical Signal Path and Conditioning</a:t>
+            </a:r>
+            <a:endParaRPr lang="en-US" sz="1600" dirty="0"/>
+          </a:p>
+        </p:txBody>
+      </p:sp>
+      <p:sp>
+        <p:nvSpPr>
+          <p:cNvPr id="228" name="TextBox 227"/>
+          <p:cNvSpPr txBox="1"/>
+          <p:nvPr/>
+        </p:nvSpPr>
+        <p:spPr>
+          <a:xfrm>
+            <a:off x="26362786" y="21560733"/>
+            <a:ext cx="9525000" cy="3477875"/>
+          </a:xfrm>
+          <a:prstGeom prst="rect">
+            <a:avLst/>
+          </a:prstGeom>
+          <a:noFill/>
+        </p:spPr>
+        <p:txBody>
+          <a:bodyPr wrap="square" rtlCol="0">
+            <a:spAutoFit/>
+          </a:bodyPr>
+          <a:lstStyle/>
+          <a:p>
+            <a:pPr marL="342900" indent="-342900">
+              <a:buFont typeface="Arial" panose="020B0604020202020204" pitchFamily="34" charset="0"/>
+              <a:buChar char="•"/>
+            </a:pPr>
+            <a:r>
+              <a:rPr lang="en-US" sz="2000" dirty="0" smtClean="0"/>
+              <a:t>An educational pneumatic robot was developed that is capable of walking using a simple creep </a:t>
+            </a:r>
+            <a:r>
+              <a:rPr lang="en-US" sz="2000" dirty="0" smtClean="0"/>
+              <a:t>gait</a:t>
+            </a:r>
+          </a:p>
+          <a:p>
+            <a:pPr marL="342900" indent="-342900">
+              <a:buFont typeface="Arial" panose="020B0604020202020204" pitchFamily="34" charset="0"/>
+              <a:buChar char="•"/>
+            </a:pPr>
+            <a:r>
+              <a:rPr lang="en-US" sz="2000" dirty="0"/>
+              <a:t>The robot kinematics and kinetics were determined to aid in the mechanical </a:t>
+            </a:r>
+            <a:r>
+              <a:rPr lang="en-US" sz="2000" dirty="0" smtClean="0"/>
+              <a:t>design</a:t>
+            </a:r>
+            <a:endParaRPr lang="en-US" sz="2000" dirty="0" smtClean="0"/>
+          </a:p>
+          <a:p>
+            <a:pPr marL="342900" indent="-342900">
+              <a:buFont typeface="Arial" panose="020B0604020202020204" pitchFamily="34" charset="0"/>
+              <a:buChar char="•"/>
+            </a:pPr>
+            <a:r>
+              <a:rPr lang="en-US" sz="2000" dirty="0" smtClean="0"/>
+              <a:t>The mechanical prototype was constructed for hardware testing</a:t>
+            </a:r>
+          </a:p>
+          <a:p>
+            <a:pPr marL="342900" indent="-342900">
+              <a:buFont typeface="Arial" panose="020B0604020202020204" pitchFamily="34" charset="0"/>
+              <a:buChar char="•"/>
+            </a:pPr>
+            <a:r>
+              <a:rPr lang="en-US" sz="2000" dirty="0" smtClean="0"/>
+              <a:t>Electrical subsystems were soldered to prototyping boards for hardware testing</a:t>
+            </a:r>
+            <a:endParaRPr lang="en-US" sz="2000" dirty="0" smtClean="0"/>
+          </a:p>
+          <a:p>
+            <a:pPr marL="342900" indent="-342900">
+              <a:buFont typeface="Arial" panose="020B0604020202020204" pitchFamily="34" charset="0"/>
+              <a:buChar char="•"/>
+            </a:pPr>
+            <a:r>
+              <a:rPr lang="en-US" sz="2000" dirty="0" smtClean="0"/>
+              <a:t>A wireless communication system and user interface was created</a:t>
+            </a:r>
+            <a:endParaRPr lang="en-US" sz="2000" dirty="0" smtClean="0"/>
+          </a:p>
+          <a:p>
+            <a:pPr marL="342900" indent="-342900">
+              <a:buFont typeface="Arial" panose="020B0604020202020204" pitchFamily="34" charset="0"/>
+              <a:buChar char="•"/>
+            </a:pPr>
+            <a:r>
+              <a:rPr lang="en-US" sz="2000" dirty="0" smtClean="0"/>
+              <a:t> More work is needed to implement more dynamic gaits and to characterize the valve/piston system dynamics</a:t>
+            </a:r>
+          </a:p>
+          <a:p>
+            <a:pPr marL="342900" indent="-342900">
+              <a:buFont typeface="Arial" panose="020B0604020202020204" pitchFamily="34" charset="0"/>
+              <a:buChar char="•"/>
+            </a:pPr>
+            <a:r>
+              <a:rPr lang="en-US" sz="2000" dirty="0" smtClean="0"/>
+              <a:t>Additional work is also needed to characterize the performance of the current controller and no implement  more sophisticated multivariable control  </a:t>
+            </a:r>
+            <a:r>
+              <a:rPr lang="en-US" sz="2000" dirty="0" smtClean="0"/>
+              <a:t>architecture</a:t>
+            </a:r>
+            <a:endParaRPr lang="en-US" sz="2000" dirty="0" smtClean="0"/>
+          </a:p>
+          <a:p>
+            <a:pPr marL="342900" indent="-342900">
+              <a:buFont typeface="Arial" panose="020B0604020202020204" pitchFamily="34" charset="0"/>
+              <a:buChar char="•"/>
+            </a:pPr>
+            <a:endParaRPr lang="en-US" sz="2000" dirty="0" smtClean="0">
+              <a:solidFill>
+                <a:srgbClr val="FF0000"/>
+              </a:solidFill>
+            </a:endParaRPr>
+          </a:p>
+        </p:txBody>
+      </p:sp>
     </p:spTree>
     <p:extLst>
       <p:ext uri="{BB962C8B-B14F-4D97-AF65-F5344CB8AC3E}">

</xml_diff>